<commit_message>
update slides, minor changes in README.md
</commit_message>
<xml_diff>
--- a/RR_project_slides.pptx
+++ b/RR_project_slides.pptx
@@ -6,6 +6,12 @@
   </p:sldMasterIdLst>
   <p:sldIdLst>
     <p:sldId id="256" r:id="rId2"/>
+    <p:sldId id="257" r:id="rId3"/>
+    <p:sldId id="265" r:id="rId4"/>
+    <p:sldId id="264" r:id="rId5"/>
+    <p:sldId id="263" r:id="rId6"/>
+    <p:sldId id="266" r:id="rId7"/>
+    <p:sldId id="260" r:id="rId8"/>
   </p:sldIdLst>
   <p:sldSz cx="12192000" cy="6858000"/>
   <p:notesSz cx="6858000" cy="9144000"/>
@@ -104,6 +110,11 @@
       </a:defRPr>
     </a:lvl9pPr>
   </p:defaultTextStyle>
+  <p:extLst>
+    <p:ext uri="{EFAFB233-063F-42B5-8137-9DF3F51BA10A}">
+      <p15:sldGuideLst xmlns:p15="http://schemas.microsoft.com/office/powerpoint/2012/main"/>
+    </p:ext>
+  </p:extLst>
 </p:presentation>
 </file>
 
@@ -256,7 +267,7 @@
           <a:p>
             <a:fld id="{8FE51000-7EF1-AF44-AAD8-9F8A57785F9C}" type="datetimeFigureOut">
               <a:rPr lang="en-PL" smtClean="0"/>
-              <a:t>08/06/2024</a:t>
+              <a:t>09/06/2024</a:t>
             </a:fld>
             <a:endParaRPr lang="en-PL"/>
           </a:p>
@@ -456,7 +467,7 @@
           <a:p>
             <a:fld id="{8FE51000-7EF1-AF44-AAD8-9F8A57785F9C}" type="datetimeFigureOut">
               <a:rPr lang="en-PL" smtClean="0"/>
-              <a:t>08/06/2024</a:t>
+              <a:t>09/06/2024</a:t>
             </a:fld>
             <a:endParaRPr lang="en-PL"/>
           </a:p>
@@ -666,7 +677,7 @@
           <a:p>
             <a:fld id="{8FE51000-7EF1-AF44-AAD8-9F8A57785F9C}" type="datetimeFigureOut">
               <a:rPr lang="en-PL" smtClean="0"/>
-              <a:t>08/06/2024</a:t>
+              <a:t>09/06/2024</a:t>
             </a:fld>
             <a:endParaRPr lang="en-PL"/>
           </a:p>
@@ -866,7 +877,7 @@
           <a:p>
             <a:fld id="{8FE51000-7EF1-AF44-AAD8-9F8A57785F9C}" type="datetimeFigureOut">
               <a:rPr lang="en-PL" smtClean="0"/>
-              <a:t>08/06/2024</a:t>
+              <a:t>09/06/2024</a:t>
             </a:fld>
             <a:endParaRPr lang="en-PL"/>
           </a:p>
@@ -1142,7 +1153,7 @@
           <a:p>
             <a:fld id="{8FE51000-7EF1-AF44-AAD8-9F8A57785F9C}" type="datetimeFigureOut">
               <a:rPr lang="en-PL" smtClean="0"/>
-              <a:t>08/06/2024</a:t>
+              <a:t>09/06/2024</a:t>
             </a:fld>
             <a:endParaRPr lang="en-PL"/>
           </a:p>
@@ -1410,7 +1421,7 @@
           <a:p>
             <a:fld id="{8FE51000-7EF1-AF44-AAD8-9F8A57785F9C}" type="datetimeFigureOut">
               <a:rPr lang="en-PL" smtClean="0"/>
-              <a:t>08/06/2024</a:t>
+              <a:t>09/06/2024</a:t>
             </a:fld>
             <a:endParaRPr lang="en-PL"/>
           </a:p>
@@ -1825,7 +1836,7 @@
           <a:p>
             <a:fld id="{8FE51000-7EF1-AF44-AAD8-9F8A57785F9C}" type="datetimeFigureOut">
               <a:rPr lang="en-PL" smtClean="0"/>
-              <a:t>08/06/2024</a:t>
+              <a:t>09/06/2024</a:t>
             </a:fld>
             <a:endParaRPr lang="en-PL"/>
           </a:p>
@@ -1967,7 +1978,7 @@
           <a:p>
             <a:fld id="{8FE51000-7EF1-AF44-AAD8-9F8A57785F9C}" type="datetimeFigureOut">
               <a:rPr lang="en-PL" smtClean="0"/>
-              <a:t>08/06/2024</a:t>
+              <a:t>09/06/2024</a:t>
             </a:fld>
             <a:endParaRPr lang="en-PL"/>
           </a:p>
@@ -2080,7 +2091,7 @@
           <a:p>
             <a:fld id="{8FE51000-7EF1-AF44-AAD8-9F8A57785F9C}" type="datetimeFigureOut">
               <a:rPr lang="en-PL" smtClean="0"/>
-              <a:t>08/06/2024</a:t>
+              <a:t>09/06/2024</a:t>
             </a:fld>
             <a:endParaRPr lang="en-PL"/>
           </a:p>
@@ -2393,7 +2404,7 @@
           <a:p>
             <a:fld id="{8FE51000-7EF1-AF44-AAD8-9F8A57785F9C}" type="datetimeFigureOut">
               <a:rPr lang="en-PL" smtClean="0"/>
-              <a:t>08/06/2024</a:t>
+              <a:t>09/06/2024</a:t>
             </a:fld>
             <a:endParaRPr lang="en-PL"/>
           </a:p>
@@ -2682,7 +2693,7 @@
           <a:p>
             <a:fld id="{8FE51000-7EF1-AF44-AAD8-9F8A57785F9C}" type="datetimeFigureOut">
               <a:rPr lang="en-PL" smtClean="0"/>
-              <a:t>08/06/2024</a:t>
+              <a:t>09/06/2024</a:t>
             </a:fld>
             <a:endParaRPr lang="en-PL"/>
           </a:p>
@@ -2925,7 +2936,7 @@
           <a:p>
             <a:fld id="{8FE51000-7EF1-AF44-AAD8-9F8A57785F9C}" type="datetimeFigureOut">
               <a:rPr lang="en-PL" smtClean="0"/>
-              <a:t>08/06/2024</a:t>
+              <a:t>09/06/2024</a:t>
             </a:fld>
             <a:endParaRPr lang="en-PL"/>
           </a:p>
@@ -3363,7 +3374,11 @@
           <a:bodyPr/>
           <a:lstStyle/>
           <a:p>
-            <a:endParaRPr lang="en-PL"/>
+            <a:r>
+              <a:rPr lang="en-GB" dirty="0"/>
+              <a:t>Reproducible Research</a:t>
+            </a:r>
+            <a:endParaRPr lang="en-PL" dirty="0"/>
           </a:p>
         </p:txBody>
       </p:sp>
@@ -3388,7 +3403,16 @@
           <a:bodyPr/>
           <a:lstStyle/>
           <a:p>
-            <a:endParaRPr lang="en-PL"/>
+            <a:r>
+              <a:rPr lang="en-PL" dirty="0"/>
+              <a:t>Wojciech Misiura 410579</a:t>
+            </a:r>
+          </a:p>
+          <a:p>
+            <a:r>
+              <a:rPr lang="en-PL" dirty="0"/>
+              <a:t>Tarlan Aghayev 455149 </a:t>
+            </a:r>
           </a:p>
         </p:txBody>
       </p:sp>
@@ -3396,6 +3420,4569 @@
     <p:extLst>
       <p:ext uri="{BB962C8B-B14F-4D97-AF65-F5344CB8AC3E}">
         <p14:creationId xmlns:p14="http://schemas.microsoft.com/office/powerpoint/2010/main" val="733898262"/>
+      </p:ext>
+    </p:extLst>
+  </p:cSld>
+  <p:clrMapOvr>
+    <a:masterClrMapping/>
+  </p:clrMapOvr>
+</p:sld>
+</file>
+
+<file path=ppt/slides/slide2.xml><?xml version="1.0" encoding="utf-8"?>
+<p:sld xmlns:a="http://schemas.openxmlformats.org/drawingml/2006/main" xmlns:r="http://schemas.openxmlformats.org/officeDocument/2006/relationships" xmlns:p="http://schemas.openxmlformats.org/presentationml/2006/main">
+  <p:cSld>
+    <p:bg>
+      <p:bgPr>
+        <a:solidFill>
+          <a:schemeClr val="bg1"/>
+        </a:solidFill>
+        <a:effectLst/>
+      </p:bgPr>
+    </p:bg>
+    <p:spTree>
+      <p:nvGrpSpPr>
+        <p:cNvPr id="1" name=""/>
+        <p:cNvGrpSpPr/>
+        <p:nvPr/>
+      </p:nvGrpSpPr>
+      <p:grpSpPr>
+        <a:xfrm>
+          <a:off x="0" y="0"/>
+          <a:ext cx="0" cy="0"/>
+          <a:chOff x="0" y="0"/>
+          <a:chExt cx="0" cy="0"/>
+        </a:xfrm>
+      </p:grpSpPr>
+      <p:sp useBgFill="1">
+        <p:nvSpPr>
+          <p:cNvPr id="12" name="Rectangle 11">
+            <a:extLst>
+              <a:ext uri="{FF2B5EF4-FFF2-40B4-BE49-F238E27FC236}">
+                <a16:creationId xmlns:a16="http://schemas.microsoft.com/office/drawing/2014/main" id="{12609869-9E80-471B-A487-A53288E0E791}"/>
+              </a:ext>
+              <a:ext uri="{C183D7F6-B498-43B3-948B-1728B52AA6E4}">
+                <adec:decorative xmlns:adec="http://schemas.microsoft.com/office/drawing/2017/decorative" val="1"/>
+              </a:ext>
+            </a:extLst>
+          </p:cNvPr>
+          <p:cNvSpPr>
+            <a:spLocks noGrp="1" noRot="1" noChangeAspect="1" noMove="1" noResize="1" noEditPoints="1" noAdjustHandles="1" noChangeArrowheads="1" noChangeShapeType="1" noTextEdit="1"/>
+          </p:cNvSpPr>
+          <p:nvPr>
+            <p:extLst>
+              <p:ext uri="{386F3935-93C4-4BCD-93E2-E3B085C9AB24}">
+                <p16:designElem xmlns:p16="http://schemas.microsoft.com/office/powerpoint/2015/main" val="1"/>
+              </p:ext>
+            </p:extLst>
+          </p:nvPr>
+        </p:nvSpPr>
+        <p:spPr>
+          <a:xfrm>
+            <a:off x="0" y="0"/>
+            <a:ext cx="12192000" cy="6858000"/>
+          </a:xfrm>
+          <a:prstGeom prst="rect">
+            <a:avLst/>
+          </a:prstGeom>
+          <a:ln w="12700" cap="flat" cmpd="sng" algn="ctr">
+            <a:noFill/>
+            <a:prstDash val="solid"/>
+            <a:miter lim="800000"/>
+          </a:ln>
+          <a:effectLst/>
+          <a:extLst>
+            <a:ext uri="{91240B29-F687-4F45-9708-019B960494DF}">
+              <a14:hiddenLine xmlns:a14="http://schemas.microsoft.com/office/drawing/2010/main" w="12700" cap="flat" cmpd="sng" algn="ctr">
+                <a:solidFill>
+                  <a:schemeClr val="accent1">
+                    <a:shade val="50000"/>
+                  </a:schemeClr>
+                </a:solidFill>
+                <a:prstDash val="solid"/>
+                <a:miter lim="800000"/>
+              </a14:hiddenLine>
+            </a:ext>
+          </a:extLst>
+        </p:spPr>
+        <p:style>
+          <a:lnRef idx="2">
+            <a:schemeClr val="accent1">
+              <a:shade val="50000"/>
+            </a:schemeClr>
+          </a:lnRef>
+          <a:fillRef idx="1">
+            <a:schemeClr val="accent1"/>
+          </a:fillRef>
+          <a:effectRef idx="0">
+            <a:schemeClr val="accent1"/>
+          </a:effectRef>
+          <a:fontRef idx="minor">
+            <a:schemeClr val="lt1"/>
+          </a:fontRef>
+        </p:style>
+        <p:txBody>
+          <a:bodyPr rtlCol="0" anchor="ctr"/>
+          <a:lstStyle/>
+          <a:p>
+            <a:pPr algn="ctr"/>
+            <a:endParaRPr lang="en-US"/>
+          </a:p>
+        </p:txBody>
+      </p:sp>
+      <p:sp>
+        <p:nvSpPr>
+          <p:cNvPr id="2" name="Title 1">
+            <a:extLst>
+              <a:ext uri="{FF2B5EF4-FFF2-40B4-BE49-F238E27FC236}">
+                <a16:creationId xmlns:a16="http://schemas.microsoft.com/office/drawing/2014/main" id="{32C432B7-0A6C-2C12-77FA-7B714600B30E}"/>
+              </a:ext>
+            </a:extLst>
+          </p:cNvPr>
+          <p:cNvSpPr>
+            <a:spLocks noGrp="1"/>
+          </p:cNvSpPr>
+          <p:nvPr>
+            <p:ph type="title"/>
+          </p:nvPr>
+        </p:nvSpPr>
+        <p:spPr>
+          <a:xfrm>
+            <a:off x="1136397" y="502020"/>
+            <a:ext cx="5323715" cy="1642970"/>
+          </a:xfrm>
+        </p:spPr>
+        <p:txBody>
+          <a:bodyPr vert="horz" lIns="91440" tIns="45720" rIns="91440" bIns="45720" rtlCol="0" anchor="b">
+            <a:normAutofit/>
+          </a:bodyPr>
+          <a:lstStyle/>
+          <a:p>
+            <a:r>
+              <a:rPr lang="en-US" sz="4000" kern="1200">
+                <a:solidFill>
+                  <a:schemeClr val="tx1"/>
+                </a:solidFill>
+                <a:latin typeface="+mj-lt"/>
+                <a:ea typeface="+mj-ea"/>
+                <a:cs typeface="+mj-cs"/>
+              </a:rPr>
+              <a:t>Reference project</a:t>
+            </a:r>
+          </a:p>
+        </p:txBody>
+      </p:sp>
+      <p:sp>
+        <p:nvSpPr>
+          <p:cNvPr id="7" name="Content Placeholder 2">
+            <a:extLst>
+              <a:ext uri="{FF2B5EF4-FFF2-40B4-BE49-F238E27FC236}">
+                <a16:creationId xmlns:a16="http://schemas.microsoft.com/office/drawing/2014/main" id="{6E2D6785-3FC0-5B4B-8F43-4406AD91B4D7}"/>
+              </a:ext>
+            </a:extLst>
+          </p:cNvPr>
+          <p:cNvSpPr txBox="1">
+            <a:spLocks/>
+          </p:cNvSpPr>
+          <p:nvPr/>
+        </p:nvSpPr>
+        <p:spPr>
+          <a:xfrm>
+            <a:off x="1144923" y="2405894"/>
+            <a:ext cx="5315189" cy="3535083"/>
+          </a:xfrm>
+          <a:prstGeom prst="rect">
+            <a:avLst/>
+          </a:prstGeom>
+        </p:spPr>
+        <p:txBody>
+          <a:bodyPr vert="horz" lIns="91440" tIns="45720" rIns="91440" bIns="45720" rtlCol="0" anchor="t">
+            <a:normAutofit/>
+          </a:bodyPr>
+          <a:lstStyle>
+            <a:lvl1pPr marL="228600" indent="-228600" algn="l" defTabSz="914400" rtl="0" eaLnBrk="1" latinLnBrk="0" hangingPunct="1">
+              <a:lnSpc>
+                <a:spcPct val="90000"/>
+              </a:lnSpc>
+              <a:spcBef>
+                <a:spcPts val="1000"/>
+              </a:spcBef>
+              <a:buFont typeface="Arial" panose="020B0604020202020204" pitchFamily="34" charset="0"/>
+              <a:buChar char="•"/>
+              <a:defRPr sz="2800" kern="1200">
+                <a:solidFill>
+                  <a:schemeClr val="tx1"/>
+                </a:solidFill>
+                <a:latin typeface="+mn-lt"/>
+                <a:ea typeface="+mn-ea"/>
+                <a:cs typeface="+mn-cs"/>
+              </a:defRPr>
+            </a:lvl1pPr>
+            <a:lvl2pPr marL="685800" indent="-228600" algn="l" defTabSz="914400" rtl="0" eaLnBrk="1" latinLnBrk="0" hangingPunct="1">
+              <a:lnSpc>
+                <a:spcPct val="90000"/>
+              </a:lnSpc>
+              <a:spcBef>
+                <a:spcPts val="500"/>
+              </a:spcBef>
+              <a:buFont typeface="Arial" panose="020B0604020202020204" pitchFamily="34" charset="0"/>
+              <a:buChar char="•"/>
+              <a:defRPr sz="2400" kern="1200">
+                <a:solidFill>
+                  <a:schemeClr val="tx1"/>
+                </a:solidFill>
+                <a:latin typeface="+mn-lt"/>
+                <a:ea typeface="+mn-ea"/>
+                <a:cs typeface="+mn-cs"/>
+              </a:defRPr>
+            </a:lvl2pPr>
+            <a:lvl3pPr marL="1143000" indent="-228600" algn="l" defTabSz="914400" rtl="0" eaLnBrk="1" latinLnBrk="0" hangingPunct="1">
+              <a:lnSpc>
+                <a:spcPct val="90000"/>
+              </a:lnSpc>
+              <a:spcBef>
+                <a:spcPts val="500"/>
+              </a:spcBef>
+              <a:buFont typeface="Arial" panose="020B0604020202020204" pitchFamily="34" charset="0"/>
+              <a:buChar char="•"/>
+              <a:defRPr sz="2000" kern="1200">
+                <a:solidFill>
+                  <a:schemeClr val="tx1"/>
+                </a:solidFill>
+                <a:latin typeface="+mn-lt"/>
+                <a:ea typeface="+mn-ea"/>
+                <a:cs typeface="+mn-cs"/>
+              </a:defRPr>
+            </a:lvl3pPr>
+            <a:lvl4pPr marL="1600200" indent="-228600" algn="l" defTabSz="914400" rtl="0" eaLnBrk="1" latinLnBrk="0" hangingPunct="1">
+              <a:lnSpc>
+                <a:spcPct val="90000"/>
+              </a:lnSpc>
+              <a:spcBef>
+                <a:spcPts val="500"/>
+              </a:spcBef>
+              <a:buFont typeface="Arial" panose="020B0604020202020204" pitchFamily="34" charset="0"/>
+              <a:buChar char="•"/>
+              <a:defRPr sz="1800" kern="1200">
+                <a:solidFill>
+                  <a:schemeClr val="tx1"/>
+                </a:solidFill>
+                <a:latin typeface="+mn-lt"/>
+                <a:ea typeface="+mn-ea"/>
+                <a:cs typeface="+mn-cs"/>
+              </a:defRPr>
+            </a:lvl4pPr>
+            <a:lvl5pPr marL="2057400" indent="-228600" algn="l" defTabSz="914400" rtl="0" eaLnBrk="1" latinLnBrk="0" hangingPunct="1">
+              <a:lnSpc>
+                <a:spcPct val="90000"/>
+              </a:lnSpc>
+              <a:spcBef>
+                <a:spcPts val="500"/>
+              </a:spcBef>
+              <a:buFont typeface="Arial" panose="020B0604020202020204" pitchFamily="34" charset="0"/>
+              <a:buChar char="•"/>
+              <a:defRPr sz="1800" kern="1200">
+                <a:solidFill>
+                  <a:schemeClr val="tx1"/>
+                </a:solidFill>
+                <a:latin typeface="+mn-lt"/>
+                <a:ea typeface="+mn-ea"/>
+                <a:cs typeface="+mn-cs"/>
+              </a:defRPr>
+            </a:lvl5pPr>
+            <a:lvl6pPr marL="2514600" indent="-228600" algn="l" defTabSz="914400" rtl="0" eaLnBrk="1" latinLnBrk="0" hangingPunct="1">
+              <a:lnSpc>
+                <a:spcPct val="90000"/>
+              </a:lnSpc>
+              <a:spcBef>
+                <a:spcPts val="500"/>
+              </a:spcBef>
+              <a:buFont typeface="Arial" panose="020B0604020202020204" pitchFamily="34" charset="0"/>
+              <a:buChar char="•"/>
+              <a:defRPr sz="1800" kern="1200">
+                <a:solidFill>
+                  <a:schemeClr val="tx1"/>
+                </a:solidFill>
+                <a:latin typeface="+mn-lt"/>
+                <a:ea typeface="+mn-ea"/>
+                <a:cs typeface="+mn-cs"/>
+              </a:defRPr>
+            </a:lvl6pPr>
+            <a:lvl7pPr marL="2971800" indent="-228600" algn="l" defTabSz="914400" rtl="0" eaLnBrk="1" latinLnBrk="0" hangingPunct="1">
+              <a:lnSpc>
+                <a:spcPct val="90000"/>
+              </a:lnSpc>
+              <a:spcBef>
+                <a:spcPts val="500"/>
+              </a:spcBef>
+              <a:buFont typeface="Arial" panose="020B0604020202020204" pitchFamily="34" charset="0"/>
+              <a:buChar char="•"/>
+              <a:defRPr sz="1800" kern="1200">
+                <a:solidFill>
+                  <a:schemeClr val="tx1"/>
+                </a:solidFill>
+                <a:latin typeface="+mn-lt"/>
+                <a:ea typeface="+mn-ea"/>
+                <a:cs typeface="+mn-cs"/>
+              </a:defRPr>
+            </a:lvl7pPr>
+            <a:lvl8pPr marL="3429000" indent="-228600" algn="l" defTabSz="914400" rtl="0" eaLnBrk="1" latinLnBrk="0" hangingPunct="1">
+              <a:lnSpc>
+                <a:spcPct val="90000"/>
+              </a:lnSpc>
+              <a:spcBef>
+                <a:spcPts val="500"/>
+              </a:spcBef>
+              <a:buFont typeface="Arial" panose="020B0604020202020204" pitchFamily="34" charset="0"/>
+              <a:buChar char="•"/>
+              <a:defRPr sz="1800" kern="1200">
+                <a:solidFill>
+                  <a:schemeClr val="tx1"/>
+                </a:solidFill>
+                <a:latin typeface="+mn-lt"/>
+                <a:ea typeface="+mn-ea"/>
+                <a:cs typeface="+mn-cs"/>
+              </a:defRPr>
+            </a:lvl8pPr>
+            <a:lvl9pPr marL="3886200" indent="-228600" algn="l" defTabSz="914400" rtl="0" eaLnBrk="1" latinLnBrk="0" hangingPunct="1">
+              <a:lnSpc>
+                <a:spcPct val="90000"/>
+              </a:lnSpc>
+              <a:spcBef>
+                <a:spcPts val="500"/>
+              </a:spcBef>
+              <a:buFont typeface="Arial" panose="020B0604020202020204" pitchFamily="34" charset="0"/>
+              <a:buChar char="•"/>
+              <a:defRPr sz="1800" kern="1200">
+                <a:solidFill>
+                  <a:schemeClr val="tx1"/>
+                </a:solidFill>
+                <a:latin typeface="+mn-lt"/>
+                <a:ea typeface="+mn-ea"/>
+                <a:cs typeface="+mn-cs"/>
+              </a:defRPr>
+            </a:lvl9pPr>
+          </a:lstStyle>
+          <a:p>
+            <a:pPr marL="0"/>
+            <a:r>
+              <a:rPr lang="en-US" sz="2000"/>
+              <a:t>Project was selected from kaggle.com and presented usage of Decision Tree machine learning model on dataset available on kaggle.com.</a:t>
+            </a:r>
+          </a:p>
+          <a:p>
+            <a:pPr marL="0"/>
+            <a:endParaRPr lang="en-US" sz="2000"/>
+          </a:p>
+          <a:p>
+            <a:pPr marL="0"/>
+            <a:r>
+              <a:rPr lang="en-US" sz="2000"/>
+              <a:t>Dataset was taken from UCI website and represented only selected number of observations – around 5k out of 45k.</a:t>
+            </a:r>
+          </a:p>
+        </p:txBody>
+      </p:sp>
+      <p:sp>
+        <p:nvSpPr>
+          <p:cNvPr id="14" name="Rectangle 13">
+            <a:extLst>
+              <a:ext uri="{FF2B5EF4-FFF2-40B4-BE49-F238E27FC236}">
+                <a16:creationId xmlns:a16="http://schemas.microsoft.com/office/drawing/2014/main" id="{7004738A-9D34-43E8-97D2-CA0EED4F8BE0}"/>
+              </a:ext>
+              <a:ext uri="{C183D7F6-B498-43B3-948B-1728B52AA6E4}">
+                <adec:decorative xmlns:adec="http://schemas.microsoft.com/office/drawing/2017/decorative" val="1"/>
+              </a:ext>
+            </a:extLst>
+          </p:cNvPr>
+          <p:cNvSpPr>
+            <a:spLocks noGrp="1" noRot="1" noChangeAspect="1" noMove="1" noResize="1" noEditPoints="1" noAdjustHandles="1" noChangeArrowheads="1" noChangeShapeType="1" noTextEdit="1"/>
+          </p:cNvSpPr>
+          <p:nvPr>
+            <p:extLst>
+              <p:ext uri="{386F3935-93C4-4BCD-93E2-E3B085C9AB24}">
+                <p16:designElem xmlns:p16="http://schemas.microsoft.com/office/powerpoint/2015/main" val="1"/>
+              </p:ext>
+            </p:extLst>
+          </p:nvPr>
+        </p:nvSpPr>
+        <p:spPr>
+          <a:xfrm rot="10800000" flipH="1">
+            <a:off x="8123333" y="-5"/>
+            <a:ext cx="4092521" cy="6858000"/>
+          </a:xfrm>
+          <a:prstGeom prst="rect">
+            <a:avLst/>
+          </a:prstGeom>
+          <a:gradFill>
+            <a:gsLst>
+              <a:gs pos="8000">
+                <a:srgbClr val="000000">
+                  <a:alpha val="94000"/>
+                </a:srgbClr>
+              </a:gs>
+              <a:gs pos="100000">
+                <a:schemeClr val="accent1"/>
+              </a:gs>
+            </a:gsLst>
+            <a:lin ang="2400000" scaled="0"/>
+          </a:gradFill>
+          <a:ln>
+            <a:noFill/>
+          </a:ln>
+        </p:spPr>
+        <p:style>
+          <a:lnRef idx="2">
+            <a:schemeClr val="accent1">
+              <a:shade val="50000"/>
+            </a:schemeClr>
+          </a:lnRef>
+          <a:fillRef idx="1">
+            <a:schemeClr val="accent1"/>
+          </a:fillRef>
+          <a:effectRef idx="0">
+            <a:schemeClr val="accent1"/>
+          </a:effectRef>
+          <a:fontRef idx="minor">
+            <a:schemeClr val="lt1"/>
+          </a:fontRef>
+        </p:style>
+        <p:txBody>
+          <a:bodyPr rtlCol="0" anchor="ctr"/>
+          <a:lstStyle/>
+          <a:p>
+            <a:pPr algn="ctr"/>
+            <a:endParaRPr lang="en-US"/>
+          </a:p>
+        </p:txBody>
+      </p:sp>
+      <p:sp>
+        <p:nvSpPr>
+          <p:cNvPr id="16" name="Rectangle 15">
+            <a:extLst>
+              <a:ext uri="{FF2B5EF4-FFF2-40B4-BE49-F238E27FC236}">
+                <a16:creationId xmlns:a16="http://schemas.microsoft.com/office/drawing/2014/main" id="{B8B8D07F-F13E-443E-BA68-2D26672D76B9}"/>
+              </a:ext>
+              <a:ext uri="{C183D7F6-B498-43B3-948B-1728B52AA6E4}">
+                <adec:decorative xmlns:adec="http://schemas.microsoft.com/office/drawing/2017/decorative" val="1"/>
+              </a:ext>
+            </a:extLst>
+          </p:cNvPr>
+          <p:cNvSpPr>
+            <a:spLocks noGrp="1" noRot="1" noChangeAspect="1" noMove="1" noResize="1" noEditPoints="1" noAdjustHandles="1" noChangeArrowheads="1" noChangeShapeType="1" noTextEdit="1"/>
+          </p:cNvSpPr>
+          <p:nvPr>
+            <p:extLst>
+              <p:ext uri="{386F3935-93C4-4BCD-93E2-E3B085C9AB24}">
+                <p16:designElem xmlns:p16="http://schemas.microsoft.com/office/powerpoint/2015/main" val="1"/>
+              </p:ext>
+            </p:extLst>
+          </p:nvPr>
+        </p:nvSpPr>
+        <p:spPr>
+          <a:xfrm rot="10800000" flipH="1">
+            <a:off x="8123333" y="-2"/>
+            <a:ext cx="4092521" cy="6400369"/>
+          </a:xfrm>
+          <a:prstGeom prst="rect">
+            <a:avLst/>
+          </a:prstGeom>
+          <a:gradFill>
+            <a:gsLst>
+              <a:gs pos="31000">
+                <a:schemeClr val="accent1">
+                  <a:lumMod val="50000"/>
+                  <a:alpha val="0"/>
+                </a:schemeClr>
+              </a:gs>
+              <a:gs pos="100000">
+                <a:schemeClr val="accent1">
+                  <a:lumMod val="50000"/>
+                  <a:alpha val="26000"/>
+                </a:schemeClr>
+              </a:gs>
+            </a:gsLst>
+            <a:lin ang="18000000" scaled="0"/>
+          </a:gradFill>
+          <a:ln>
+            <a:noFill/>
+          </a:ln>
+        </p:spPr>
+        <p:style>
+          <a:lnRef idx="2">
+            <a:schemeClr val="accent1">
+              <a:shade val="50000"/>
+            </a:schemeClr>
+          </a:lnRef>
+          <a:fillRef idx="1">
+            <a:schemeClr val="accent1"/>
+          </a:fillRef>
+          <a:effectRef idx="0">
+            <a:schemeClr val="accent1"/>
+          </a:effectRef>
+          <a:fontRef idx="minor">
+            <a:schemeClr val="lt1"/>
+          </a:fontRef>
+        </p:style>
+        <p:txBody>
+          <a:bodyPr rtlCol="0" anchor="ctr"/>
+          <a:lstStyle/>
+          <a:p>
+            <a:pPr algn="ctr"/>
+            <a:endParaRPr lang="en-US" dirty="0"/>
+          </a:p>
+        </p:txBody>
+      </p:sp>
+      <p:sp>
+        <p:nvSpPr>
+          <p:cNvPr id="18" name="Rectangle 17">
+            <a:extLst>
+              <a:ext uri="{FF2B5EF4-FFF2-40B4-BE49-F238E27FC236}">
+                <a16:creationId xmlns:a16="http://schemas.microsoft.com/office/drawing/2014/main" id="{2813A4FA-24A5-41ED-A534-3807D1B2F344}"/>
+              </a:ext>
+              <a:ext uri="{C183D7F6-B498-43B3-948B-1728B52AA6E4}">
+                <adec:decorative xmlns:adec="http://schemas.microsoft.com/office/drawing/2017/decorative" val="1"/>
+              </a:ext>
+            </a:extLst>
+          </p:cNvPr>
+          <p:cNvSpPr>
+            <a:spLocks noGrp="1" noRot="1" noChangeAspect="1" noMove="1" noResize="1" noEditPoints="1" noAdjustHandles="1" noChangeArrowheads="1" noChangeShapeType="1" noTextEdit="1"/>
+          </p:cNvSpPr>
+          <p:nvPr>
+            <p:extLst>
+              <p:ext uri="{386F3935-93C4-4BCD-93E2-E3B085C9AB24}">
+                <p16:designElem xmlns:p16="http://schemas.microsoft.com/office/powerpoint/2015/main" val="1"/>
+              </p:ext>
+            </p:extLst>
+          </p:nvPr>
+        </p:nvSpPr>
+        <p:spPr>
+          <a:xfrm rot="10800000" flipH="1">
+            <a:off x="8123333" y="-22"/>
+            <a:ext cx="4068667" cy="6400389"/>
+          </a:xfrm>
+          <a:prstGeom prst="rect">
+            <a:avLst/>
+          </a:prstGeom>
+          <a:gradFill>
+            <a:gsLst>
+              <a:gs pos="0">
+                <a:schemeClr val="accent1">
+                  <a:alpha val="0"/>
+                </a:schemeClr>
+              </a:gs>
+              <a:gs pos="72000">
+                <a:srgbClr val="000000">
+                  <a:alpha val="21000"/>
+                </a:srgbClr>
+              </a:gs>
+            </a:gsLst>
+            <a:lin ang="3000000" scaled="0"/>
+          </a:gradFill>
+          <a:ln>
+            <a:noFill/>
+          </a:ln>
+        </p:spPr>
+        <p:style>
+          <a:lnRef idx="2">
+            <a:schemeClr val="accent1">
+              <a:shade val="50000"/>
+            </a:schemeClr>
+          </a:lnRef>
+          <a:fillRef idx="1">
+            <a:schemeClr val="accent1"/>
+          </a:fillRef>
+          <a:effectRef idx="0">
+            <a:schemeClr val="accent1"/>
+          </a:effectRef>
+          <a:fontRef idx="minor">
+            <a:schemeClr val="lt1"/>
+          </a:fontRef>
+        </p:style>
+        <p:txBody>
+          <a:bodyPr rtlCol="0" anchor="ctr"/>
+          <a:lstStyle/>
+          <a:p>
+            <a:pPr algn="ctr"/>
+            <a:endParaRPr lang="en-US" dirty="0"/>
+          </a:p>
+        </p:txBody>
+      </p:sp>
+      <p:sp>
+        <p:nvSpPr>
+          <p:cNvPr id="20" name="Rectangle 19">
+            <a:extLst>
+              <a:ext uri="{FF2B5EF4-FFF2-40B4-BE49-F238E27FC236}">
+                <a16:creationId xmlns:a16="http://schemas.microsoft.com/office/drawing/2014/main" id="{C3944F27-CA70-4E84-A51A-E6BF89558979}"/>
+              </a:ext>
+              <a:ext uri="{C183D7F6-B498-43B3-948B-1728B52AA6E4}">
+                <adec:decorative xmlns:adec="http://schemas.microsoft.com/office/drawing/2017/decorative" val="1"/>
+              </a:ext>
+            </a:extLst>
+          </p:cNvPr>
+          <p:cNvSpPr>
+            <a:spLocks noGrp="1" noRot="1" noChangeAspect="1" noMove="1" noResize="1" noEditPoints="1" noAdjustHandles="1" noChangeArrowheads="1" noChangeShapeType="1" noTextEdit="1"/>
+          </p:cNvSpPr>
+          <p:nvPr>
+            <p:extLst>
+              <p:ext uri="{386F3935-93C4-4BCD-93E2-E3B085C9AB24}">
+                <p16:designElem xmlns:p16="http://schemas.microsoft.com/office/powerpoint/2015/main" val="1"/>
+              </p:ext>
+            </p:extLst>
+          </p:nvPr>
+        </p:nvSpPr>
+        <p:spPr>
+          <a:xfrm rot="10800000" flipH="1">
+            <a:off x="8123333" y="-10"/>
+            <a:ext cx="3611467" cy="6857997"/>
+          </a:xfrm>
+          <a:prstGeom prst="rect">
+            <a:avLst/>
+          </a:prstGeom>
+          <a:gradFill>
+            <a:gsLst>
+              <a:gs pos="0">
+                <a:schemeClr val="accent1">
+                  <a:alpha val="0"/>
+                </a:schemeClr>
+              </a:gs>
+              <a:gs pos="93000">
+                <a:srgbClr val="000000">
+                  <a:alpha val="29000"/>
+                </a:srgbClr>
+              </a:gs>
+            </a:gsLst>
+            <a:lin ang="5400000" scaled="0"/>
+          </a:gradFill>
+          <a:ln>
+            <a:noFill/>
+          </a:ln>
+        </p:spPr>
+        <p:style>
+          <a:lnRef idx="2">
+            <a:schemeClr val="accent1">
+              <a:shade val="50000"/>
+            </a:schemeClr>
+          </a:lnRef>
+          <a:fillRef idx="1">
+            <a:schemeClr val="accent1"/>
+          </a:fillRef>
+          <a:effectRef idx="0">
+            <a:schemeClr val="accent1"/>
+          </a:effectRef>
+          <a:fontRef idx="minor">
+            <a:schemeClr val="lt1"/>
+          </a:fontRef>
+        </p:style>
+        <p:txBody>
+          <a:bodyPr rtlCol="0" anchor="ctr"/>
+          <a:lstStyle/>
+          <a:p>
+            <a:pPr algn="ctr"/>
+            <a:endParaRPr lang="en-US" dirty="0"/>
+          </a:p>
+        </p:txBody>
+      </p:sp>
+      <p:pic>
+        <p:nvPicPr>
+          <p:cNvPr id="6" name="Content Placeholder 5" descr="A qr code with a black background&#10;&#10;Description automatically generated">
+            <a:extLst>
+              <a:ext uri="{FF2B5EF4-FFF2-40B4-BE49-F238E27FC236}">
+                <a16:creationId xmlns:a16="http://schemas.microsoft.com/office/drawing/2014/main" id="{0382BF0A-F019-3306-16C5-0C3C06A57546}"/>
+              </a:ext>
+            </a:extLst>
+          </p:cNvPr>
+          <p:cNvPicPr>
+            <a:picLocks noGrp="1" noChangeAspect="1"/>
+          </p:cNvPicPr>
+          <p:nvPr>
+            <p:ph idx="1"/>
+          </p:nvPr>
+        </p:nvPicPr>
+        <p:blipFill>
+          <a:blip r:embed="rId2"/>
+          <a:stretch>
+            <a:fillRect/>
+          </a:stretch>
+        </p:blipFill>
+        <p:spPr>
+          <a:xfrm>
+            <a:off x="7202276" y="909081"/>
+            <a:ext cx="3917911" cy="5071731"/>
+          </a:xfrm>
+          <a:prstGeom prst="rect">
+            <a:avLst/>
+          </a:prstGeom>
+        </p:spPr>
+      </p:pic>
+    </p:spTree>
+    <p:extLst>
+      <p:ext uri="{BB962C8B-B14F-4D97-AF65-F5344CB8AC3E}">
+        <p14:creationId xmlns:p14="http://schemas.microsoft.com/office/powerpoint/2010/main" val="3919622244"/>
+      </p:ext>
+    </p:extLst>
+  </p:cSld>
+  <p:clrMapOvr>
+    <a:masterClrMapping/>
+  </p:clrMapOvr>
+</p:sld>
+</file>
+
+<file path=ppt/slides/slide3.xml><?xml version="1.0" encoding="utf-8"?>
+<p:sld xmlns:a="http://schemas.openxmlformats.org/drawingml/2006/main" xmlns:r="http://schemas.openxmlformats.org/officeDocument/2006/relationships" xmlns:p="http://schemas.openxmlformats.org/presentationml/2006/main">
+  <p:cSld>
+    <p:bg>
+      <p:bgPr>
+        <a:solidFill>
+          <a:schemeClr val="bg1"/>
+        </a:solidFill>
+        <a:effectLst/>
+      </p:bgPr>
+    </p:bg>
+    <p:spTree>
+      <p:nvGrpSpPr>
+        <p:cNvPr id="1" name=""/>
+        <p:cNvGrpSpPr/>
+        <p:nvPr/>
+      </p:nvGrpSpPr>
+      <p:grpSpPr>
+        <a:xfrm>
+          <a:off x="0" y="0"/>
+          <a:ext cx="0" cy="0"/>
+          <a:chOff x="0" y="0"/>
+          <a:chExt cx="0" cy="0"/>
+        </a:xfrm>
+      </p:grpSpPr>
+      <p:sp useBgFill="1">
+        <p:nvSpPr>
+          <p:cNvPr id="12" name="Rectangle 11">
+            <a:extLst>
+              <a:ext uri="{FF2B5EF4-FFF2-40B4-BE49-F238E27FC236}">
+                <a16:creationId xmlns:a16="http://schemas.microsoft.com/office/drawing/2014/main" id="{12609869-9E80-471B-A487-A53288E0E791}"/>
+              </a:ext>
+              <a:ext uri="{C183D7F6-B498-43B3-948B-1728B52AA6E4}">
+                <adec:decorative xmlns:adec="http://schemas.microsoft.com/office/drawing/2017/decorative" val="1"/>
+              </a:ext>
+            </a:extLst>
+          </p:cNvPr>
+          <p:cNvSpPr>
+            <a:spLocks noGrp="1" noRot="1" noChangeAspect="1" noMove="1" noResize="1" noEditPoints="1" noAdjustHandles="1" noChangeArrowheads="1" noChangeShapeType="1" noTextEdit="1"/>
+          </p:cNvSpPr>
+          <p:nvPr>
+            <p:extLst>
+              <p:ext uri="{386F3935-93C4-4BCD-93E2-E3B085C9AB24}">
+                <p16:designElem xmlns:p16="http://schemas.microsoft.com/office/powerpoint/2015/main" val="1"/>
+              </p:ext>
+            </p:extLst>
+          </p:nvPr>
+        </p:nvSpPr>
+        <p:spPr>
+          <a:xfrm>
+            <a:off x="0" y="0"/>
+            <a:ext cx="12192000" cy="6858000"/>
+          </a:xfrm>
+          <a:prstGeom prst="rect">
+            <a:avLst/>
+          </a:prstGeom>
+          <a:ln w="12700" cap="flat" cmpd="sng" algn="ctr">
+            <a:noFill/>
+            <a:prstDash val="solid"/>
+            <a:miter lim="800000"/>
+          </a:ln>
+          <a:effectLst/>
+          <a:extLst>
+            <a:ext uri="{91240B29-F687-4F45-9708-019B960494DF}">
+              <a14:hiddenLine xmlns:a14="http://schemas.microsoft.com/office/drawing/2010/main" w="12700" cap="flat" cmpd="sng" algn="ctr">
+                <a:solidFill>
+                  <a:schemeClr val="accent1">
+                    <a:shade val="50000"/>
+                  </a:schemeClr>
+                </a:solidFill>
+                <a:prstDash val="solid"/>
+                <a:miter lim="800000"/>
+              </a14:hiddenLine>
+            </a:ext>
+          </a:extLst>
+        </p:spPr>
+        <p:style>
+          <a:lnRef idx="2">
+            <a:schemeClr val="accent1">
+              <a:shade val="50000"/>
+            </a:schemeClr>
+          </a:lnRef>
+          <a:fillRef idx="1">
+            <a:schemeClr val="accent1"/>
+          </a:fillRef>
+          <a:effectRef idx="0">
+            <a:schemeClr val="accent1"/>
+          </a:effectRef>
+          <a:fontRef idx="minor">
+            <a:schemeClr val="lt1"/>
+          </a:fontRef>
+        </p:style>
+        <p:txBody>
+          <a:bodyPr rtlCol="0" anchor="ctr"/>
+          <a:lstStyle/>
+          <a:p>
+            <a:pPr marL="0" marR="0" lvl="0" indent="0" algn="ctr" defTabSz="914400" rtl="0" eaLnBrk="1" fontAlgn="auto" latinLnBrk="0" hangingPunct="1">
+              <a:lnSpc>
+                <a:spcPct val="100000"/>
+              </a:lnSpc>
+              <a:spcBef>
+                <a:spcPts val="0"/>
+              </a:spcBef>
+              <a:spcAft>
+                <a:spcPts val="0"/>
+              </a:spcAft>
+              <a:buClrTx/>
+              <a:buSzTx/>
+              <a:buFontTx/>
+              <a:buNone/>
+              <a:tabLst/>
+              <a:defRPr/>
+            </a:pPr>
+            <a:endParaRPr kumimoji="0" lang="en-US" sz="1800" b="0" i="0" u="none" strike="noStrike" kern="1200" cap="none" spc="0" normalizeH="0" baseline="0" noProof="0">
+              <a:ln>
+                <a:noFill/>
+              </a:ln>
+              <a:solidFill>
+                <a:prstClr val="white"/>
+              </a:solidFill>
+              <a:effectLst/>
+              <a:uLnTx/>
+              <a:uFillTx/>
+              <a:latin typeface="Aptos" panose="02110004020202020204"/>
+              <a:ea typeface="+mn-ea"/>
+              <a:cs typeface="+mn-cs"/>
+            </a:endParaRPr>
+          </a:p>
+        </p:txBody>
+      </p:sp>
+      <p:sp>
+        <p:nvSpPr>
+          <p:cNvPr id="2" name="Title 1">
+            <a:extLst>
+              <a:ext uri="{FF2B5EF4-FFF2-40B4-BE49-F238E27FC236}">
+                <a16:creationId xmlns:a16="http://schemas.microsoft.com/office/drawing/2014/main" id="{32C432B7-0A6C-2C12-77FA-7B714600B30E}"/>
+              </a:ext>
+            </a:extLst>
+          </p:cNvPr>
+          <p:cNvSpPr>
+            <a:spLocks noGrp="1"/>
+          </p:cNvSpPr>
+          <p:nvPr>
+            <p:ph type="title"/>
+          </p:nvPr>
+        </p:nvSpPr>
+        <p:spPr>
+          <a:xfrm>
+            <a:off x="1136397" y="502020"/>
+            <a:ext cx="5323715" cy="1642970"/>
+          </a:xfrm>
+        </p:spPr>
+        <p:txBody>
+          <a:bodyPr vert="horz" lIns="91440" tIns="45720" rIns="91440" bIns="45720" rtlCol="0" anchor="b">
+            <a:normAutofit/>
+          </a:bodyPr>
+          <a:lstStyle/>
+          <a:p>
+            <a:r>
+              <a:rPr lang="en-PL" sz="4000"/>
+              <a:t>Project improvements</a:t>
+            </a:r>
+            <a:endParaRPr lang="en-US" sz="4000" kern="1200" dirty="0">
+              <a:solidFill>
+                <a:schemeClr val="tx1"/>
+              </a:solidFill>
+              <a:latin typeface="+mj-lt"/>
+              <a:ea typeface="+mj-ea"/>
+              <a:cs typeface="+mj-cs"/>
+            </a:endParaRPr>
+          </a:p>
+        </p:txBody>
+      </p:sp>
+      <p:sp>
+        <p:nvSpPr>
+          <p:cNvPr id="7" name="Content Placeholder 2">
+            <a:extLst>
+              <a:ext uri="{FF2B5EF4-FFF2-40B4-BE49-F238E27FC236}">
+                <a16:creationId xmlns:a16="http://schemas.microsoft.com/office/drawing/2014/main" id="{6E2D6785-3FC0-5B4B-8F43-4406AD91B4D7}"/>
+              </a:ext>
+            </a:extLst>
+          </p:cNvPr>
+          <p:cNvSpPr txBox="1">
+            <a:spLocks/>
+          </p:cNvSpPr>
+          <p:nvPr/>
+        </p:nvSpPr>
+        <p:spPr>
+          <a:xfrm>
+            <a:off x="1144923" y="2405894"/>
+            <a:ext cx="5315189" cy="3535083"/>
+          </a:xfrm>
+          <a:prstGeom prst="rect">
+            <a:avLst/>
+          </a:prstGeom>
+        </p:spPr>
+        <p:txBody>
+          <a:bodyPr vert="horz" lIns="91440" tIns="45720" rIns="91440" bIns="45720" rtlCol="0" anchor="t">
+            <a:normAutofit fontScale="92500" lnSpcReduction="20000"/>
+          </a:bodyPr>
+          <a:lstStyle>
+            <a:lvl1pPr marL="228600" indent="-228600" algn="l" defTabSz="914400" rtl="0" eaLnBrk="1" latinLnBrk="0" hangingPunct="1">
+              <a:lnSpc>
+                <a:spcPct val="90000"/>
+              </a:lnSpc>
+              <a:spcBef>
+                <a:spcPts val="1000"/>
+              </a:spcBef>
+              <a:buFont typeface="Arial" panose="020B0604020202020204" pitchFamily="34" charset="0"/>
+              <a:buChar char="•"/>
+              <a:defRPr sz="2800" kern="1200">
+                <a:solidFill>
+                  <a:schemeClr val="tx1"/>
+                </a:solidFill>
+                <a:latin typeface="+mn-lt"/>
+                <a:ea typeface="+mn-ea"/>
+                <a:cs typeface="+mn-cs"/>
+              </a:defRPr>
+            </a:lvl1pPr>
+            <a:lvl2pPr marL="685800" indent="-228600" algn="l" defTabSz="914400" rtl="0" eaLnBrk="1" latinLnBrk="0" hangingPunct="1">
+              <a:lnSpc>
+                <a:spcPct val="90000"/>
+              </a:lnSpc>
+              <a:spcBef>
+                <a:spcPts val="500"/>
+              </a:spcBef>
+              <a:buFont typeface="Arial" panose="020B0604020202020204" pitchFamily="34" charset="0"/>
+              <a:buChar char="•"/>
+              <a:defRPr sz="2400" kern="1200">
+                <a:solidFill>
+                  <a:schemeClr val="tx1"/>
+                </a:solidFill>
+                <a:latin typeface="+mn-lt"/>
+                <a:ea typeface="+mn-ea"/>
+                <a:cs typeface="+mn-cs"/>
+              </a:defRPr>
+            </a:lvl2pPr>
+            <a:lvl3pPr marL="1143000" indent="-228600" algn="l" defTabSz="914400" rtl="0" eaLnBrk="1" latinLnBrk="0" hangingPunct="1">
+              <a:lnSpc>
+                <a:spcPct val="90000"/>
+              </a:lnSpc>
+              <a:spcBef>
+                <a:spcPts val="500"/>
+              </a:spcBef>
+              <a:buFont typeface="Arial" panose="020B0604020202020204" pitchFamily="34" charset="0"/>
+              <a:buChar char="•"/>
+              <a:defRPr sz="2000" kern="1200">
+                <a:solidFill>
+                  <a:schemeClr val="tx1"/>
+                </a:solidFill>
+                <a:latin typeface="+mn-lt"/>
+                <a:ea typeface="+mn-ea"/>
+                <a:cs typeface="+mn-cs"/>
+              </a:defRPr>
+            </a:lvl3pPr>
+            <a:lvl4pPr marL="1600200" indent="-228600" algn="l" defTabSz="914400" rtl="0" eaLnBrk="1" latinLnBrk="0" hangingPunct="1">
+              <a:lnSpc>
+                <a:spcPct val="90000"/>
+              </a:lnSpc>
+              <a:spcBef>
+                <a:spcPts val="500"/>
+              </a:spcBef>
+              <a:buFont typeface="Arial" panose="020B0604020202020204" pitchFamily="34" charset="0"/>
+              <a:buChar char="•"/>
+              <a:defRPr sz="1800" kern="1200">
+                <a:solidFill>
+                  <a:schemeClr val="tx1"/>
+                </a:solidFill>
+                <a:latin typeface="+mn-lt"/>
+                <a:ea typeface="+mn-ea"/>
+                <a:cs typeface="+mn-cs"/>
+              </a:defRPr>
+            </a:lvl4pPr>
+            <a:lvl5pPr marL="2057400" indent="-228600" algn="l" defTabSz="914400" rtl="0" eaLnBrk="1" latinLnBrk="0" hangingPunct="1">
+              <a:lnSpc>
+                <a:spcPct val="90000"/>
+              </a:lnSpc>
+              <a:spcBef>
+                <a:spcPts val="500"/>
+              </a:spcBef>
+              <a:buFont typeface="Arial" panose="020B0604020202020204" pitchFamily="34" charset="0"/>
+              <a:buChar char="•"/>
+              <a:defRPr sz="1800" kern="1200">
+                <a:solidFill>
+                  <a:schemeClr val="tx1"/>
+                </a:solidFill>
+                <a:latin typeface="+mn-lt"/>
+                <a:ea typeface="+mn-ea"/>
+                <a:cs typeface="+mn-cs"/>
+              </a:defRPr>
+            </a:lvl5pPr>
+            <a:lvl6pPr marL="2514600" indent="-228600" algn="l" defTabSz="914400" rtl="0" eaLnBrk="1" latinLnBrk="0" hangingPunct="1">
+              <a:lnSpc>
+                <a:spcPct val="90000"/>
+              </a:lnSpc>
+              <a:spcBef>
+                <a:spcPts val="500"/>
+              </a:spcBef>
+              <a:buFont typeface="Arial" panose="020B0604020202020204" pitchFamily="34" charset="0"/>
+              <a:buChar char="•"/>
+              <a:defRPr sz="1800" kern="1200">
+                <a:solidFill>
+                  <a:schemeClr val="tx1"/>
+                </a:solidFill>
+                <a:latin typeface="+mn-lt"/>
+                <a:ea typeface="+mn-ea"/>
+                <a:cs typeface="+mn-cs"/>
+              </a:defRPr>
+            </a:lvl6pPr>
+            <a:lvl7pPr marL="2971800" indent="-228600" algn="l" defTabSz="914400" rtl="0" eaLnBrk="1" latinLnBrk="0" hangingPunct="1">
+              <a:lnSpc>
+                <a:spcPct val="90000"/>
+              </a:lnSpc>
+              <a:spcBef>
+                <a:spcPts val="500"/>
+              </a:spcBef>
+              <a:buFont typeface="Arial" panose="020B0604020202020204" pitchFamily="34" charset="0"/>
+              <a:buChar char="•"/>
+              <a:defRPr sz="1800" kern="1200">
+                <a:solidFill>
+                  <a:schemeClr val="tx1"/>
+                </a:solidFill>
+                <a:latin typeface="+mn-lt"/>
+                <a:ea typeface="+mn-ea"/>
+                <a:cs typeface="+mn-cs"/>
+              </a:defRPr>
+            </a:lvl7pPr>
+            <a:lvl8pPr marL="3429000" indent="-228600" algn="l" defTabSz="914400" rtl="0" eaLnBrk="1" latinLnBrk="0" hangingPunct="1">
+              <a:lnSpc>
+                <a:spcPct val="90000"/>
+              </a:lnSpc>
+              <a:spcBef>
+                <a:spcPts val="500"/>
+              </a:spcBef>
+              <a:buFont typeface="Arial" panose="020B0604020202020204" pitchFamily="34" charset="0"/>
+              <a:buChar char="•"/>
+              <a:defRPr sz="1800" kern="1200">
+                <a:solidFill>
+                  <a:schemeClr val="tx1"/>
+                </a:solidFill>
+                <a:latin typeface="+mn-lt"/>
+                <a:ea typeface="+mn-ea"/>
+                <a:cs typeface="+mn-cs"/>
+              </a:defRPr>
+            </a:lvl8pPr>
+            <a:lvl9pPr marL="3886200" indent="-228600" algn="l" defTabSz="914400" rtl="0" eaLnBrk="1" latinLnBrk="0" hangingPunct="1">
+              <a:lnSpc>
+                <a:spcPct val="90000"/>
+              </a:lnSpc>
+              <a:spcBef>
+                <a:spcPts val="500"/>
+              </a:spcBef>
+              <a:buFont typeface="Arial" panose="020B0604020202020204" pitchFamily="34" charset="0"/>
+              <a:buChar char="•"/>
+              <a:defRPr sz="1800" kern="1200">
+                <a:solidFill>
+                  <a:schemeClr val="tx1"/>
+                </a:solidFill>
+                <a:latin typeface="+mn-lt"/>
+                <a:ea typeface="+mn-ea"/>
+                <a:cs typeface="+mn-cs"/>
+              </a:defRPr>
+            </a:lvl9pPr>
+          </a:lstStyle>
+          <a:p>
+            <a:r>
+              <a:rPr lang="en-GB" dirty="0"/>
+              <a:t>Transformed project from python to R</a:t>
+            </a:r>
+          </a:p>
+          <a:p>
+            <a:r>
+              <a:rPr lang="en-PL" dirty="0"/>
+              <a:t>Trained model on complete dataset instead of 5%</a:t>
+            </a:r>
+          </a:p>
+          <a:p>
+            <a:r>
+              <a:rPr lang="en-PL" dirty="0"/>
+              <a:t>Fixed the error of balancing test dataset. Now only train data is balanced, test data follows the distribution of the original dataset.</a:t>
+            </a:r>
+          </a:p>
+          <a:p>
+            <a:r>
+              <a:rPr lang="en-PL" dirty="0"/>
+              <a:t>Implemented Gradient Boosting machine learning model</a:t>
+            </a:r>
+          </a:p>
+        </p:txBody>
+      </p:sp>
+      <p:sp>
+        <p:nvSpPr>
+          <p:cNvPr id="14" name="Rectangle 13">
+            <a:extLst>
+              <a:ext uri="{FF2B5EF4-FFF2-40B4-BE49-F238E27FC236}">
+                <a16:creationId xmlns:a16="http://schemas.microsoft.com/office/drawing/2014/main" id="{7004738A-9D34-43E8-97D2-CA0EED4F8BE0}"/>
+              </a:ext>
+              <a:ext uri="{C183D7F6-B498-43B3-948B-1728B52AA6E4}">
+                <adec:decorative xmlns:adec="http://schemas.microsoft.com/office/drawing/2017/decorative" val="1"/>
+              </a:ext>
+            </a:extLst>
+          </p:cNvPr>
+          <p:cNvSpPr>
+            <a:spLocks noGrp="1" noRot="1" noChangeAspect="1" noMove="1" noResize="1" noEditPoints="1" noAdjustHandles="1" noChangeArrowheads="1" noChangeShapeType="1" noTextEdit="1"/>
+          </p:cNvSpPr>
+          <p:nvPr>
+            <p:extLst>
+              <p:ext uri="{386F3935-93C4-4BCD-93E2-E3B085C9AB24}">
+                <p16:designElem xmlns:p16="http://schemas.microsoft.com/office/powerpoint/2015/main" val="1"/>
+              </p:ext>
+            </p:extLst>
+          </p:nvPr>
+        </p:nvSpPr>
+        <p:spPr>
+          <a:xfrm rot="10800000" flipH="1">
+            <a:off x="8123333" y="-5"/>
+            <a:ext cx="4092521" cy="6858000"/>
+          </a:xfrm>
+          <a:prstGeom prst="rect">
+            <a:avLst/>
+          </a:prstGeom>
+          <a:gradFill>
+            <a:gsLst>
+              <a:gs pos="8000">
+                <a:srgbClr val="000000">
+                  <a:alpha val="94000"/>
+                </a:srgbClr>
+              </a:gs>
+              <a:gs pos="100000">
+                <a:schemeClr val="accent1"/>
+              </a:gs>
+            </a:gsLst>
+            <a:lin ang="2400000" scaled="0"/>
+          </a:gradFill>
+          <a:ln>
+            <a:noFill/>
+          </a:ln>
+        </p:spPr>
+        <p:style>
+          <a:lnRef idx="2">
+            <a:schemeClr val="accent1">
+              <a:shade val="50000"/>
+            </a:schemeClr>
+          </a:lnRef>
+          <a:fillRef idx="1">
+            <a:schemeClr val="accent1"/>
+          </a:fillRef>
+          <a:effectRef idx="0">
+            <a:schemeClr val="accent1"/>
+          </a:effectRef>
+          <a:fontRef idx="minor">
+            <a:schemeClr val="lt1"/>
+          </a:fontRef>
+        </p:style>
+        <p:txBody>
+          <a:bodyPr rtlCol="0" anchor="ctr"/>
+          <a:lstStyle/>
+          <a:p>
+            <a:pPr marL="0" marR="0" lvl="0" indent="0" algn="ctr" defTabSz="914400" rtl="0" eaLnBrk="1" fontAlgn="auto" latinLnBrk="0" hangingPunct="1">
+              <a:lnSpc>
+                <a:spcPct val="100000"/>
+              </a:lnSpc>
+              <a:spcBef>
+                <a:spcPts val="0"/>
+              </a:spcBef>
+              <a:spcAft>
+                <a:spcPts val="0"/>
+              </a:spcAft>
+              <a:buClrTx/>
+              <a:buSzTx/>
+              <a:buFontTx/>
+              <a:buNone/>
+              <a:tabLst/>
+              <a:defRPr/>
+            </a:pPr>
+            <a:endParaRPr kumimoji="0" lang="en-US" sz="1800" b="0" i="0" u="none" strike="noStrike" kern="1200" cap="none" spc="0" normalizeH="0" baseline="0" noProof="0">
+              <a:ln>
+                <a:noFill/>
+              </a:ln>
+              <a:solidFill>
+                <a:prstClr val="white"/>
+              </a:solidFill>
+              <a:effectLst/>
+              <a:uLnTx/>
+              <a:uFillTx/>
+              <a:latin typeface="Aptos" panose="02110004020202020204"/>
+              <a:ea typeface="+mn-ea"/>
+              <a:cs typeface="+mn-cs"/>
+            </a:endParaRPr>
+          </a:p>
+        </p:txBody>
+      </p:sp>
+      <p:sp>
+        <p:nvSpPr>
+          <p:cNvPr id="16" name="Rectangle 15">
+            <a:extLst>
+              <a:ext uri="{FF2B5EF4-FFF2-40B4-BE49-F238E27FC236}">
+                <a16:creationId xmlns:a16="http://schemas.microsoft.com/office/drawing/2014/main" id="{B8B8D07F-F13E-443E-BA68-2D26672D76B9}"/>
+              </a:ext>
+              <a:ext uri="{C183D7F6-B498-43B3-948B-1728B52AA6E4}">
+                <adec:decorative xmlns:adec="http://schemas.microsoft.com/office/drawing/2017/decorative" val="1"/>
+              </a:ext>
+            </a:extLst>
+          </p:cNvPr>
+          <p:cNvSpPr>
+            <a:spLocks noGrp="1" noRot="1" noChangeAspect="1" noMove="1" noResize="1" noEditPoints="1" noAdjustHandles="1" noChangeArrowheads="1" noChangeShapeType="1" noTextEdit="1"/>
+          </p:cNvSpPr>
+          <p:nvPr>
+            <p:extLst>
+              <p:ext uri="{386F3935-93C4-4BCD-93E2-E3B085C9AB24}">
+                <p16:designElem xmlns:p16="http://schemas.microsoft.com/office/powerpoint/2015/main" val="1"/>
+              </p:ext>
+            </p:extLst>
+          </p:nvPr>
+        </p:nvSpPr>
+        <p:spPr>
+          <a:xfrm rot="10800000" flipH="1">
+            <a:off x="8123333" y="-2"/>
+            <a:ext cx="4092521" cy="6400369"/>
+          </a:xfrm>
+          <a:prstGeom prst="rect">
+            <a:avLst/>
+          </a:prstGeom>
+          <a:gradFill>
+            <a:gsLst>
+              <a:gs pos="31000">
+                <a:schemeClr val="accent1">
+                  <a:lumMod val="50000"/>
+                  <a:alpha val="0"/>
+                </a:schemeClr>
+              </a:gs>
+              <a:gs pos="100000">
+                <a:schemeClr val="accent1">
+                  <a:lumMod val="50000"/>
+                  <a:alpha val="26000"/>
+                </a:schemeClr>
+              </a:gs>
+            </a:gsLst>
+            <a:lin ang="18000000" scaled="0"/>
+          </a:gradFill>
+          <a:ln>
+            <a:noFill/>
+          </a:ln>
+        </p:spPr>
+        <p:style>
+          <a:lnRef idx="2">
+            <a:schemeClr val="accent1">
+              <a:shade val="50000"/>
+            </a:schemeClr>
+          </a:lnRef>
+          <a:fillRef idx="1">
+            <a:schemeClr val="accent1"/>
+          </a:fillRef>
+          <a:effectRef idx="0">
+            <a:schemeClr val="accent1"/>
+          </a:effectRef>
+          <a:fontRef idx="minor">
+            <a:schemeClr val="lt1"/>
+          </a:fontRef>
+        </p:style>
+        <p:txBody>
+          <a:bodyPr rtlCol="0" anchor="ctr"/>
+          <a:lstStyle/>
+          <a:p>
+            <a:pPr marL="0" marR="0" lvl="0" indent="0" algn="ctr" defTabSz="914400" rtl="0" eaLnBrk="1" fontAlgn="auto" latinLnBrk="0" hangingPunct="1">
+              <a:lnSpc>
+                <a:spcPct val="100000"/>
+              </a:lnSpc>
+              <a:spcBef>
+                <a:spcPts val="0"/>
+              </a:spcBef>
+              <a:spcAft>
+                <a:spcPts val="0"/>
+              </a:spcAft>
+              <a:buClrTx/>
+              <a:buSzTx/>
+              <a:buFontTx/>
+              <a:buNone/>
+              <a:tabLst/>
+              <a:defRPr/>
+            </a:pPr>
+            <a:endParaRPr kumimoji="0" lang="en-US" sz="1800" b="0" i="0" u="none" strike="noStrike" kern="1200" cap="none" spc="0" normalizeH="0" baseline="0" noProof="0" dirty="0">
+              <a:ln>
+                <a:noFill/>
+              </a:ln>
+              <a:solidFill>
+                <a:prstClr val="white"/>
+              </a:solidFill>
+              <a:effectLst/>
+              <a:uLnTx/>
+              <a:uFillTx/>
+              <a:latin typeface="Aptos" panose="02110004020202020204"/>
+              <a:ea typeface="+mn-ea"/>
+              <a:cs typeface="+mn-cs"/>
+            </a:endParaRPr>
+          </a:p>
+        </p:txBody>
+      </p:sp>
+      <p:sp>
+        <p:nvSpPr>
+          <p:cNvPr id="18" name="Rectangle 17">
+            <a:extLst>
+              <a:ext uri="{FF2B5EF4-FFF2-40B4-BE49-F238E27FC236}">
+                <a16:creationId xmlns:a16="http://schemas.microsoft.com/office/drawing/2014/main" id="{2813A4FA-24A5-41ED-A534-3807D1B2F344}"/>
+              </a:ext>
+              <a:ext uri="{C183D7F6-B498-43B3-948B-1728B52AA6E4}">
+                <adec:decorative xmlns:adec="http://schemas.microsoft.com/office/drawing/2017/decorative" val="1"/>
+              </a:ext>
+            </a:extLst>
+          </p:cNvPr>
+          <p:cNvSpPr>
+            <a:spLocks noGrp="1" noRot="1" noChangeAspect="1" noMove="1" noResize="1" noEditPoints="1" noAdjustHandles="1" noChangeArrowheads="1" noChangeShapeType="1" noTextEdit="1"/>
+          </p:cNvSpPr>
+          <p:nvPr>
+            <p:extLst>
+              <p:ext uri="{386F3935-93C4-4BCD-93E2-E3B085C9AB24}">
+                <p16:designElem xmlns:p16="http://schemas.microsoft.com/office/powerpoint/2015/main" val="1"/>
+              </p:ext>
+            </p:extLst>
+          </p:nvPr>
+        </p:nvSpPr>
+        <p:spPr>
+          <a:xfrm rot="10800000" flipH="1">
+            <a:off x="8123333" y="-22"/>
+            <a:ext cx="4068667" cy="6400389"/>
+          </a:xfrm>
+          <a:prstGeom prst="rect">
+            <a:avLst/>
+          </a:prstGeom>
+          <a:gradFill>
+            <a:gsLst>
+              <a:gs pos="0">
+                <a:schemeClr val="accent1">
+                  <a:alpha val="0"/>
+                </a:schemeClr>
+              </a:gs>
+              <a:gs pos="72000">
+                <a:srgbClr val="000000">
+                  <a:alpha val="21000"/>
+                </a:srgbClr>
+              </a:gs>
+            </a:gsLst>
+            <a:lin ang="3000000" scaled="0"/>
+          </a:gradFill>
+          <a:ln>
+            <a:noFill/>
+          </a:ln>
+        </p:spPr>
+        <p:style>
+          <a:lnRef idx="2">
+            <a:schemeClr val="accent1">
+              <a:shade val="50000"/>
+            </a:schemeClr>
+          </a:lnRef>
+          <a:fillRef idx="1">
+            <a:schemeClr val="accent1"/>
+          </a:fillRef>
+          <a:effectRef idx="0">
+            <a:schemeClr val="accent1"/>
+          </a:effectRef>
+          <a:fontRef idx="minor">
+            <a:schemeClr val="lt1"/>
+          </a:fontRef>
+        </p:style>
+        <p:txBody>
+          <a:bodyPr rtlCol="0" anchor="ctr"/>
+          <a:lstStyle/>
+          <a:p>
+            <a:pPr marL="0" marR="0" lvl="0" indent="0" algn="ctr" defTabSz="914400" rtl="0" eaLnBrk="1" fontAlgn="auto" latinLnBrk="0" hangingPunct="1">
+              <a:lnSpc>
+                <a:spcPct val="100000"/>
+              </a:lnSpc>
+              <a:spcBef>
+                <a:spcPts val="0"/>
+              </a:spcBef>
+              <a:spcAft>
+                <a:spcPts val="0"/>
+              </a:spcAft>
+              <a:buClrTx/>
+              <a:buSzTx/>
+              <a:buFontTx/>
+              <a:buNone/>
+              <a:tabLst/>
+              <a:defRPr/>
+            </a:pPr>
+            <a:endParaRPr kumimoji="0" lang="en-US" sz="1800" b="0" i="0" u="none" strike="noStrike" kern="1200" cap="none" spc="0" normalizeH="0" baseline="0" noProof="0" dirty="0">
+              <a:ln>
+                <a:noFill/>
+              </a:ln>
+              <a:solidFill>
+                <a:prstClr val="white"/>
+              </a:solidFill>
+              <a:effectLst/>
+              <a:uLnTx/>
+              <a:uFillTx/>
+              <a:latin typeface="Aptos" panose="02110004020202020204"/>
+              <a:ea typeface="+mn-ea"/>
+              <a:cs typeface="+mn-cs"/>
+            </a:endParaRPr>
+          </a:p>
+        </p:txBody>
+      </p:sp>
+      <p:sp>
+        <p:nvSpPr>
+          <p:cNvPr id="20" name="Rectangle 19">
+            <a:extLst>
+              <a:ext uri="{FF2B5EF4-FFF2-40B4-BE49-F238E27FC236}">
+                <a16:creationId xmlns:a16="http://schemas.microsoft.com/office/drawing/2014/main" id="{C3944F27-CA70-4E84-A51A-E6BF89558979}"/>
+              </a:ext>
+              <a:ext uri="{C183D7F6-B498-43B3-948B-1728B52AA6E4}">
+                <adec:decorative xmlns:adec="http://schemas.microsoft.com/office/drawing/2017/decorative" val="1"/>
+              </a:ext>
+            </a:extLst>
+          </p:cNvPr>
+          <p:cNvSpPr>
+            <a:spLocks noGrp="1" noRot="1" noChangeAspect="1" noMove="1" noResize="1" noEditPoints="1" noAdjustHandles="1" noChangeArrowheads="1" noChangeShapeType="1" noTextEdit="1"/>
+          </p:cNvSpPr>
+          <p:nvPr>
+            <p:extLst>
+              <p:ext uri="{386F3935-93C4-4BCD-93E2-E3B085C9AB24}">
+                <p16:designElem xmlns:p16="http://schemas.microsoft.com/office/powerpoint/2015/main" val="1"/>
+              </p:ext>
+            </p:extLst>
+          </p:nvPr>
+        </p:nvSpPr>
+        <p:spPr>
+          <a:xfrm rot="10800000" flipH="1">
+            <a:off x="8123333" y="-10"/>
+            <a:ext cx="3611467" cy="6857997"/>
+          </a:xfrm>
+          <a:prstGeom prst="rect">
+            <a:avLst/>
+          </a:prstGeom>
+          <a:gradFill>
+            <a:gsLst>
+              <a:gs pos="0">
+                <a:schemeClr val="accent1">
+                  <a:alpha val="0"/>
+                </a:schemeClr>
+              </a:gs>
+              <a:gs pos="93000">
+                <a:srgbClr val="000000">
+                  <a:alpha val="29000"/>
+                </a:srgbClr>
+              </a:gs>
+            </a:gsLst>
+            <a:lin ang="5400000" scaled="0"/>
+          </a:gradFill>
+          <a:ln>
+            <a:noFill/>
+          </a:ln>
+        </p:spPr>
+        <p:style>
+          <a:lnRef idx="2">
+            <a:schemeClr val="accent1">
+              <a:shade val="50000"/>
+            </a:schemeClr>
+          </a:lnRef>
+          <a:fillRef idx="1">
+            <a:schemeClr val="accent1"/>
+          </a:fillRef>
+          <a:effectRef idx="0">
+            <a:schemeClr val="accent1"/>
+          </a:effectRef>
+          <a:fontRef idx="minor">
+            <a:schemeClr val="lt1"/>
+          </a:fontRef>
+        </p:style>
+        <p:txBody>
+          <a:bodyPr rtlCol="0" anchor="ctr"/>
+          <a:lstStyle/>
+          <a:p>
+            <a:pPr marL="0" marR="0" lvl="0" indent="0" algn="ctr" defTabSz="914400" rtl="0" eaLnBrk="1" fontAlgn="auto" latinLnBrk="0" hangingPunct="1">
+              <a:lnSpc>
+                <a:spcPct val="100000"/>
+              </a:lnSpc>
+              <a:spcBef>
+                <a:spcPts val="0"/>
+              </a:spcBef>
+              <a:spcAft>
+                <a:spcPts val="0"/>
+              </a:spcAft>
+              <a:buClrTx/>
+              <a:buSzTx/>
+              <a:buFontTx/>
+              <a:buNone/>
+              <a:tabLst/>
+              <a:defRPr/>
+            </a:pPr>
+            <a:endParaRPr kumimoji="0" lang="en-US" sz="1800" b="0" i="0" u="none" strike="noStrike" kern="1200" cap="none" spc="0" normalizeH="0" baseline="0" noProof="0" dirty="0">
+              <a:ln>
+                <a:noFill/>
+              </a:ln>
+              <a:solidFill>
+                <a:prstClr val="white"/>
+              </a:solidFill>
+              <a:effectLst/>
+              <a:uLnTx/>
+              <a:uFillTx/>
+              <a:latin typeface="Aptos" panose="02110004020202020204"/>
+              <a:ea typeface="+mn-ea"/>
+              <a:cs typeface="+mn-cs"/>
+            </a:endParaRPr>
+          </a:p>
+        </p:txBody>
+      </p:sp>
+    </p:spTree>
+    <p:extLst>
+      <p:ext uri="{BB962C8B-B14F-4D97-AF65-F5344CB8AC3E}">
+        <p14:creationId xmlns:p14="http://schemas.microsoft.com/office/powerpoint/2010/main" val="3951114197"/>
+      </p:ext>
+    </p:extLst>
+  </p:cSld>
+  <p:clrMapOvr>
+    <a:masterClrMapping/>
+  </p:clrMapOvr>
+</p:sld>
+</file>
+
+<file path=ppt/slides/slide4.xml><?xml version="1.0" encoding="utf-8"?>
+<p:sld xmlns:a="http://schemas.openxmlformats.org/drawingml/2006/main" xmlns:r="http://schemas.openxmlformats.org/officeDocument/2006/relationships" xmlns:p="http://schemas.openxmlformats.org/presentationml/2006/main">
+  <p:cSld>
+    <p:bg>
+      <p:bgPr>
+        <a:solidFill>
+          <a:schemeClr val="bg1"/>
+        </a:solidFill>
+        <a:effectLst/>
+      </p:bgPr>
+    </p:bg>
+    <p:spTree>
+      <p:nvGrpSpPr>
+        <p:cNvPr id="1" name=""/>
+        <p:cNvGrpSpPr/>
+        <p:nvPr/>
+      </p:nvGrpSpPr>
+      <p:grpSpPr>
+        <a:xfrm>
+          <a:off x="0" y="0"/>
+          <a:ext cx="0" cy="0"/>
+          <a:chOff x="0" y="0"/>
+          <a:chExt cx="0" cy="0"/>
+        </a:xfrm>
+      </p:grpSpPr>
+      <p:sp useBgFill="1">
+        <p:nvSpPr>
+          <p:cNvPr id="12" name="Rectangle 11">
+            <a:extLst>
+              <a:ext uri="{FF2B5EF4-FFF2-40B4-BE49-F238E27FC236}">
+                <a16:creationId xmlns:a16="http://schemas.microsoft.com/office/drawing/2014/main" id="{12609869-9E80-471B-A487-A53288E0E791}"/>
+              </a:ext>
+              <a:ext uri="{C183D7F6-B498-43B3-948B-1728B52AA6E4}">
+                <adec:decorative xmlns:adec="http://schemas.microsoft.com/office/drawing/2017/decorative" val="1"/>
+              </a:ext>
+            </a:extLst>
+          </p:cNvPr>
+          <p:cNvSpPr>
+            <a:spLocks noGrp="1" noRot="1" noChangeAspect="1" noMove="1" noResize="1" noEditPoints="1" noAdjustHandles="1" noChangeArrowheads="1" noChangeShapeType="1" noTextEdit="1"/>
+          </p:cNvSpPr>
+          <p:nvPr>
+            <p:extLst>
+              <p:ext uri="{386F3935-93C4-4BCD-93E2-E3B085C9AB24}">
+                <p16:designElem xmlns:p16="http://schemas.microsoft.com/office/powerpoint/2015/main" val="1"/>
+              </p:ext>
+            </p:extLst>
+          </p:nvPr>
+        </p:nvSpPr>
+        <p:spPr>
+          <a:xfrm>
+            <a:off x="0" y="0"/>
+            <a:ext cx="12192000" cy="6858000"/>
+          </a:xfrm>
+          <a:prstGeom prst="rect">
+            <a:avLst/>
+          </a:prstGeom>
+          <a:ln w="12700" cap="flat" cmpd="sng" algn="ctr">
+            <a:noFill/>
+            <a:prstDash val="solid"/>
+            <a:miter lim="800000"/>
+          </a:ln>
+          <a:effectLst/>
+          <a:extLst>
+            <a:ext uri="{91240B29-F687-4F45-9708-019B960494DF}">
+              <a14:hiddenLine xmlns:a14="http://schemas.microsoft.com/office/drawing/2010/main" w="12700" cap="flat" cmpd="sng" algn="ctr">
+                <a:solidFill>
+                  <a:schemeClr val="accent1">
+                    <a:shade val="50000"/>
+                  </a:schemeClr>
+                </a:solidFill>
+                <a:prstDash val="solid"/>
+                <a:miter lim="800000"/>
+              </a14:hiddenLine>
+            </a:ext>
+          </a:extLst>
+        </p:spPr>
+        <p:style>
+          <a:lnRef idx="2">
+            <a:schemeClr val="accent1">
+              <a:shade val="50000"/>
+            </a:schemeClr>
+          </a:lnRef>
+          <a:fillRef idx="1">
+            <a:schemeClr val="accent1"/>
+          </a:fillRef>
+          <a:effectRef idx="0">
+            <a:schemeClr val="accent1"/>
+          </a:effectRef>
+          <a:fontRef idx="minor">
+            <a:schemeClr val="lt1"/>
+          </a:fontRef>
+        </p:style>
+        <p:txBody>
+          <a:bodyPr rtlCol="0" anchor="ctr"/>
+          <a:lstStyle/>
+          <a:p>
+            <a:pPr marL="0" marR="0" lvl="0" indent="0" algn="ctr" defTabSz="914400" rtl="0" eaLnBrk="1" fontAlgn="auto" latinLnBrk="0" hangingPunct="1">
+              <a:lnSpc>
+                <a:spcPct val="100000"/>
+              </a:lnSpc>
+              <a:spcBef>
+                <a:spcPts val="0"/>
+              </a:spcBef>
+              <a:spcAft>
+                <a:spcPts val="0"/>
+              </a:spcAft>
+              <a:buClrTx/>
+              <a:buSzTx/>
+              <a:buFontTx/>
+              <a:buNone/>
+              <a:tabLst/>
+              <a:defRPr/>
+            </a:pPr>
+            <a:endParaRPr kumimoji="0" lang="en-US" sz="1800" b="0" i="0" u="none" strike="noStrike" kern="1200" cap="none" spc="0" normalizeH="0" baseline="0" noProof="0">
+              <a:ln>
+                <a:noFill/>
+              </a:ln>
+              <a:solidFill>
+                <a:prstClr val="white"/>
+              </a:solidFill>
+              <a:effectLst/>
+              <a:uLnTx/>
+              <a:uFillTx/>
+              <a:latin typeface="Aptos" panose="02110004020202020204"/>
+              <a:ea typeface="+mn-ea"/>
+              <a:cs typeface="+mn-cs"/>
+            </a:endParaRPr>
+          </a:p>
+        </p:txBody>
+      </p:sp>
+      <p:sp>
+        <p:nvSpPr>
+          <p:cNvPr id="2" name="Title 1">
+            <a:extLst>
+              <a:ext uri="{FF2B5EF4-FFF2-40B4-BE49-F238E27FC236}">
+                <a16:creationId xmlns:a16="http://schemas.microsoft.com/office/drawing/2014/main" id="{32C432B7-0A6C-2C12-77FA-7B714600B30E}"/>
+              </a:ext>
+            </a:extLst>
+          </p:cNvPr>
+          <p:cNvSpPr>
+            <a:spLocks noGrp="1"/>
+          </p:cNvSpPr>
+          <p:nvPr>
+            <p:ph type="title"/>
+          </p:nvPr>
+        </p:nvSpPr>
+        <p:spPr>
+          <a:xfrm>
+            <a:off x="1136397" y="502020"/>
+            <a:ext cx="5323715" cy="1642970"/>
+          </a:xfrm>
+        </p:spPr>
+        <p:txBody>
+          <a:bodyPr vert="horz" lIns="91440" tIns="45720" rIns="91440" bIns="45720" rtlCol="0" anchor="b">
+            <a:normAutofit/>
+          </a:bodyPr>
+          <a:lstStyle/>
+          <a:p>
+            <a:r>
+              <a:rPr lang="en-PL" sz="4000" dirty="0"/>
+              <a:t>Project improvements</a:t>
+            </a:r>
+            <a:endParaRPr lang="en-US" sz="4000" kern="1200" dirty="0">
+              <a:solidFill>
+                <a:schemeClr val="tx1"/>
+              </a:solidFill>
+              <a:latin typeface="+mj-lt"/>
+              <a:ea typeface="+mj-ea"/>
+              <a:cs typeface="+mj-cs"/>
+            </a:endParaRPr>
+          </a:p>
+        </p:txBody>
+      </p:sp>
+      <p:sp>
+        <p:nvSpPr>
+          <p:cNvPr id="7" name="Content Placeholder 2">
+            <a:extLst>
+              <a:ext uri="{FF2B5EF4-FFF2-40B4-BE49-F238E27FC236}">
+                <a16:creationId xmlns:a16="http://schemas.microsoft.com/office/drawing/2014/main" id="{6E2D6785-3FC0-5B4B-8F43-4406AD91B4D7}"/>
+              </a:ext>
+            </a:extLst>
+          </p:cNvPr>
+          <p:cNvSpPr txBox="1">
+            <a:spLocks/>
+          </p:cNvSpPr>
+          <p:nvPr/>
+        </p:nvSpPr>
+        <p:spPr>
+          <a:xfrm>
+            <a:off x="1144923" y="2405894"/>
+            <a:ext cx="5315189" cy="3535083"/>
+          </a:xfrm>
+          <a:prstGeom prst="rect">
+            <a:avLst/>
+          </a:prstGeom>
+        </p:spPr>
+        <p:txBody>
+          <a:bodyPr vert="horz" lIns="91440" tIns="45720" rIns="91440" bIns="45720" rtlCol="0" anchor="t">
+            <a:normAutofit fontScale="85000" lnSpcReduction="20000"/>
+          </a:bodyPr>
+          <a:lstStyle>
+            <a:lvl1pPr marL="228600" indent="-228600" algn="l" defTabSz="914400" rtl="0" eaLnBrk="1" latinLnBrk="0" hangingPunct="1">
+              <a:lnSpc>
+                <a:spcPct val="90000"/>
+              </a:lnSpc>
+              <a:spcBef>
+                <a:spcPts val="1000"/>
+              </a:spcBef>
+              <a:buFont typeface="Arial" panose="020B0604020202020204" pitchFamily="34" charset="0"/>
+              <a:buChar char="•"/>
+              <a:defRPr sz="2800" kern="1200">
+                <a:solidFill>
+                  <a:schemeClr val="tx1"/>
+                </a:solidFill>
+                <a:latin typeface="+mn-lt"/>
+                <a:ea typeface="+mn-ea"/>
+                <a:cs typeface="+mn-cs"/>
+              </a:defRPr>
+            </a:lvl1pPr>
+            <a:lvl2pPr marL="685800" indent="-228600" algn="l" defTabSz="914400" rtl="0" eaLnBrk="1" latinLnBrk="0" hangingPunct="1">
+              <a:lnSpc>
+                <a:spcPct val="90000"/>
+              </a:lnSpc>
+              <a:spcBef>
+                <a:spcPts val="500"/>
+              </a:spcBef>
+              <a:buFont typeface="Arial" panose="020B0604020202020204" pitchFamily="34" charset="0"/>
+              <a:buChar char="•"/>
+              <a:defRPr sz="2400" kern="1200">
+                <a:solidFill>
+                  <a:schemeClr val="tx1"/>
+                </a:solidFill>
+                <a:latin typeface="+mn-lt"/>
+                <a:ea typeface="+mn-ea"/>
+                <a:cs typeface="+mn-cs"/>
+              </a:defRPr>
+            </a:lvl2pPr>
+            <a:lvl3pPr marL="1143000" indent="-228600" algn="l" defTabSz="914400" rtl="0" eaLnBrk="1" latinLnBrk="0" hangingPunct="1">
+              <a:lnSpc>
+                <a:spcPct val="90000"/>
+              </a:lnSpc>
+              <a:spcBef>
+                <a:spcPts val="500"/>
+              </a:spcBef>
+              <a:buFont typeface="Arial" panose="020B0604020202020204" pitchFamily="34" charset="0"/>
+              <a:buChar char="•"/>
+              <a:defRPr sz="2000" kern="1200">
+                <a:solidFill>
+                  <a:schemeClr val="tx1"/>
+                </a:solidFill>
+                <a:latin typeface="+mn-lt"/>
+                <a:ea typeface="+mn-ea"/>
+                <a:cs typeface="+mn-cs"/>
+              </a:defRPr>
+            </a:lvl3pPr>
+            <a:lvl4pPr marL="1600200" indent="-228600" algn="l" defTabSz="914400" rtl="0" eaLnBrk="1" latinLnBrk="0" hangingPunct="1">
+              <a:lnSpc>
+                <a:spcPct val="90000"/>
+              </a:lnSpc>
+              <a:spcBef>
+                <a:spcPts val="500"/>
+              </a:spcBef>
+              <a:buFont typeface="Arial" panose="020B0604020202020204" pitchFamily="34" charset="0"/>
+              <a:buChar char="•"/>
+              <a:defRPr sz="1800" kern="1200">
+                <a:solidFill>
+                  <a:schemeClr val="tx1"/>
+                </a:solidFill>
+                <a:latin typeface="+mn-lt"/>
+                <a:ea typeface="+mn-ea"/>
+                <a:cs typeface="+mn-cs"/>
+              </a:defRPr>
+            </a:lvl4pPr>
+            <a:lvl5pPr marL="2057400" indent="-228600" algn="l" defTabSz="914400" rtl="0" eaLnBrk="1" latinLnBrk="0" hangingPunct="1">
+              <a:lnSpc>
+                <a:spcPct val="90000"/>
+              </a:lnSpc>
+              <a:spcBef>
+                <a:spcPts val="500"/>
+              </a:spcBef>
+              <a:buFont typeface="Arial" panose="020B0604020202020204" pitchFamily="34" charset="0"/>
+              <a:buChar char="•"/>
+              <a:defRPr sz="1800" kern="1200">
+                <a:solidFill>
+                  <a:schemeClr val="tx1"/>
+                </a:solidFill>
+                <a:latin typeface="+mn-lt"/>
+                <a:ea typeface="+mn-ea"/>
+                <a:cs typeface="+mn-cs"/>
+              </a:defRPr>
+            </a:lvl5pPr>
+            <a:lvl6pPr marL="2514600" indent="-228600" algn="l" defTabSz="914400" rtl="0" eaLnBrk="1" latinLnBrk="0" hangingPunct="1">
+              <a:lnSpc>
+                <a:spcPct val="90000"/>
+              </a:lnSpc>
+              <a:spcBef>
+                <a:spcPts val="500"/>
+              </a:spcBef>
+              <a:buFont typeface="Arial" panose="020B0604020202020204" pitchFamily="34" charset="0"/>
+              <a:buChar char="•"/>
+              <a:defRPr sz="1800" kern="1200">
+                <a:solidFill>
+                  <a:schemeClr val="tx1"/>
+                </a:solidFill>
+                <a:latin typeface="+mn-lt"/>
+                <a:ea typeface="+mn-ea"/>
+                <a:cs typeface="+mn-cs"/>
+              </a:defRPr>
+            </a:lvl6pPr>
+            <a:lvl7pPr marL="2971800" indent="-228600" algn="l" defTabSz="914400" rtl="0" eaLnBrk="1" latinLnBrk="0" hangingPunct="1">
+              <a:lnSpc>
+                <a:spcPct val="90000"/>
+              </a:lnSpc>
+              <a:spcBef>
+                <a:spcPts val="500"/>
+              </a:spcBef>
+              <a:buFont typeface="Arial" panose="020B0604020202020204" pitchFamily="34" charset="0"/>
+              <a:buChar char="•"/>
+              <a:defRPr sz="1800" kern="1200">
+                <a:solidFill>
+                  <a:schemeClr val="tx1"/>
+                </a:solidFill>
+                <a:latin typeface="+mn-lt"/>
+                <a:ea typeface="+mn-ea"/>
+                <a:cs typeface="+mn-cs"/>
+              </a:defRPr>
+            </a:lvl7pPr>
+            <a:lvl8pPr marL="3429000" indent="-228600" algn="l" defTabSz="914400" rtl="0" eaLnBrk="1" latinLnBrk="0" hangingPunct="1">
+              <a:lnSpc>
+                <a:spcPct val="90000"/>
+              </a:lnSpc>
+              <a:spcBef>
+                <a:spcPts val="500"/>
+              </a:spcBef>
+              <a:buFont typeface="Arial" panose="020B0604020202020204" pitchFamily="34" charset="0"/>
+              <a:buChar char="•"/>
+              <a:defRPr sz="1800" kern="1200">
+                <a:solidFill>
+                  <a:schemeClr val="tx1"/>
+                </a:solidFill>
+                <a:latin typeface="+mn-lt"/>
+                <a:ea typeface="+mn-ea"/>
+                <a:cs typeface="+mn-cs"/>
+              </a:defRPr>
+            </a:lvl8pPr>
+            <a:lvl9pPr marL="3886200" indent="-228600" algn="l" defTabSz="914400" rtl="0" eaLnBrk="1" latinLnBrk="0" hangingPunct="1">
+              <a:lnSpc>
+                <a:spcPct val="90000"/>
+              </a:lnSpc>
+              <a:spcBef>
+                <a:spcPts val="500"/>
+              </a:spcBef>
+              <a:buFont typeface="Arial" panose="020B0604020202020204" pitchFamily="34" charset="0"/>
+              <a:buChar char="•"/>
+              <a:defRPr sz="1800" kern="1200">
+                <a:solidFill>
+                  <a:schemeClr val="tx1"/>
+                </a:solidFill>
+                <a:latin typeface="+mn-lt"/>
+                <a:ea typeface="+mn-ea"/>
+                <a:cs typeface="+mn-cs"/>
+              </a:defRPr>
+            </a:lvl9pPr>
+          </a:lstStyle>
+          <a:p>
+            <a:r>
+              <a:rPr lang="en-GB" dirty="0">
+                <a:solidFill>
+                  <a:srgbClr val="000000"/>
+                </a:solidFill>
+                <a:effectLst/>
+                <a:latin typeface="Menlo" panose="020B0609030804020204" pitchFamily="49" charset="0"/>
+              </a:rPr>
+              <a:t>Added library verification as dependency and fixed versions of libraries</a:t>
+            </a:r>
+          </a:p>
+          <a:p>
+            <a:r>
+              <a:rPr lang="en-GB" dirty="0">
+                <a:solidFill>
+                  <a:srgbClr val="000000"/>
+                </a:solidFill>
+                <a:latin typeface="Menlo" panose="020B0609030804020204" pitchFamily="49" charset="0"/>
+              </a:rPr>
+              <a:t>E</a:t>
+            </a:r>
+            <a:r>
+              <a:rPr lang="en-GB" dirty="0">
+                <a:solidFill>
+                  <a:srgbClr val="000000"/>
+                </a:solidFill>
+                <a:effectLst/>
+                <a:latin typeface="Menlo" panose="020B0609030804020204" pitchFamily="49" charset="0"/>
+              </a:rPr>
+              <a:t>nsured data is loaded from UCI repo (original site where dataset was uploaded) instead of Kaggle</a:t>
+            </a:r>
+          </a:p>
+          <a:p>
+            <a:r>
+              <a:rPr lang="en-GB" dirty="0">
+                <a:solidFill>
+                  <a:srgbClr val="000000"/>
+                </a:solidFill>
+                <a:effectLst/>
+                <a:latin typeface="Menlo" panose="020B0609030804020204" pitchFamily="49" charset="0"/>
+              </a:rPr>
+              <a:t>Fixed the seed</a:t>
+            </a:r>
+          </a:p>
+          <a:p>
+            <a:r>
+              <a:rPr lang="en-PL" dirty="0">
+                <a:solidFill>
+                  <a:srgbClr val="000000"/>
+                </a:solidFill>
+                <a:latin typeface="Menlo" panose="020B0609030804020204" pitchFamily="49" charset="0"/>
+              </a:rPr>
+              <a:t>Implemented code comments to provide code narration</a:t>
+            </a:r>
+          </a:p>
+        </p:txBody>
+      </p:sp>
+      <p:sp>
+        <p:nvSpPr>
+          <p:cNvPr id="14" name="Rectangle 13">
+            <a:extLst>
+              <a:ext uri="{FF2B5EF4-FFF2-40B4-BE49-F238E27FC236}">
+                <a16:creationId xmlns:a16="http://schemas.microsoft.com/office/drawing/2014/main" id="{7004738A-9D34-43E8-97D2-CA0EED4F8BE0}"/>
+              </a:ext>
+              <a:ext uri="{C183D7F6-B498-43B3-948B-1728B52AA6E4}">
+                <adec:decorative xmlns:adec="http://schemas.microsoft.com/office/drawing/2017/decorative" val="1"/>
+              </a:ext>
+            </a:extLst>
+          </p:cNvPr>
+          <p:cNvSpPr>
+            <a:spLocks noGrp="1" noRot="1" noChangeAspect="1" noMove="1" noResize="1" noEditPoints="1" noAdjustHandles="1" noChangeArrowheads="1" noChangeShapeType="1" noTextEdit="1"/>
+          </p:cNvSpPr>
+          <p:nvPr>
+            <p:extLst>
+              <p:ext uri="{386F3935-93C4-4BCD-93E2-E3B085C9AB24}">
+                <p16:designElem xmlns:p16="http://schemas.microsoft.com/office/powerpoint/2015/main" val="1"/>
+              </p:ext>
+            </p:extLst>
+          </p:nvPr>
+        </p:nvSpPr>
+        <p:spPr>
+          <a:xfrm rot="10800000" flipH="1">
+            <a:off x="8123333" y="-5"/>
+            <a:ext cx="4092521" cy="6858000"/>
+          </a:xfrm>
+          <a:prstGeom prst="rect">
+            <a:avLst/>
+          </a:prstGeom>
+          <a:gradFill>
+            <a:gsLst>
+              <a:gs pos="8000">
+                <a:srgbClr val="000000">
+                  <a:alpha val="94000"/>
+                </a:srgbClr>
+              </a:gs>
+              <a:gs pos="100000">
+                <a:schemeClr val="accent1"/>
+              </a:gs>
+            </a:gsLst>
+            <a:lin ang="2400000" scaled="0"/>
+          </a:gradFill>
+          <a:ln>
+            <a:noFill/>
+          </a:ln>
+        </p:spPr>
+        <p:style>
+          <a:lnRef idx="2">
+            <a:schemeClr val="accent1">
+              <a:shade val="50000"/>
+            </a:schemeClr>
+          </a:lnRef>
+          <a:fillRef idx="1">
+            <a:schemeClr val="accent1"/>
+          </a:fillRef>
+          <a:effectRef idx="0">
+            <a:schemeClr val="accent1"/>
+          </a:effectRef>
+          <a:fontRef idx="minor">
+            <a:schemeClr val="lt1"/>
+          </a:fontRef>
+        </p:style>
+        <p:txBody>
+          <a:bodyPr rtlCol="0" anchor="ctr"/>
+          <a:lstStyle/>
+          <a:p>
+            <a:pPr marL="0" marR="0" lvl="0" indent="0" algn="ctr" defTabSz="914400" rtl="0" eaLnBrk="1" fontAlgn="auto" latinLnBrk="0" hangingPunct="1">
+              <a:lnSpc>
+                <a:spcPct val="100000"/>
+              </a:lnSpc>
+              <a:spcBef>
+                <a:spcPts val="0"/>
+              </a:spcBef>
+              <a:spcAft>
+                <a:spcPts val="0"/>
+              </a:spcAft>
+              <a:buClrTx/>
+              <a:buSzTx/>
+              <a:buFontTx/>
+              <a:buNone/>
+              <a:tabLst/>
+              <a:defRPr/>
+            </a:pPr>
+            <a:endParaRPr kumimoji="0" lang="en-US" sz="1800" b="0" i="0" u="none" strike="noStrike" kern="1200" cap="none" spc="0" normalizeH="0" baseline="0" noProof="0">
+              <a:ln>
+                <a:noFill/>
+              </a:ln>
+              <a:solidFill>
+                <a:prstClr val="white"/>
+              </a:solidFill>
+              <a:effectLst/>
+              <a:uLnTx/>
+              <a:uFillTx/>
+              <a:latin typeface="Aptos" panose="02110004020202020204"/>
+              <a:ea typeface="+mn-ea"/>
+              <a:cs typeface="+mn-cs"/>
+            </a:endParaRPr>
+          </a:p>
+        </p:txBody>
+      </p:sp>
+      <p:sp>
+        <p:nvSpPr>
+          <p:cNvPr id="16" name="Rectangle 15">
+            <a:extLst>
+              <a:ext uri="{FF2B5EF4-FFF2-40B4-BE49-F238E27FC236}">
+                <a16:creationId xmlns:a16="http://schemas.microsoft.com/office/drawing/2014/main" id="{B8B8D07F-F13E-443E-BA68-2D26672D76B9}"/>
+              </a:ext>
+              <a:ext uri="{C183D7F6-B498-43B3-948B-1728B52AA6E4}">
+                <adec:decorative xmlns:adec="http://schemas.microsoft.com/office/drawing/2017/decorative" val="1"/>
+              </a:ext>
+            </a:extLst>
+          </p:cNvPr>
+          <p:cNvSpPr>
+            <a:spLocks noGrp="1" noRot="1" noChangeAspect="1" noMove="1" noResize="1" noEditPoints="1" noAdjustHandles="1" noChangeArrowheads="1" noChangeShapeType="1" noTextEdit="1"/>
+          </p:cNvSpPr>
+          <p:nvPr>
+            <p:extLst>
+              <p:ext uri="{386F3935-93C4-4BCD-93E2-E3B085C9AB24}">
+                <p16:designElem xmlns:p16="http://schemas.microsoft.com/office/powerpoint/2015/main" val="1"/>
+              </p:ext>
+            </p:extLst>
+          </p:nvPr>
+        </p:nvSpPr>
+        <p:spPr>
+          <a:xfrm rot="10800000" flipH="1">
+            <a:off x="8123333" y="-2"/>
+            <a:ext cx="4092521" cy="6400369"/>
+          </a:xfrm>
+          <a:prstGeom prst="rect">
+            <a:avLst/>
+          </a:prstGeom>
+          <a:gradFill>
+            <a:gsLst>
+              <a:gs pos="31000">
+                <a:schemeClr val="accent1">
+                  <a:lumMod val="50000"/>
+                  <a:alpha val="0"/>
+                </a:schemeClr>
+              </a:gs>
+              <a:gs pos="100000">
+                <a:schemeClr val="accent1">
+                  <a:lumMod val="50000"/>
+                  <a:alpha val="26000"/>
+                </a:schemeClr>
+              </a:gs>
+            </a:gsLst>
+            <a:lin ang="18000000" scaled="0"/>
+          </a:gradFill>
+          <a:ln>
+            <a:noFill/>
+          </a:ln>
+        </p:spPr>
+        <p:style>
+          <a:lnRef idx="2">
+            <a:schemeClr val="accent1">
+              <a:shade val="50000"/>
+            </a:schemeClr>
+          </a:lnRef>
+          <a:fillRef idx="1">
+            <a:schemeClr val="accent1"/>
+          </a:fillRef>
+          <a:effectRef idx="0">
+            <a:schemeClr val="accent1"/>
+          </a:effectRef>
+          <a:fontRef idx="minor">
+            <a:schemeClr val="lt1"/>
+          </a:fontRef>
+        </p:style>
+        <p:txBody>
+          <a:bodyPr rtlCol="0" anchor="ctr"/>
+          <a:lstStyle/>
+          <a:p>
+            <a:pPr marL="0" marR="0" lvl="0" indent="0" algn="ctr" defTabSz="914400" rtl="0" eaLnBrk="1" fontAlgn="auto" latinLnBrk="0" hangingPunct="1">
+              <a:lnSpc>
+                <a:spcPct val="100000"/>
+              </a:lnSpc>
+              <a:spcBef>
+                <a:spcPts val="0"/>
+              </a:spcBef>
+              <a:spcAft>
+                <a:spcPts val="0"/>
+              </a:spcAft>
+              <a:buClrTx/>
+              <a:buSzTx/>
+              <a:buFontTx/>
+              <a:buNone/>
+              <a:tabLst/>
+              <a:defRPr/>
+            </a:pPr>
+            <a:endParaRPr kumimoji="0" lang="en-US" sz="1800" b="0" i="0" u="none" strike="noStrike" kern="1200" cap="none" spc="0" normalizeH="0" baseline="0" noProof="0" dirty="0">
+              <a:ln>
+                <a:noFill/>
+              </a:ln>
+              <a:solidFill>
+                <a:prstClr val="white"/>
+              </a:solidFill>
+              <a:effectLst/>
+              <a:uLnTx/>
+              <a:uFillTx/>
+              <a:latin typeface="Aptos" panose="02110004020202020204"/>
+              <a:ea typeface="+mn-ea"/>
+              <a:cs typeface="+mn-cs"/>
+            </a:endParaRPr>
+          </a:p>
+        </p:txBody>
+      </p:sp>
+      <p:sp>
+        <p:nvSpPr>
+          <p:cNvPr id="18" name="Rectangle 17">
+            <a:extLst>
+              <a:ext uri="{FF2B5EF4-FFF2-40B4-BE49-F238E27FC236}">
+                <a16:creationId xmlns:a16="http://schemas.microsoft.com/office/drawing/2014/main" id="{2813A4FA-24A5-41ED-A534-3807D1B2F344}"/>
+              </a:ext>
+              <a:ext uri="{C183D7F6-B498-43B3-948B-1728B52AA6E4}">
+                <adec:decorative xmlns:adec="http://schemas.microsoft.com/office/drawing/2017/decorative" val="1"/>
+              </a:ext>
+            </a:extLst>
+          </p:cNvPr>
+          <p:cNvSpPr>
+            <a:spLocks noGrp="1" noRot="1" noChangeAspect="1" noMove="1" noResize="1" noEditPoints="1" noAdjustHandles="1" noChangeArrowheads="1" noChangeShapeType="1" noTextEdit="1"/>
+          </p:cNvSpPr>
+          <p:nvPr>
+            <p:extLst>
+              <p:ext uri="{386F3935-93C4-4BCD-93E2-E3B085C9AB24}">
+                <p16:designElem xmlns:p16="http://schemas.microsoft.com/office/powerpoint/2015/main" val="1"/>
+              </p:ext>
+            </p:extLst>
+          </p:nvPr>
+        </p:nvSpPr>
+        <p:spPr>
+          <a:xfrm rot="10800000" flipH="1">
+            <a:off x="8123333" y="-22"/>
+            <a:ext cx="4068667" cy="6400389"/>
+          </a:xfrm>
+          <a:prstGeom prst="rect">
+            <a:avLst/>
+          </a:prstGeom>
+          <a:gradFill>
+            <a:gsLst>
+              <a:gs pos="0">
+                <a:schemeClr val="accent1">
+                  <a:alpha val="0"/>
+                </a:schemeClr>
+              </a:gs>
+              <a:gs pos="72000">
+                <a:srgbClr val="000000">
+                  <a:alpha val="21000"/>
+                </a:srgbClr>
+              </a:gs>
+            </a:gsLst>
+            <a:lin ang="3000000" scaled="0"/>
+          </a:gradFill>
+          <a:ln>
+            <a:noFill/>
+          </a:ln>
+        </p:spPr>
+        <p:style>
+          <a:lnRef idx="2">
+            <a:schemeClr val="accent1">
+              <a:shade val="50000"/>
+            </a:schemeClr>
+          </a:lnRef>
+          <a:fillRef idx="1">
+            <a:schemeClr val="accent1"/>
+          </a:fillRef>
+          <a:effectRef idx="0">
+            <a:schemeClr val="accent1"/>
+          </a:effectRef>
+          <a:fontRef idx="minor">
+            <a:schemeClr val="lt1"/>
+          </a:fontRef>
+        </p:style>
+        <p:txBody>
+          <a:bodyPr rtlCol="0" anchor="ctr"/>
+          <a:lstStyle/>
+          <a:p>
+            <a:pPr marL="0" marR="0" lvl="0" indent="0" algn="ctr" defTabSz="914400" rtl="0" eaLnBrk="1" fontAlgn="auto" latinLnBrk="0" hangingPunct="1">
+              <a:lnSpc>
+                <a:spcPct val="100000"/>
+              </a:lnSpc>
+              <a:spcBef>
+                <a:spcPts val="0"/>
+              </a:spcBef>
+              <a:spcAft>
+                <a:spcPts val="0"/>
+              </a:spcAft>
+              <a:buClrTx/>
+              <a:buSzTx/>
+              <a:buFontTx/>
+              <a:buNone/>
+              <a:tabLst/>
+              <a:defRPr/>
+            </a:pPr>
+            <a:endParaRPr kumimoji="0" lang="en-US" sz="1800" b="0" i="0" u="none" strike="noStrike" kern="1200" cap="none" spc="0" normalizeH="0" baseline="0" noProof="0" dirty="0">
+              <a:ln>
+                <a:noFill/>
+              </a:ln>
+              <a:solidFill>
+                <a:prstClr val="white"/>
+              </a:solidFill>
+              <a:effectLst/>
+              <a:uLnTx/>
+              <a:uFillTx/>
+              <a:latin typeface="Aptos" panose="02110004020202020204"/>
+              <a:ea typeface="+mn-ea"/>
+              <a:cs typeface="+mn-cs"/>
+            </a:endParaRPr>
+          </a:p>
+        </p:txBody>
+      </p:sp>
+      <p:sp>
+        <p:nvSpPr>
+          <p:cNvPr id="20" name="Rectangle 19">
+            <a:extLst>
+              <a:ext uri="{FF2B5EF4-FFF2-40B4-BE49-F238E27FC236}">
+                <a16:creationId xmlns:a16="http://schemas.microsoft.com/office/drawing/2014/main" id="{C3944F27-CA70-4E84-A51A-E6BF89558979}"/>
+              </a:ext>
+              <a:ext uri="{C183D7F6-B498-43B3-948B-1728B52AA6E4}">
+                <adec:decorative xmlns:adec="http://schemas.microsoft.com/office/drawing/2017/decorative" val="1"/>
+              </a:ext>
+            </a:extLst>
+          </p:cNvPr>
+          <p:cNvSpPr>
+            <a:spLocks noGrp="1" noRot="1" noChangeAspect="1" noMove="1" noResize="1" noEditPoints="1" noAdjustHandles="1" noChangeArrowheads="1" noChangeShapeType="1" noTextEdit="1"/>
+          </p:cNvSpPr>
+          <p:nvPr>
+            <p:extLst>
+              <p:ext uri="{386F3935-93C4-4BCD-93E2-E3B085C9AB24}">
+                <p16:designElem xmlns:p16="http://schemas.microsoft.com/office/powerpoint/2015/main" val="1"/>
+              </p:ext>
+            </p:extLst>
+          </p:nvPr>
+        </p:nvSpPr>
+        <p:spPr>
+          <a:xfrm rot="10800000" flipH="1">
+            <a:off x="8123333" y="-10"/>
+            <a:ext cx="3611467" cy="6857997"/>
+          </a:xfrm>
+          <a:prstGeom prst="rect">
+            <a:avLst/>
+          </a:prstGeom>
+          <a:gradFill>
+            <a:gsLst>
+              <a:gs pos="0">
+                <a:schemeClr val="accent1">
+                  <a:alpha val="0"/>
+                </a:schemeClr>
+              </a:gs>
+              <a:gs pos="93000">
+                <a:srgbClr val="000000">
+                  <a:alpha val="29000"/>
+                </a:srgbClr>
+              </a:gs>
+            </a:gsLst>
+            <a:lin ang="5400000" scaled="0"/>
+          </a:gradFill>
+          <a:ln>
+            <a:noFill/>
+          </a:ln>
+        </p:spPr>
+        <p:style>
+          <a:lnRef idx="2">
+            <a:schemeClr val="accent1">
+              <a:shade val="50000"/>
+            </a:schemeClr>
+          </a:lnRef>
+          <a:fillRef idx="1">
+            <a:schemeClr val="accent1"/>
+          </a:fillRef>
+          <a:effectRef idx="0">
+            <a:schemeClr val="accent1"/>
+          </a:effectRef>
+          <a:fontRef idx="minor">
+            <a:schemeClr val="lt1"/>
+          </a:fontRef>
+        </p:style>
+        <p:txBody>
+          <a:bodyPr rtlCol="0" anchor="ctr"/>
+          <a:lstStyle/>
+          <a:p>
+            <a:pPr marL="0" marR="0" lvl="0" indent="0" algn="ctr" defTabSz="914400" rtl="0" eaLnBrk="1" fontAlgn="auto" latinLnBrk="0" hangingPunct="1">
+              <a:lnSpc>
+                <a:spcPct val="100000"/>
+              </a:lnSpc>
+              <a:spcBef>
+                <a:spcPts val="0"/>
+              </a:spcBef>
+              <a:spcAft>
+                <a:spcPts val="0"/>
+              </a:spcAft>
+              <a:buClrTx/>
+              <a:buSzTx/>
+              <a:buFontTx/>
+              <a:buNone/>
+              <a:tabLst/>
+              <a:defRPr/>
+            </a:pPr>
+            <a:endParaRPr kumimoji="0" lang="en-US" sz="1800" b="0" i="0" u="none" strike="noStrike" kern="1200" cap="none" spc="0" normalizeH="0" baseline="0" noProof="0" dirty="0">
+              <a:ln>
+                <a:noFill/>
+              </a:ln>
+              <a:solidFill>
+                <a:prstClr val="white"/>
+              </a:solidFill>
+              <a:effectLst/>
+              <a:uLnTx/>
+              <a:uFillTx/>
+              <a:latin typeface="Aptos" panose="02110004020202020204"/>
+              <a:ea typeface="+mn-ea"/>
+              <a:cs typeface="+mn-cs"/>
+            </a:endParaRPr>
+          </a:p>
+        </p:txBody>
+      </p:sp>
+    </p:spTree>
+    <p:extLst>
+      <p:ext uri="{BB962C8B-B14F-4D97-AF65-F5344CB8AC3E}">
+        <p14:creationId xmlns:p14="http://schemas.microsoft.com/office/powerpoint/2010/main" val="1598610406"/>
+      </p:ext>
+    </p:extLst>
+  </p:cSld>
+  <p:clrMapOvr>
+    <a:masterClrMapping/>
+  </p:clrMapOvr>
+</p:sld>
+</file>
+
+<file path=ppt/slides/slide5.xml><?xml version="1.0" encoding="utf-8"?>
+<p:sld xmlns:a="http://schemas.openxmlformats.org/drawingml/2006/main" xmlns:r="http://schemas.openxmlformats.org/officeDocument/2006/relationships" xmlns:p="http://schemas.openxmlformats.org/presentationml/2006/main">
+  <p:cSld>
+    <p:bg>
+      <p:bgPr>
+        <a:solidFill>
+          <a:schemeClr val="bg1"/>
+        </a:solidFill>
+        <a:effectLst/>
+      </p:bgPr>
+    </p:bg>
+    <p:spTree>
+      <p:nvGrpSpPr>
+        <p:cNvPr id="1" name=""/>
+        <p:cNvGrpSpPr/>
+        <p:nvPr/>
+      </p:nvGrpSpPr>
+      <p:grpSpPr>
+        <a:xfrm>
+          <a:off x="0" y="0"/>
+          <a:ext cx="0" cy="0"/>
+          <a:chOff x="0" y="0"/>
+          <a:chExt cx="0" cy="0"/>
+        </a:xfrm>
+      </p:grpSpPr>
+      <p:sp useBgFill="1">
+        <p:nvSpPr>
+          <p:cNvPr id="12" name="Rectangle 11">
+            <a:extLst>
+              <a:ext uri="{FF2B5EF4-FFF2-40B4-BE49-F238E27FC236}">
+                <a16:creationId xmlns:a16="http://schemas.microsoft.com/office/drawing/2014/main" id="{12609869-9E80-471B-A487-A53288E0E791}"/>
+              </a:ext>
+              <a:ext uri="{C183D7F6-B498-43B3-948B-1728B52AA6E4}">
+                <adec:decorative xmlns:adec="http://schemas.microsoft.com/office/drawing/2017/decorative" val="1"/>
+              </a:ext>
+            </a:extLst>
+          </p:cNvPr>
+          <p:cNvSpPr>
+            <a:spLocks noGrp="1" noRot="1" noChangeAspect="1" noMove="1" noResize="1" noEditPoints="1" noAdjustHandles="1" noChangeArrowheads="1" noChangeShapeType="1" noTextEdit="1"/>
+          </p:cNvSpPr>
+          <p:nvPr>
+            <p:extLst>
+              <p:ext uri="{386F3935-93C4-4BCD-93E2-E3B085C9AB24}">
+                <p16:designElem xmlns:p16="http://schemas.microsoft.com/office/powerpoint/2015/main" val="1"/>
+              </p:ext>
+            </p:extLst>
+          </p:nvPr>
+        </p:nvSpPr>
+        <p:spPr>
+          <a:xfrm>
+            <a:off x="0" y="0"/>
+            <a:ext cx="12192000" cy="6858000"/>
+          </a:xfrm>
+          <a:prstGeom prst="rect">
+            <a:avLst/>
+          </a:prstGeom>
+          <a:ln w="12700" cap="flat" cmpd="sng" algn="ctr">
+            <a:noFill/>
+            <a:prstDash val="solid"/>
+            <a:miter lim="800000"/>
+          </a:ln>
+          <a:effectLst/>
+          <a:extLst>
+            <a:ext uri="{91240B29-F687-4F45-9708-019B960494DF}">
+              <a14:hiddenLine xmlns:a14="http://schemas.microsoft.com/office/drawing/2010/main" w="12700" cap="flat" cmpd="sng" algn="ctr">
+                <a:solidFill>
+                  <a:schemeClr val="accent1">
+                    <a:shade val="50000"/>
+                  </a:schemeClr>
+                </a:solidFill>
+                <a:prstDash val="solid"/>
+                <a:miter lim="800000"/>
+              </a14:hiddenLine>
+            </a:ext>
+          </a:extLst>
+        </p:spPr>
+        <p:style>
+          <a:lnRef idx="2">
+            <a:schemeClr val="accent1">
+              <a:shade val="50000"/>
+            </a:schemeClr>
+          </a:lnRef>
+          <a:fillRef idx="1">
+            <a:schemeClr val="accent1"/>
+          </a:fillRef>
+          <a:effectRef idx="0">
+            <a:schemeClr val="accent1"/>
+          </a:effectRef>
+          <a:fontRef idx="minor">
+            <a:schemeClr val="lt1"/>
+          </a:fontRef>
+        </p:style>
+        <p:txBody>
+          <a:bodyPr rtlCol="0" anchor="ctr"/>
+          <a:lstStyle/>
+          <a:p>
+            <a:pPr marL="0" marR="0" lvl="0" indent="0" algn="ctr" defTabSz="914400" rtl="0" eaLnBrk="1" fontAlgn="auto" latinLnBrk="0" hangingPunct="1">
+              <a:lnSpc>
+                <a:spcPct val="100000"/>
+              </a:lnSpc>
+              <a:spcBef>
+                <a:spcPts val="0"/>
+              </a:spcBef>
+              <a:spcAft>
+                <a:spcPts val="0"/>
+              </a:spcAft>
+              <a:buClrTx/>
+              <a:buSzTx/>
+              <a:buFontTx/>
+              <a:buNone/>
+              <a:tabLst/>
+              <a:defRPr/>
+            </a:pPr>
+            <a:endParaRPr kumimoji="0" lang="en-US" sz="1800" b="0" i="0" u="none" strike="noStrike" kern="1200" cap="none" spc="0" normalizeH="0" baseline="0" noProof="0">
+              <a:ln>
+                <a:noFill/>
+              </a:ln>
+              <a:solidFill>
+                <a:prstClr val="white"/>
+              </a:solidFill>
+              <a:effectLst/>
+              <a:uLnTx/>
+              <a:uFillTx/>
+              <a:latin typeface="Aptos" panose="02110004020202020204"/>
+              <a:ea typeface="+mn-ea"/>
+              <a:cs typeface="+mn-cs"/>
+            </a:endParaRPr>
+          </a:p>
+        </p:txBody>
+      </p:sp>
+      <p:sp>
+        <p:nvSpPr>
+          <p:cNvPr id="2" name="Title 1">
+            <a:extLst>
+              <a:ext uri="{FF2B5EF4-FFF2-40B4-BE49-F238E27FC236}">
+                <a16:creationId xmlns:a16="http://schemas.microsoft.com/office/drawing/2014/main" id="{32C432B7-0A6C-2C12-77FA-7B714600B30E}"/>
+              </a:ext>
+            </a:extLst>
+          </p:cNvPr>
+          <p:cNvSpPr>
+            <a:spLocks noGrp="1"/>
+          </p:cNvSpPr>
+          <p:nvPr>
+            <p:ph type="title"/>
+          </p:nvPr>
+        </p:nvSpPr>
+        <p:spPr>
+          <a:xfrm>
+            <a:off x="1136397" y="502020"/>
+            <a:ext cx="5323715" cy="1642970"/>
+          </a:xfrm>
+        </p:spPr>
+        <p:txBody>
+          <a:bodyPr vert="horz" lIns="91440" tIns="45720" rIns="91440" bIns="45720" rtlCol="0" anchor="b">
+            <a:normAutofit/>
+          </a:bodyPr>
+          <a:lstStyle/>
+          <a:p>
+            <a:r>
+              <a:rPr lang="en-PL" sz="4000" dirty="0"/>
+              <a:t>Results</a:t>
+            </a:r>
+            <a:endParaRPr lang="en-US" sz="4000" kern="1200" dirty="0">
+              <a:solidFill>
+                <a:schemeClr val="tx1"/>
+              </a:solidFill>
+              <a:latin typeface="+mj-lt"/>
+              <a:ea typeface="+mj-ea"/>
+              <a:cs typeface="+mj-cs"/>
+            </a:endParaRPr>
+          </a:p>
+        </p:txBody>
+      </p:sp>
+      <p:sp>
+        <p:nvSpPr>
+          <p:cNvPr id="7" name="Content Placeholder 2">
+            <a:extLst>
+              <a:ext uri="{FF2B5EF4-FFF2-40B4-BE49-F238E27FC236}">
+                <a16:creationId xmlns:a16="http://schemas.microsoft.com/office/drawing/2014/main" id="{6E2D6785-3FC0-5B4B-8F43-4406AD91B4D7}"/>
+              </a:ext>
+            </a:extLst>
+          </p:cNvPr>
+          <p:cNvSpPr txBox="1">
+            <a:spLocks/>
+          </p:cNvSpPr>
+          <p:nvPr/>
+        </p:nvSpPr>
+        <p:spPr>
+          <a:xfrm>
+            <a:off x="1144923" y="2405894"/>
+            <a:ext cx="5315189" cy="3535083"/>
+          </a:xfrm>
+          <a:prstGeom prst="rect">
+            <a:avLst/>
+          </a:prstGeom>
+        </p:spPr>
+        <p:txBody>
+          <a:bodyPr vert="horz" lIns="91440" tIns="45720" rIns="91440" bIns="45720" rtlCol="0" anchor="t">
+            <a:normAutofit lnSpcReduction="10000"/>
+          </a:bodyPr>
+          <a:lstStyle>
+            <a:lvl1pPr marL="228600" indent="-228600" algn="l" defTabSz="914400" rtl="0" eaLnBrk="1" latinLnBrk="0" hangingPunct="1">
+              <a:lnSpc>
+                <a:spcPct val="90000"/>
+              </a:lnSpc>
+              <a:spcBef>
+                <a:spcPts val="1000"/>
+              </a:spcBef>
+              <a:buFont typeface="Arial" panose="020B0604020202020204" pitchFamily="34" charset="0"/>
+              <a:buChar char="•"/>
+              <a:defRPr sz="2800" kern="1200">
+                <a:solidFill>
+                  <a:schemeClr val="tx1"/>
+                </a:solidFill>
+                <a:latin typeface="+mn-lt"/>
+                <a:ea typeface="+mn-ea"/>
+                <a:cs typeface="+mn-cs"/>
+              </a:defRPr>
+            </a:lvl1pPr>
+            <a:lvl2pPr marL="685800" indent="-228600" algn="l" defTabSz="914400" rtl="0" eaLnBrk="1" latinLnBrk="0" hangingPunct="1">
+              <a:lnSpc>
+                <a:spcPct val="90000"/>
+              </a:lnSpc>
+              <a:spcBef>
+                <a:spcPts val="500"/>
+              </a:spcBef>
+              <a:buFont typeface="Arial" panose="020B0604020202020204" pitchFamily="34" charset="0"/>
+              <a:buChar char="•"/>
+              <a:defRPr sz="2400" kern="1200">
+                <a:solidFill>
+                  <a:schemeClr val="tx1"/>
+                </a:solidFill>
+                <a:latin typeface="+mn-lt"/>
+                <a:ea typeface="+mn-ea"/>
+                <a:cs typeface="+mn-cs"/>
+              </a:defRPr>
+            </a:lvl2pPr>
+            <a:lvl3pPr marL="1143000" indent="-228600" algn="l" defTabSz="914400" rtl="0" eaLnBrk="1" latinLnBrk="0" hangingPunct="1">
+              <a:lnSpc>
+                <a:spcPct val="90000"/>
+              </a:lnSpc>
+              <a:spcBef>
+                <a:spcPts val="500"/>
+              </a:spcBef>
+              <a:buFont typeface="Arial" panose="020B0604020202020204" pitchFamily="34" charset="0"/>
+              <a:buChar char="•"/>
+              <a:defRPr sz="2000" kern="1200">
+                <a:solidFill>
+                  <a:schemeClr val="tx1"/>
+                </a:solidFill>
+                <a:latin typeface="+mn-lt"/>
+                <a:ea typeface="+mn-ea"/>
+                <a:cs typeface="+mn-cs"/>
+              </a:defRPr>
+            </a:lvl3pPr>
+            <a:lvl4pPr marL="1600200" indent="-228600" algn="l" defTabSz="914400" rtl="0" eaLnBrk="1" latinLnBrk="0" hangingPunct="1">
+              <a:lnSpc>
+                <a:spcPct val="90000"/>
+              </a:lnSpc>
+              <a:spcBef>
+                <a:spcPts val="500"/>
+              </a:spcBef>
+              <a:buFont typeface="Arial" panose="020B0604020202020204" pitchFamily="34" charset="0"/>
+              <a:buChar char="•"/>
+              <a:defRPr sz="1800" kern="1200">
+                <a:solidFill>
+                  <a:schemeClr val="tx1"/>
+                </a:solidFill>
+                <a:latin typeface="+mn-lt"/>
+                <a:ea typeface="+mn-ea"/>
+                <a:cs typeface="+mn-cs"/>
+              </a:defRPr>
+            </a:lvl4pPr>
+            <a:lvl5pPr marL="2057400" indent="-228600" algn="l" defTabSz="914400" rtl="0" eaLnBrk="1" latinLnBrk="0" hangingPunct="1">
+              <a:lnSpc>
+                <a:spcPct val="90000"/>
+              </a:lnSpc>
+              <a:spcBef>
+                <a:spcPts val="500"/>
+              </a:spcBef>
+              <a:buFont typeface="Arial" panose="020B0604020202020204" pitchFamily="34" charset="0"/>
+              <a:buChar char="•"/>
+              <a:defRPr sz="1800" kern="1200">
+                <a:solidFill>
+                  <a:schemeClr val="tx1"/>
+                </a:solidFill>
+                <a:latin typeface="+mn-lt"/>
+                <a:ea typeface="+mn-ea"/>
+                <a:cs typeface="+mn-cs"/>
+              </a:defRPr>
+            </a:lvl5pPr>
+            <a:lvl6pPr marL="2514600" indent="-228600" algn="l" defTabSz="914400" rtl="0" eaLnBrk="1" latinLnBrk="0" hangingPunct="1">
+              <a:lnSpc>
+                <a:spcPct val="90000"/>
+              </a:lnSpc>
+              <a:spcBef>
+                <a:spcPts val="500"/>
+              </a:spcBef>
+              <a:buFont typeface="Arial" panose="020B0604020202020204" pitchFamily="34" charset="0"/>
+              <a:buChar char="•"/>
+              <a:defRPr sz="1800" kern="1200">
+                <a:solidFill>
+                  <a:schemeClr val="tx1"/>
+                </a:solidFill>
+                <a:latin typeface="+mn-lt"/>
+                <a:ea typeface="+mn-ea"/>
+                <a:cs typeface="+mn-cs"/>
+              </a:defRPr>
+            </a:lvl6pPr>
+            <a:lvl7pPr marL="2971800" indent="-228600" algn="l" defTabSz="914400" rtl="0" eaLnBrk="1" latinLnBrk="0" hangingPunct="1">
+              <a:lnSpc>
+                <a:spcPct val="90000"/>
+              </a:lnSpc>
+              <a:spcBef>
+                <a:spcPts val="500"/>
+              </a:spcBef>
+              <a:buFont typeface="Arial" panose="020B0604020202020204" pitchFamily="34" charset="0"/>
+              <a:buChar char="•"/>
+              <a:defRPr sz="1800" kern="1200">
+                <a:solidFill>
+                  <a:schemeClr val="tx1"/>
+                </a:solidFill>
+                <a:latin typeface="+mn-lt"/>
+                <a:ea typeface="+mn-ea"/>
+                <a:cs typeface="+mn-cs"/>
+              </a:defRPr>
+            </a:lvl7pPr>
+            <a:lvl8pPr marL="3429000" indent="-228600" algn="l" defTabSz="914400" rtl="0" eaLnBrk="1" latinLnBrk="0" hangingPunct="1">
+              <a:lnSpc>
+                <a:spcPct val="90000"/>
+              </a:lnSpc>
+              <a:spcBef>
+                <a:spcPts val="500"/>
+              </a:spcBef>
+              <a:buFont typeface="Arial" panose="020B0604020202020204" pitchFamily="34" charset="0"/>
+              <a:buChar char="•"/>
+              <a:defRPr sz="1800" kern="1200">
+                <a:solidFill>
+                  <a:schemeClr val="tx1"/>
+                </a:solidFill>
+                <a:latin typeface="+mn-lt"/>
+                <a:ea typeface="+mn-ea"/>
+                <a:cs typeface="+mn-cs"/>
+              </a:defRPr>
+            </a:lvl8pPr>
+            <a:lvl9pPr marL="3886200" indent="-228600" algn="l" defTabSz="914400" rtl="0" eaLnBrk="1" latinLnBrk="0" hangingPunct="1">
+              <a:lnSpc>
+                <a:spcPct val="90000"/>
+              </a:lnSpc>
+              <a:spcBef>
+                <a:spcPts val="500"/>
+              </a:spcBef>
+              <a:buFont typeface="Arial" panose="020B0604020202020204" pitchFamily="34" charset="0"/>
+              <a:buChar char="•"/>
+              <a:defRPr sz="1800" kern="1200">
+                <a:solidFill>
+                  <a:schemeClr val="tx1"/>
+                </a:solidFill>
+                <a:latin typeface="+mn-lt"/>
+                <a:ea typeface="+mn-ea"/>
+                <a:cs typeface="+mn-cs"/>
+              </a:defRPr>
+            </a:lvl9pPr>
+          </a:lstStyle>
+          <a:p>
+            <a:pPr marL="0" indent="0">
+              <a:buNone/>
+            </a:pPr>
+            <a:r>
+              <a:rPr lang="en-GB" dirty="0">
+                <a:solidFill>
+                  <a:srgbClr val="000000"/>
+                </a:solidFill>
+                <a:latin typeface="Menlo" panose="020B0609030804020204" pitchFamily="49" charset="0"/>
+              </a:rPr>
+              <a:t>We did manage to reproduce the project in different code language, however we achieved different results. Difference results from original author not fixing seed used by machine learning functions.</a:t>
+            </a:r>
+            <a:endParaRPr lang="en-GB" dirty="0">
+              <a:solidFill>
+                <a:srgbClr val="000000"/>
+              </a:solidFill>
+              <a:effectLst/>
+              <a:latin typeface="Menlo" panose="020B0609030804020204" pitchFamily="49" charset="0"/>
+            </a:endParaRPr>
+          </a:p>
+        </p:txBody>
+      </p:sp>
+      <p:sp>
+        <p:nvSpPr>
+          <p:cNvPr id="14" name="Rectangle 13">
+            <a:extLst>
+              <a:ext uri="{FF2B5EF4-FFF2-40B4-BE49-F238E27FC236}">
+                <a16:creationId xmlns:a16="http://schemas.microsoft.com/office/drawing/2014/main" id="{7004738A-9D34-43E8-97D2-CA0EED4F8BE0}"/>
+              </a:ext>
+              <a:ext uri="{C183D7F6-B498-43B3-948B-1728B52AA6E4}">
+                <adec:decorative xmlns:adec="http://schemas.microsoft.com/office/drawing/2017/decorative" val="1"/>
+              </a:ext>
+            </a:extLst>
+          </p:cNvPr>
+          <p:cNvSpPr>
+            <a:spLocks noGrp="1" noRot="1" noChangeAspect="1" noMove="1" noResize="1" noEditPoints="1" noAdjustHandles="1" noChangeArrowheads="1" noChangeShapeType="1" noTextEdit="1"/>
+          </p:cNvSpPr>
+          <p:nvPr>
+            <p:extLst>
+              <p:ext uri="{386F3935-93C4-4BCD-93E2-E3B085C9AB24}">
+                <p16:designElem xmlns:p16="http://schemas.microsoft.com/office/powerpoint/2015/main" val="1"/>
+              </p:ext>
+            </p:extLst>
+          </p:nvPr>
+        </p:nvSpPr>
+        <p:spPr>
+          <a:xfrm rot="10800000" flipH="1">
+            <a:off x="8123333" y="-5"/>
+            <a:ext cx="4092521" cy="6858000"/>
+          </a:xfrm>
+          <a:prstGeom prst="rect">
+            <a:avLst/>
+          </a:prstGeom>
+          <a:gradFill>
+            <a:gsLst>
+              <a:gs pos="8000">
+                <a:srgbClr val="000000">
+                  <a:alpha val="94000"/>
+                </a:srgbClr>
+              </a:gs>
+              <a:gs pos="100000">
+                <a:schemeClr val="accent1"/>
+              </a:gs>
+            </a:gsLst>
+            <a:lin ang="2400000" scaled="0"/>
+          </a:gradFill>
+          <a:ln>
+            <a:noFill/>
+          </a:ln>
+        </p:spPr>
+        <p:style>
+          <a:lnRef idx="2">
+            <a:schemeClr val="accent1">
+              <a:shade val="50000"/>
+            </a:schemeClr>
+          </a:lnRef>
+          <a:fillRef idx="1">
+            <a:schemeClr val="accent1"/>
+          </a:fillRef>
+          <a:effectRef idx="0">
+            <a:schemeClr val="accent1"/>
+          </a:effectRef>
+          <a:fontRef idx="minor">
+            <a:schemeClr val="lt1"/>
+          </a:fontRef>
+        </p:style>
+        <p:txBody>
+          <a:bodyPr rtlCol="0" anchor="ctr"/>
+          <a:lstStyle/>
+          <a:p>
+            <a:pPr marL="0" marR="0" lvl="0" indent="0" algn="ctr" defTabSz="914400" rtl="0" eaLnBrk="1" fontAlgn="auto" latinLnBrk="0" hangingPunct="1">
+              <a:lnSpc>
+                <a:spcPct val="100000"/>
+              </a:lnSpc>
+              <a:spcBef>
+                <a:spcPts val="0"/>
+              </a:spcBef>
+              <a:spcAft>
+                <a:spcPts val="0"/>
+              </a:spcAft>
+              <a:buClrTx/>
+              <a:buSzTx/>
+              <a:buFontTx/>
+              <a:buNone/>
+              <a:tabLst/>
+              <a:defRPr/>
+            </a:pPr>
+            <a:endParaRPr kumimoji="0" lang="en-US" sz="1800" b="0" i="0" u="none" strike="noStrike" kern="1200" cap="none" spc="0" normalizeH="0" baseline="0" noProof="0">
+              <a:ln>
+                <a:noFill/>
+              </a:ln>
+              <a:solidFill>
+                <a:prstClr val="white"/>
+              </a:solidFill>
+              <a:effectLst/>
+              <a:uLnTx/>
+              <a:uFillTx/>
+              <a:latin typeface="Aptos" panose="02110004020202020204"/>
+              <a:ea typeface="+mn-ea"/>
+              <a:cs typeface="+mn-cs"/>
+            </a:endParaRPr>
+          </a:p>
+        </p:txBody>
+      </p:sp>
+      <p:sp>
+        <p:nvSpPr>
+          <p:cNvPr id="16" name="Rectangle 15">
+            <a:extLst>
+              <a:ext uri="{FF2B5EF4-FFF2-40B4-BE49-F238E27FC236}">
+                <a16:creationId xmlns:a16="http://schemas.microsoft.com/office/drawing/2014/main" id="{B8B8D07F-F13E-443E-BA68-2D26672D76B9}"/>
+              </a:ext>
+              <a:ext uri="{C183D7F6-B498-43B3-948B-1728B52AA6E4}">
+                <adec:decorative xmlns:adec="http://schemas.microsoft.com/office/drawing/2017/decorative" val="1"/>
+              </a:ext>
+            </a:extLst>
+          </p:cNvPr>
+          <p:cNvSpPr>
+            <a:spLocks noGrp="1" noRot="1" noChangeAspect="1" noMove="1" noResize="1" noEditPoints="1" noAdjustHandles="1" noChangeArrowheads="1" noChangeShapeType="1" noTextEdit="1"/>
+          </p:cNvSpPr>
+          <p:nvPr>
+            <p:extLst>
+              <p:ext uri="{386F3935-93C4-4BCD-93E2-E3B085C9AB24}">
+                <p16:designElem xmlns:p16="http://schemas.microsoft.com/office/powerpoint/2015/main" val="1"/>
+              </p:ext>
+            </p:extLst>
+          </p:nvPr>
+        </p:nvSpPr>
+        <p:spPr>
+          <a:xfrm rot="10800000" flipH="1">
+            <a:off x="8123333" y="-2"/>
+            <a:ext cx="4092521" cy="6400369"/>
+          </a:xfrm>
+          <a:prstGeom prst="rect">
+            <a:avLst/>
+          </a:prstGeom>
+          <a:gradFill>
+            <a:gsLst>
+              <a:gs pos="31000">
+                <a:schemeClr val="accent1">
+                  <a:lumMod val="50000"/>
+                  <a:alpha val="0"/>
+                </a:schemeClr>
+              </a:gs>
+              <a:gs pos="100000">
+                <a:schemeClr val="accent1">
+                  <a:lumMod val="50000"/>
+                  <a:alpha val="26000"/>
+                </a:schemeClr>
+              </a:gs>
+            </a:gsLst>
+            <a:lin ang="18000000" scaled="0"/>
+          </a:gradFill>
+          <a:ln>
+            <a:noFill/>
+          </a:ln>
+        </p:spPr>
+        <p:style>
+          <a:lnRef idx="2">
+            <a:schemeClr val="accent1">
+              <a:shade val="50000"/>
+            </a:schemeClr>
+          </a:lnRef>
+          <a:fillRef idx="1">
+            <a:schemeClr val="accent1"/>
+          </a:fillRef>
+          <a:effectRef idx="0">
+            <a:schemeClr val="accent1"/>
+          </a:effectRef>
+          <a:fontRef idx="minor">
+            <a:schemeClr val="lt1"/>
+          </a:fontRef>
+        </p:style>
+        <p:txBody>
+          <a:bodyPr rtlCol="0" anchor="ctr"/>
+          <a:lstStyle/>
+          <a:p>
+            <a:pPr marL="0" marR="0" lvl="0" indent="0" algn="ctr" defTabSz="914400" rtl="0" eaLnBrk="1" fontAlgn="auto" latinLnBrk="0" hangingPunct="1">
+              <a:lnSpc>
+                <a:spcPct val="100000"/>
+              </a:lnSpc>
+              <a:spcBef>
+                <a:spcPts val="0"/>
+              </a:spcBef>
+              <a:spcAft>
+                <a:spcPts val="0"/>
+              </a:spcAft>
+              <a:buClrTx/>
+              <a:buSzTx/>
+              <a:buFontTx/>
+              <a:buNone/>
+              <a:tabLst/>
+              <a:defRPr/>
+            </a:pPr>
+            <a:endParaRPr kumimoji="0" lang="en-US" sz="1800" b="0" i="0" u="none" strike="noStrike" kern="1200" cap="none" spc="0" normalizeH="0" baseline="0" noProof="0" dirty="0">
+              <a:ln>
+                <a:noFill/>
+              </a:ln>
+              <a:solidFill>
+                <a:prstClr val="white"/>
+              </a:solidFill>
+              <a:effectLst/>
+              <a:uLnTx/>
+              <a:uFillTx/>
+              <a:latin typeface="Aptos" panose="02110004020202020204"/>
+              <a:ea typeface="+mn-ea"/>
+              <a:cs typeface="+mn-cs"/>
+            </a:endParaRPr>
+          </a:p>
+        </p:txBody>
+      </p:sp>
+      <p:sp>
+        <p:nvSpPr>
+          <p:cNvPr id="18" name="Rectangle 17">
+            <a:extLst>
+              <a:ext uri="{FF2B5EF4-FFF2-40B4-BE49-F238E27FC236}">
+                <a16:creationId xmlns:a16="http://schemas.microsoft.com/office/drawing/2014/main" id="{2813A4FA-24A5-41ED-A534-3807D1B2F344}"/>
+              </a:ext>
+              <a:ext uri="{C183D7F6-B498-43B3-948B-1728B52AA6E4}">
+                <adec:decorative xmlns:adec="http://schemas.microsoft.com/office/drawing/2017/decorative" val="1"/>
+              </a:ext>
+            </a:extLst>
+          </p:cNvPr>
+          <p:cNvSpPr>
+            <a:spLocks noGrp="1" noRot="1" noChangeAspect="1" noMove="1" noResize="1" noEditPoints="1" noAdjustHandles="1" noChangeArrowheads="1" noChangeShapeType="1" noTextEdit="1"/>
+          </p:cNvSpPr>
+          <p:nvPr>
+            <p:extLst>
+              <p:ext uri="{386F3935-93C4-4BCD-93E2-E3B085C9AB24}">
+                <p16:designElem xmlns:p16="http://schemas.microsoft.com/office/powerpoint/2015/main" val="1"/>
+              </p:ext>
+            </p:extLst>
+          </p:nvPr>
+        </p:nvSpPr>
+        <p:spPr>
+          <a:xfrm rot="10800000" flipH="1">
+            <a:off x="8123333" y="-22"/>
+            <a:ext cx="4068667" cy="6400389"/>
+          </a:xfrm>
+          <a:prstGeom prst="rect">
+            <a:avLst/>
+          </a:prstGeom>
+          <a:gradFill>
+            <a:gsLst>
+              <a:gs pos="0">
+                <a:schemeClr val="accent1">
+                  <a:alpha val="0"/>
+                </a:schemeClr>
+              </a:gs>
+              <a:gs pos="72000">
+                <a:srgbClr val="000000">
+                  <a:alpha val="21000"/>
+                </a:srgbClr>
+              </a:gs>
+            </a:gsLst>
+            <a:lin ang="3000000" scaled="0"/>
+          </a:gradFill>
+          <a:ln>
+            <a:noFill/>
+          </a:ln>
+        </p:spPr>
+        <p:style>
+          <a:lnRef idx="2">
+            <a:schemeClr val="accent1">
+              <a:shade val="50000"/>
+            </a:schemeClr>
+          </a:lnRef>
+          <a:fillRef idx="1">
+            <a:schemeClr val="accent1"/>
+          </a:fillRef>
+          <a:effectRef idx="0">
+            <a:schemeClr val="accent1"/>
+          </a:effectRef>
+          <a:fontRef idx="minor">
+            <a:schemeClr val="lt1"/>
+          </a:fontRef>
+        </p:style>
+        <p:txBody>
+          <a:bodyPr rtlCol="0" anchor="ctr"/>
+          <a:lstStyle/>
+          <a:p>
+            <a:pPr marL="0" marR="0" lvl="0" indent="0" algn="ctr" defTabSz="914400" rtl="0" eaLnBrk="1" fontAlgn="auto" latinLnBrk="0" hangingPunct="1">
+              <a:lnSpc>
+                <a:spcPct val="100000"/>
+              </a:lnSpc>
+              <a:spcBef>
+                <a:spcPts val="0"/>
+              </a:spcBef>
+              <a:spcAft>
+                <a:spcPts val="0"/>
+              </a:spcAft>
+              <a:buClrTx/>
+              <a:buSzTx/>
+              <a:buFontTx/>
+              <a:buNone/>
+              <a:tabLst/>
+              <a:defRPr/>
+            </a:pPr>
+            <a:endParaRPr kumimoji="0" lang="en-US" sz="1800" b="0" i="0" u="none" strike="noStrike" kern="1200" cap="none" spc="0" normalizeH="0" baseline="0" noProof="0" dirty="0">
+              <a:ln>
+                <a:noFill/>
+              </a:ln>
+              <a:solidFill>
+                <a:prstClr val="white"/>
+              </a:solidFill>
+              <a:effectLst/>
+              <a:uLnTx/>
+              <a:uFillTx/>
+              <a:latin typeface="Aptos" panose="02110004020202020204"/>
+              <a:ea typeface="+mn-ea"/>
+              <a:cs typeface="+mn-cs"/>
+            </a:endParaRPr>
+          </a:p>
+        </p:txBody>
+      </p:sp>
+      <p:sp>
+        <p:nvSpPr>
+          <p:cNvPr id="20" name="Rectangle 19">
+            <a:extLst>
+              <a:ext uri="{FF2B5EF4-FFF2-40B4-BE49-F238E27FC236}">
+                <a16:creationId xmlns:a16="http://schemas.microsoft.com/office/drawing/2014/main" id="{C3944F27-CA70-4E84-A51A-E6BF89558979}"/>
+              </a:ext>
+              <a:ext uri="{C183D7F6-B498-43B3-948B-1728B52AA6E4}">
+                <adec:decorative xmlns:adec="http://schemas.microsoft.com/office/drawing/2017/decorative" val="1"/>
+              </a:ext>
+            </a:extLst>
+          </p:cNvPr>
+          <p:cNvSpPr>
+            <a:spLocks noGrp="1" noRot="1" noChangeAspect="1" noMove="1" noResize="1" noEditPoints="1" noAdjustHandles="1" noChangeArrowheads="1" noChangeShapeType="1" noTextEdit="1"/>
+          </p:cNvSpPr>
+          <p:nvPr>
+            <p:extLst>
+              <p:ext uri="{386F3935-93C4-4BCD-93E2-E3B085C9AB24}">
+                <p16:designElem xmlns:p16="http://schemas.microsoft.com/office/powerpoint/2015/main" val="1"/>
+              </p:ext>
+            </p:extLst>
+          </p:nvPr>
+        </p:nvSpPr>
+        <p:spPr>
+          <a:xfrm rot="10800000" flipH="1">
+            <a:off x="8123333" y="-10"/>
+            <a:ext cx="3611467" cy="6857997"/>
+          </a:xfrm>
+          <a:prstGeom prst="rect">
+            <a:avLst/>
+          </a:prstGeom>
+          <a:gradFill>
+            <a:gsLst>
+              <a:gs pos="0">
+                <a:schemeClr val="accent1">
+                  <a:alpha val="0"/>
+                </a:schemeClr>
+              </a:gs>
+              <a:gs pos="93000">
+                <a:srgbClr val="000000">
+                  <a:alpha val="29000"/>
+                </a:srgbClr>
+              </a:gs>
+            </a:gsLst>
+            <a:lin ang="5400000" scaled="0"/>
+          </a:gradFill>
+          <a:ln>
+            <a:noFill/>
+          </a:ln>
+        </p:spPr>
+        <p:style>
+          <a:lnRef idx="2">
+            <a:schemeClr val="accent1">
+              <a:shade val="50000"/>
+            </a:schemeClr>
+          </a:lnRef>
+          <a:fillRef idx="1">
+            <a:schemeClr val="accent1"/>
+          </a:fillRef>
+          <a:effectRef idx="0">
+            <a:schemeClr val="accent1"/>
+          </a:effectRef>
+          <a:fontRef idx="minor">
+            <a:schemeClr val="lt1"/>
+          </a:fontRef>
+        </p:style>
+        <p:txBody>
+          <a:bodyPr rtlCol="0" anchor="ctr"/>
+          <a:lstStyle/>
+          <a:p>
+            <a:pPr marL="0" marR="0" lvl="0" indent="0" algn="ctr" defTabSz="914400" rtl="0" eaLnBrk="1" fontAlgn="auto" latinLnBrk="0" hangingPunct="1">
+              <a:lnSpc>
+                <a:spcPct val="100000"/>
+              </a:lnSpc>
+              <a:spcBef>
+                <a:spcPts val="0"/>
+              </a:spcBef>
+              <a:spcAft>
+                <a:spcPts val="0"/>
+              </a:spcAft>
+              <a:buClrTx/>
+              <a:buSzTx/>
+              <a:buFontTx/>
+              <a:buNone/>
+              <a:tabLst/>
+              <a:defRPr/>
+            </a:pPr>
+            <a:endParaRPr kumimoji="0" lang="en-US" sz="1800" b="0" i="0" u="none" strike="noStrike" kern="1200" cap="none" spc="0" normalizeH="0" baseline="0" noProof="0" dirty="0">
+              <a:ln>
+                <a:noFill/>
+              </a:ln>
+              <a:solidFill>
+                <a:prstClr val="white"/>
+              </a:solidFill>
+              <a:effectLst/>
+              <a:uLnTx/>
+              <a:uFillTx/>
+              <a:latin typeface="Aptos" panose="02110004020202020204"/>
+              <a:ea typeface="+mn-ea"/>
+              <a:cs typeface="+mn-cs"/>
+            </a:endParaRPr>
+          </a:p>
+        </p:txBody>
+      </p:sp>
+      <p:sp>
+        <p:nvSpPr>
+          <p:cNvPr id="5" name="Content Placeholder 2">
+            <a:extLst>
+              <a:ext uri="{FF2B5EF4-FFF2-40B4-BE49-F238E27FC236}">
+                <a16:creationId xmlns:a16="http://schemas.microsoft.com/office/drawing/2014/main" id="{19509C26-039A-EC7F-1AFB-262954821CEE}"/>
+              </a:ext>
+            </a:extLst>
+          </p:cNvPr>
+          <p:cNvSpPr txBox="1">
+            <a:spLocks/>
+          </p:cNvSpPr>
+          <p:nvPr/>
+        </p:nvSpPr>
+        <p:spPr>
+          <a:xfrm>
+            <a:off x="1297323" y="2558294"/>
+            <a:ext cx="5429298" cy="3535083"/>
+          </a:xfrm>
+          <a:prstGeom prst="rect">
+            <a:avLst/>
+          </a:prstGeom>
+        </p:spPr>
+        <p:txBody>
+          <a:bodyPr vert="horz" lIns="91440" tIns="45720" rIns="91440" bIns="45720" rtlCol="0" anchor="t">
+            <a:normAutofit/>
+          </a:bodyPr>
+          <a:lstStyle>
+            <a:lvl1pPr marL="228600" indent="-228600" algn="l" defTabSz="914400" rtl="0" eaLnBrk="1" latinLnBrk="0" hangingPunct="1">
+              <a:lnSpc>
+                <a:spcPct val="90000"/>
+              </a:lnSpc>
+              <a:spcBef>
+                <a:spcPts val="1000"/>
+              </a:spcBef>
+              <a:buFont typeface="Arial" panose="020B0604020202020204" pitchFamily="34" charset="0"/>
+              <a:buChar char="•"/>
+              <a:defRPr sz="2800" kern="1200">
+                <a:solidFill>
+                  <a:schemeClr val="tx1"/>
+                </a:solidFill>
+                <a:latin typeface="+mn-lt"/>
+                <a:ea typeface="+mn-ea"/>
+                <a:cs typeface="+mn-cs"/>
+              </a:defRPr>
+            </a:lvl1pPr>
+            <a:lvl2pPr marL="685800" indent="-228600" algn="l" defTabSz="914400" rtl="0" eaLnBrk="1" latinLnBrk="0" hangingPunct="1">
+              <a:lnSpc>
+                <a:spcPct val="90000"/>
+              </a:lnSpc>
+              <a:spcBef>
+                <a:spcPts val="500"/>
+              </a:spcBef>
+              <a:buFont typeface="Arial" panose="020B0604020202020204" pitchFamily="34" charset="0"/>
+              <a:buChar char="•"/>
+              <a:defRPr sz="2400" kern="1200">
+                <a:solidFill>
+                  <a:schemeClr val="tx1"/>
+                </a:solidFill>
+                <a:latin typeface="+mn-lt"/>
+                <a:ea typeface="+mn-ea"/>
+                <a:cs typeface="+mn-cs"/>
+              </a:defRPr>
+            </a:lvl2pPr>
+            <a:lvl3pPr marL="1143000" indent="-228600" algn="l" defTabSz="914400" rtl="0" eaLnBrk="1" latinLnBrk="0" hangingPunct="1">
+              <a:lnSpc>
+                <a:spcPct val="90000"/>
+              </a:lnSpc>
+              <a:spcBef>
+                <a:spcPts val="500"/>
+              </a:spcBef>
+              <a:buFont typeface="Arial" panose="020B0604020202020204" pitchFamily="34" charset="0"/>
+              <a:buChar char="•"/>
+              <a:defRPr sz="2000" kern="1200">
+                <a:solidFill>
+                  <a:schemeClr val="tx1"/>
+                </a:solidFill>
+                <a:latin typeface="+mn-lt"/>
+                <a:ea typeface="+mn-ea"/>
+                <a:cs typeface="+mn-cs"/>
+              </a:defRPr>
+            </a:lvl3pPr>
+            <a:lvl4pPr marL="1600200" indent="-228600" algn="l" defTabSz="914400" rtl="0" eaLnBrk="1" latinLnBrk="0" hangingPunct="1">
+              <a:lnSpc>
+                <a:spcPct val="90000"/>
+              </a:lnSpc>
+              <a:spcBef>
+                <a:spcPts val="500"/>
+              </a:spcBef>
+              <a:buFont typeface="Arial" panose="020B0604020202020204" pitchFamily="34" charset="0"/>
+              <a:buChar char="•"/>
+              <a:defRPr sz="1800" kern="1200">
+                <a:solidFill>
+                  <a:schemeClr val="tx1"/>
+                </a:solidFill>
+                <a:latin typeface="+mn-lt"/>
+                <a:ea typeface="+mn-ea"/>
+                <a:cs typeface="+mn-cs"/>
+              </a:defRPr>
+            </a:lvl4pPr>
+            <a:lvl5pPr marL="2057400" indent="-228600" algn="l" defTabSz="914400" rtl="0" eaLnBrk="1" latinLnBrk="0" hangingPunct="1">
+              <a:lnSpc>
+                <a:spcPct val="90000"/>
+              </a:lnSpc>
+              <a:spcBef>
+                <a:spcPts val="500"/>
+              </a:spcBef>
+              <a:buFont typeface="Arial" panose="020B0604020202020204" pitchFamily="34" charset="0"/>
+              <a:buChar char="•"/>
+              <a:defRPr sz="1800" kern="1200">
+                <a:solidFill>
+                  <a:schemeClr val="tx1"/>
+                </a:solidFill>
+                <a:latin typeface="+mn-lt"/>
+                <a:ea typeface="+mn-ea"/>
+                <a:cs typeface="+mn-cs"/>
+              </a:defRPr>
+            </a:lvl5pPr>
+            <a:lvl6pPr marL="2514600" indent="-228600" algn="l" defTabSz="914400" rtl="0" eaLnBrk="1" latinLnBrk="0" hangingPunct="1">
+              <a:lnSpc>
+                <a:spcPct val="90000"/>
+              </a:lnSpc>
+              <a:spcBef>
+                <a:spcPts val="500"/>
+              </a:spcBef>
+              <a:buFont typeface="Arial" panose="020B0604020202020204" pitchFamily="34" charset="0"/>
+              <a:buChar char="•"/>
+              <a:defRPr sz="1800" kern="1200">
+                <a:solidFill>
+                  <a:schemeClr val="tx1"/>
+                </a:solidFill>
+                <a:latin typeface="+mn-lt"/>
+                <a:ea typeface="+mn-ea"/>
+                <a:cs typeface="+mn-cs"/>
+              </a:defRPr>
+            </a:lvl6pPr>
+            <a:lvl7pPr marL="2971800" indent="-228600" algn="l" defTabSz="914400" rtl="0" eaLnBrk="1" latinLnBrk="0" hangingPunct="1">
+              <a:lnSpc>
+                <a:spcPct val="90000"/>
+              </a:lnSpc>
+              <a:spcBef>
+                <a:spcPts val="500"/>
+              </a:spcBef>
+              <a:buFont typeface="Arial" panose="020B0604020202020204" pitchFamily="34" charset="0"/>
+              <a:buChar char="•"/>
+              <a:defRPr sz="1800" kern="1200">
+                <a:solidFill>
+                  <a:schemeClr val="tx1"/>
+                </a:solidFill>
+                <a:latin typeface="+mn-lt"/>
+                <a:ea typeface="+mn-ea"/>
+                <a:cs typeface="+mn-cs"/>
+              </a:defRPr>
+            </a:lvl7pPr>
+            <a:lvl8pPr marL="3429000" indent="-228600" algn="l" defTabSz="914400" rtl="0" eaLnBrk="1" latinLnBrk="0" hangingPunct="1">
+              <a:lnSpc>
+                <a:spcPct val="90000"/>
+              </a:lnSpc>
+              <a:spcBef>
+                <a:spcPts val="500"/>
+              </a:spcBef>
+              <a:buFont typeface="Arial" panose="020B0604020202020204" pitchFamily="34" charset="0"/>
+              <a:buChar char="•"/>
+              <a:defRPr sz="1800" kern="1200">
+                <a:solidFill>
+                  <a:schemeClr val="tx1"/>
+                </a:solidFill>
+                <a:latin typeface="+mn-lt"/>
+                <a:ea typeface="+mn-ea"/>
+                <a:cs typeface="+mn-cs"/>
+              </a:defRPr>
+            </a:lvl8pPr>
+            <a:lvl9pPr marL="3886200" indent="-228600" algn="l" defTabSz="914400" rtl="0" eaLnBrk="1" latinLnBrk="0" hangingPunct="1">
+              <a:lnSpc>
+                <a:spcPct val="90000"/>
+              </a:lnSpc>
+              <a:spcBef>
+                <a:spcPts val="500"/>
+              </a:spcBef>
+              <a:buFont typeface="Arial" panose="020B0604020202020204" pitchFamily="34" charset="0"/>
+              <a:buChar char="•"/>
+              <a:defRPr sz="1800" kern="1200">
+                <a:solidFill>
+                  <a:schemeClr val="tx1"/>
+                </a:solidFill>
+                <a:latin typeface="+mn-lt"/>
+                <a:ea typeface="+mn-ea"/>
+                <a:cs typeface="+mn-cs"/>
+              </a:defRPr>
+            </a:lvl9pPr>
+          </a:lstStyle>
+          <a:p>
+            <a:pPr marL="0" indent="0">
+              <a:buNone/>
+            </a:pPr>
+            <a:endParaRPr lang="en-PL" dirty="0">
+              <a:solidFill>
+                <a:srgbClr val="000000"/>
+              </a:solidFill>
+              <a:latin typeface="Menlo" panose="020B0609030804020204" pitchFamily="49" charset="0"/>
+            </a:endParaRPr>
+          </a:p>
+        </p:txBody>
+      </p:sp>
+    </p:spTree>
+    <p:extLst>
+      <p:ext uri="{BB962C8B-B14F-4D97-AF65-F5344CB8AC3E}">
+        <p14:creationId xmlns:p14="http://schemas.microsoft.com/office/powerpoint/2010/main" val="1761927912"/>
+      </p:ext>
+    </p:extLst>
+  </p:cSld>
+  <p:clrMapOvr>
+    <a:masterClrMapping/>
+  </p:clrMapOvr>
+</p:sld>
+</file>
+
+<file path=ppt/slides/slide6.xml><?xml version="1.0" encoding="utf-8"?>
+<p:sld xmlns:a="http://schemas.openxmlformats.org/drawingml/2006/main" xmlns:r="http://schemas.openxmlformats.org/officeDocument/2006/relationships" xmlns:p="http://schemas.openxmlformats.org/presentationml/2006/main">
+  <p:cSld>
+    <p:bg>
+      <p:bgPr>
+        <a:solidFill>
+          <a:schemeClr val="bg1"/>
+        </a:solidFill>
+        <a:effectLst/>
+      </p:bgPr>
+    </p:bg>
+    <p:spTree>
+      <p:nvGrpSpPr>
+        <p:cNvPr id="1" name=""/>
+        <p:cNvGrpSpPr/>
+        <p:nvPr/>
+      </p:nvGrpSpPr>
+      <p:grpSpPr>
+        <a:xfrm>
+          <a:off x="0" y="0"/>
+          <a:ext cx="0" cy="0"/>
+          <a:chOff x="0" y="0"/>
+          <a:chExt cx="0" cy="0"/>
+        </a:xfrm>
+      </p:grpSpPr>
+      <p:sp useBgFill="1">
+        <p:nvSpPr>
+          <p:cNvPr id="12" name="Rectangle 11">
+            <a:extLst>
+              <a:ext uri="{FF2B5EF4-FFF2-40B4-BE49-F238E27FC236}">
+                <a16:creationId xmlns:a16="http://schemas.microsoft.com/office/drawing/2014/main" id="{12609869-9E80-471B-A487-A53288E0E791}"/>
+              </a:ext>
+              <a:ext uri="{C183D7F6-B498-43B3-948B-1728B52AA6E4}">
+                <adec:decorative xmlns:adec="http://schemas.microsoft.com/office/drawing/2017/decorative" val="1"/>
+              </a:ext>
+            </a:extLst>
+          </p:cNvPr>
+          <p:cNvSpPr>
+            <a:spLocks noGrp="1" noRot="1" noChangeAspect="1" noMove="1" noResize="1" noEditPoints="1" noAdjustHandles="1" noChangeArrowheads="1" noChangeShapeType="1" noTextEdit="1"/>
+          </p:cNvSpPr>
+          <p:nvPr>
+            <p:extLst>
+              <p:ext uri="{386F3935-93C4-4BCD-93E2-E3B085C9AB24}">
+                <p16:designElem xmlns:p16="http://schemas.microsoft.com/office/powerpoint/2015/main" val="1"/>
+              </p:ext>
+            </p:extLst>
+          </p:nvPr>
+        </p:nvSpPr>
+        <p:spPr>
+          <a:xfrm>
+            <a:off x="0" y="0"/>
+            <a:ext cx="12192000" cy="6858000"/>
+          </a:xfrm>
+          <a:prstGeom prst="rect">
+            <a:avLst/>
+          </a:prstGeom>
+          <a:ln w="12700" cap="flat" cmpd="sng" algn="ctr">
+            <a:noFill/>
+            <a:prstDash val="solid"/>
+            <a:miter lim="800000"/>
+          </a:ln>
+          <a:effectLst/>
+          <a:extLst>
+            <a:ext uri="{91240B29-F687-4F45-9708-019B960494DF}">
+              <a14:hiddenLine xmlns:a14="http://schemas.microsoft.com/office/drawing/2010/main" w="12700" cap="flat" cmpd="sng" algn="ctr">
+                <a:solidFill>
+                  <a:schemeClr val="accent1">
+                    <a:shade val="50000"/>
+                  </a:schemeClr>
+                </a:solidFill>
+                <a:prstDash val="solid"/>
+                <a:miter lim="800000"/>
+              </a14:hiddenLine>
+            </a:ext>
+          </a:extLst>
+        </p:spPr>
+        <p:style>
+          <a:lnRef idx="2">
+            <a:schemeClr val="accent1">
+              <a:shade val="50000"/>
+            </a:schemeClr>
+          </a:lnRef>
+          <a:fillRef idx="1">
+            <a:schemeClr val="accent1"/>
+          </a:fillRef>
+          <a:effectRef idx="0">
+            <a:schemeClr val="accent1"/>
+          </a:effectRef>
+          <a:fontRef idx="minor">
+            <a:schemeClr val="lt1"/>
+          </a:fontRef>
+        </p:style>
+        <p:txBody>
+          <a:bodyPr rtlCol="0" anchor="ctr"/>
+          <a:lstStyle/>
+          <a:p>
+            <a:pPr marL="0" marR="0" lvl="0" indent="0" algn="ctr" defTabSz="914400" rtl="0" eaLnBrk="1" fontAlgn="auto" latinLnBrk="0" hangingPunct="1">
+              <a:lnSpc>
+                <a:spcPct val="100000"/>
+              </a:lnSpc>
+              <a:spcBef>
+                <a:spcPts val="0"/>
+              </a:spcBef>
+              <a:spcAft>
+                <a:spcPts val="0"/>
+              </a:spcAft>
+              <a:buClrTx/>
+              <a:buSzTx/>
+              <a:buFontTx/>
+              <a:buNone/>
+              <a:tabLst/>
+              <a:defRPr/>
+            </a:pPr>
+            <a:endParaRPr kumimoji="0" lang="en-US" sz="1800" b="0" i="0" u="none" strike="noStrike" kern="1200" cap="none" spc="0" normalizeH="0" baseline="0" noProof="0">
+              <a:ln>
+                <a:noFill/>
+              </a:ln>
+              <a:solidFill>
+                <a:prstClr val="white"/>
+              </a:solidFill>
+              <a:effectLst/>
+              <a:uLnTx/>
+              <a:uFillTx/>
+              <a:latin typeface="Aptos" panose="02110004020202020204"/>
+              <a:ea typeface="+mn-ea"/>
+              <a:cs typeface="+mn-cs"/>
+            </a:endParaRPr>
+          </a:p>
+        </p:txBody>
+      </p:sp>
+      <p:sp>
+        <p:nvSpPr>
+          <p:cNvPr id="2" name="Title 1">
+            <a:extLst>
+              <a:ext uri="{FF2B5EF4-FFF2-40B4-BE49-F238E27FC236}">
+                <a16:creationId xmlns:a16="http://schemas.microsoft.com/office/drawing/2014/main" id="{32C432B7-0A6C-2C12-77FA-7B714600B30E}"/>
+              </a:ext>
+            </a:extLst>
+          </p:cNvPr>
+          <p:cNvSpPr>
+            <a:spLocks noGrp="1"/>
+          </p:cNvSpPr>
+          <p:nvPr>
+            <p:ph type="title"/>
+          </p:nvPr>
+        </p:nvSpPr>
+        <p:spPr>
+          <a:xfrm>
+            <a:off x="1136397" y="502020"/>
+            <a:ext cx="5323715" cy="1642970"/>
+          </a:xfrm>
+        </p:spPr>
+        <p:txBody>
+          <a:bodyPr vert="horz" lIns="91440" tIns="45720" rIns="91440" bIns="45720" rtlCol="0" anchor="b">
+            <a:normAutofit/>
+          </a:bodyPr>
+          <a:lstStyle/>
+          <a:p>
+            <a:r>
+              <a:rPr lang="en-PL" sz="4000" dirty="0"/>
+              <a:t>AI usage</a:t>
+            </a:r>
+            <a:endParaRPr lang="en-US" sz="4000" kern="1200" dirty="0">
+              <a:solidFill>
+                <a:schemeClr val="tx1"/>
+              </a:solidFill>
+              <a:latin typeface="+mj-lt"/>
+              <a:ea typeface="+mj-ea"/>
+              <a:cs typeface="+mj-cs"/>
+            </a:endParaRPr>
+          </a:p>
+        </p:txBody>
+      </p:sp>
+      <p:sp>
+        <p:nvSpPr>
+          <p:cNvPr id="7" name="Content Placeholder 2">
+            <a:extLst>
+              <a:ext uri="{FF2B5EF4-FFF2-40B4-BE49-F238E27FC236}">
+                <a16:creationId xmlns:a16="http://schemas.microsoft.com/office/drawing/2014/main" id="{6E2D6785-3FC0-5B4B-8F43-4406AD91B4D7}"/>
+              </a:ext>
+            </a:extLst>
+          </p:cNvPr>
+          <p:cNvSpPr txBox="1">
+            <a:spLocks/>
+          </p:cNvSpPr>
+          <p:nvPr/>
+        </p:nvSpPr>
+        <p:spPr>
+          <a:xfrm>
+            <a:off x="1144923" y="2405894"/>
+            <a:ext cx="5315189" cy="3535083"/>
+          </a:xfrm>
+          <a:prstGeom prst="rect">
+            <a:avLst/>
+          </a:prstGeom>
+        </p:spPr>
+        <p:txBody>
+          <a:bodyPr vert="horz" lIns="91440" tIns="45720" rIns="91440" bIns="45720" rtlCol="0" anchor="t">
+            <a:normAutofit/>
+          </a:bodyPr>
+          <a:lstStyle>
+            <a:lvl1pPr marL="228600" indent="-228600" algn="l" defTabSz="914400" rtl="0" eaLnBrk="1" latinLnBrk="0" hangingPunct="1">
+              <a:lnSpc>
+                <a:spcPct val="90000"/>
+              </a:lnSpc>
+              <a:spcBef>
+                <a:spcPts val="1000"/>
+              </a:spcBef>
+              <a:buFont typeface="Arial" panose="020B0604020202020204" pitchFamily="34" charset="0"/>
+              <a:buChar char="•"/>
+              <a:defRPr sz="2800" kern="1200">
+                <a:solidFill>
+                  <a:schemeClr val="tx1"/>
+                </a:solidFill>
+                <a:latin typeface="+mn-lt"/>
+                <a:ea typeface="+mn-ea"/>
+                <a:cs typeface="+mn-cs"/>
+              </a:defRPr>
+            </a:lvl1pPr>
+            <a:lvl2pPr marL="685800" indent="-228600" algn="l" defTabSz="914400" rtl="0" eaLnBrk="1" latinLnBrk="0" hangingPunct="1">
+              <a:lnSpc>
+                <a:spcPct val="90000"/>
+              </a:lnSpc>
+              <a:spcBef>
+                <a:spcPts val="500"/>
+              </a:spcBef>
+              <a:buFont typeface="Arial" panose="020B0604020202020204" pitchFamily="34" charset="0"/>
+              <a:buChar char="•"/>
+              <a:defRPr sz="2400" kern="1200">
+                <a:solidFill>
+                  <a:schemeClr val="tx1"/>
+                </a:solidFill>
+                <a:latin typeface="+mn-lt"/>
+                <a:ea typeface="+mn-ea"/>
+                <a:cs typeface="+mn-cs"/>
+              </a:defRPr>
+            </a:lvl2pPr>
+            <a:lvl3pPr marL="1143000" indent="-228600" algn="l" defTabSz="914400" rtl="0" eaLnBrk="1" latinLnBrk="0" hangingPunct="1">
+              <a:lnSpc>
+                <a:spcPct val="90000"/>
+              </a:lnSpc>
+              <a:spcBef>
+                <a:spcPts val="500"/>
+              </a:spcBef>
+              <a:buFont typeface="Arial" panose="020B0604020202020204" pitchFamily="34" charset="0"/>
+              <a:buChar char="•"/>
+              <a:defRPr sz="2000" kern="1200">
+                <a:solidFill>
+                  <a:schemeClr val="tx1"/>
+                </a:solidFill>
+                <a:latin typeface="+mn-lt"/>
+                <a:ea typeface="+mn-ea"/>
+                <a:cs typeface="+mn-cs"/>
+              </a:defRPr>
+            </a:lvl3pPr>
+            <a:lvl4pPr marL="1600200" indent="-228600" algn="l" defTabSz="914400" rtl="0" eaLnBrk="1" latinLnBrk="0" hangingPunct="1">
+              <a:lnSpc>
+                <a:spcPct val="90000"/>
+              </a:lnSpc>
+              <a:spcBef>
+                <a:spcPts val="500"/>
+              </a:spcBef>
+              <a:buFont typeface="Arial" panose="020B0604020202020204" pitchFamily="34" charset="0"/>
+              <a:buChar char="•"/>
+              <a:defRPr sz="1800" kern="1200">
+                <a:solidFill>
+                  <a:schemeClr val="tx1"/>
+                </a:solidFill>
+                <a:latin typeface="+mn-lt"/>
+                <a:ea typeface="+mn-ea"/>
+                <a:cs typeface="+mn-cs"/>
+              </a:defRPr>
+            </a:lvl4pPr>
+            <a:lvl5pPr marL="2057400" indent="-228600" algn="l" defTabSz="914400" rtl="0" eaLnBrk="1" latinLnBrk="0" hangingPunct="1">
+              <a:lnSpc>
+                <a:spcPct val="90000"/>
+              </a:lnSpc>
+              <a:spcBef>
+                <a:spcPts val="500"/>
+              </a:spcBef>
+              <a:buFont typeface="Arial" panose="020B0604020202020204" pitchFamily="34" charset="0"/>
+              <a:buChar char="•"/>
+              <a:defRPr sz="1800" kern="1200">
+                <a:solidFill>
+                  <a:schemeClr val="tx1"/>
+                </a:solidFill>
+                <a:latin typeface="+mn-lt"/>
+                <a:ea typeface="+mn-ea"/>
+                <a:cs typeface="+mn-cs"/>
+              </a:defRPr>
+            </a:lvl5pPr>
+            <a:lvl6pPr marL="2514600" indent="-228600" algn="l" defTabSz="914400" rtl="0" eaLnBrk="1" latinLnBrk="0" hangingPunct="1">
+              <a:lnSpc>
+                <a:spcPct val="90000"/>
+              </a:lnSpc>
+              <a:spcBef>
+                <a:spcPts val="500"/>
+              </a:spcBef>
+              <a:buFont typeface="Arial" panose="020B0604020202020204" pitchFamily="34" charset="0"/>
+              <a:buChar char="•"/>
+              <a:defRPr sz="1800" kern="1200">
+                <a:solidFill>
+                  <a:schemeClr val="tx1"/>
+                </a:solidFill>
+                <a:latin typeface="+mn-lt"/>
+                <a:ea typeface="+mn-ea"/>
+                <a:cs typeface="+mn-cs"/>
+              </a:defRPr>
+            </a:lvl6pPr>
+            <a:lvl7pPr marL="2971800" indent="-228600" algn="l" defTabSz="914400" rtl="0" eaLnBrk="1" latinLnBrk="0" hangingPunct="1">
+              <a:lnSpc>
+                <a:spcPct val="90000"/>
+              </a:lnSpc>
+              <a:spcBef>
+                <a:spcPts val="500"/>
+              </a:spcBef>
+              <a:buFont typeface="Arial" panose="020B0604020202020204" pitchFamily="34" charset="0"/>
+              <a:buChar char="•"/>
+              <a:defRPr sz="1800" kern="1200">
+                <a:solidFill>
+                  <a:schemeClr val="tx1"/>
+                </a:solidFill>
+                <a:latin typeface="+mn-lt"/>
+                <a:ea typeface="+mn-ea"/>
+                <a:cs typeface="+mn-cs"/>
+              </a:defRPr>
+            </a:lvl7pPr>
+            <a:lvl8pPr marL="3429000" indent="-228600" algn="l" defTabSz="914400" rtl="0" eaLnBrk="1" latinLnBrk="0" hangingPunct="1">
+              <a:lnSpc>
+                <a:spcPct val="90000"/>
+              </a:lnSpc>
+              <a:spcBef>
+                <a:spcPts val="500"/>
+              </a:spcBef>
+              <a:buFont typeface="Arial" panose="020B0604020202020204" pitchFamily="34" charset="0"/>
+              <a:buChar char="•"/>
+              <a:defRPr sz="1800" kern="1200">
+                <a:solidFill>
+                  <a:schemeClr val="tx1"/>
+                </a:solidFill>
+                <a:latin typeface="+mn-lt"/>
+                <a:ea typeface="+mn-ea"/>
+                <a:cs typeface="+mn-cs"/>
+              </a:defRPr>
+            </a:lvl8pPr>
+            <a:lvl9pPr marL="3886200" indent="-228600" algn="l" defTabSz="914400" rtl="0" eaLnBrk="1" latinLnBrk="0" hangingPunct="1">
+              <a:lnSpc>
+                <a:spcPct val="90000"/>
+              </a:lnSpc>
+              <a:spcBef>
+                <a:spcPts val="500"/>
+              </a:spcBef>
+              <a:buFont typeface="Arial" panose="020B0604020202020204" pitchFamily="34" charset="0"/>
+              <a:buChar char="•"/>
+              <a:defRPr sz="1800" kern="1200">
+                <a:solidFill>
+                  <a:schemeClr val="tx1"/>
+                </a:solidFill>
+                <a:latin typeface="+mn-lt"/>
+                <a:ea typeface="+mn-ea"/>
+                <a:cs typeface="+mn-cs"/>
+              </a:defRPr>
+            </a:lvl9pPr>
+          </a:lstStyle>
+          <a:p>
+            <a:pPr marL="0" marR="0" lvl="0" indent="0" algn="l" defTabSz="914400" rtl="0" eaLnBrk="1" fontAlgn="auto" latinLnBrk="0" hangingPunct="1">
+              <a:lnSpc>
+                <a:spcPct val="90000"/>
+              </a:lnSpc>
+              <a:spcBef>
+                <a:spcPts val="1000"/>
+              </a:spcBef>
+              <a:spcAft>
+                <a:spcPts val="0"/>
+              </a:spcAft>
+              <a:buClrTx/>
+              <a:buSzTx/>
+              <a:buFont typeface="Arial" panose="020B0604020202020204" pitchFamily="34" charset="0"/>
+              <a:buNone/>
+              <a:tabLst/>
+              <a:defRPr/>
+            </a:pPr>
+            <a:r>
+              <a:rPr kumimoji="0" lang="en-GB" sz="2800" b="0" i="0" u="none" strike="noStrike" kern="1200" cap="none" spc="0" normalizeH="0" baseline="0" noProof="0" dirty="0">
+                <a:ln>
+                  <a:noFill/>
+                </a:ln>
+                <a:solidFill>
+                  <a:srgbClr val="000000"/>
+                </a:solidFill>
+                <a:effectLst/>
+                <a:uLnTx/>
+                <a:uFillTx/>
+                <a:latin typeface="Menlo" panose="020B0609030804020204" pitchFamily="49" charset="0"/>
+                <a:ea typeface="+mn-ea"/>
+                <a:cs typeface="+mn-cs"/>
+              </a:rPr>
+              <a:t>We did use chat GPT 3.5, 4.0 and 4.0omega, Microsoft </a:t>
+            </a:r>
+            <a:r>
+              <a:rPr kumimoji="0" lang="en-GB" sz="2800" b="0" i="0" u="none" strike="noStrike" kern="1200" cap="none" spc="0" normalizeH="0" baseline="0" noProof="0" dirty="0" err="1">
+                <a:ln>
+                  <a:noFill/>
+                </a:ln>
+                <a:solidFill>
+                  <a:srgbClr val="000000"/>
+                </a:solidFill>
+                <a:effectLst/>
+                <a:uLnTx/>
+                <a:uFillTx/>
+                <a:latin typeface="Menlo" panose="020B0609030804020204" pitchFamily="49" charset="0"/>
+                <a:ea typeface="+mn-ea"/>
+                <a:cs typeface="+mn-cs"/>
+              </a:rPr>
+              <a:t>Copilot</a:t>
+            </a:r>
+            <a:r>
+              <a:rPr kumimoji="0" lang="en-GB" sz="2800" b="0" i="0" u="none" strike="noStrike" kern="1200" cap="none" spc="0" normalizeH="0" baseline="0" noProof="0" dirty="0">
+                <a:ln>
+                  <a:noFill/>
+                </a:ln>
+                <a:solidFill>
+                  <a:srgbClr val="000000"/>
+                </a:solidFill>
+                <a:effectLst/>
+                <a:uLnTx/>
+                <a:uFillTx/>
+                <a:latin typeface="Menlo" panose="020B0609030804020204" pitchFamily="49" charset="0"/>
+                <a:ea typeface="+mn-ea"/>
+                <a:cs typeface="+mn-cs"/>
+              </a:rPr>
+              <a:t> for code errors resolution.</a:t>
+            </a:r>
+          </a:p>
+        </p:txBody>
+      </p:sp>
+      <p:sp>
+        <p:nvSpPr>
+          <p:cNvPr id="14" name="Rectangle 13">
+            <a:extLst>
+              <a:ext uri="{FF2B5EF4-FFF2-40B4-BE49-F238E27FC236}">
+                <a16:creationId xmlns:a16="http://schemas.microsoft.com/office/drawing/2014/main" id="{7004738A-9D34-43E8-97D2-CA0EED4F8BE0}"/>
+              </a:ext>
+              <a:ext uri="{C183D7F6-B498-43B3-948B-1728B52AA6E4}">
+                <adec:decorative xmlns:adec="http://schemas.microsoft.com/office/drawing/2017/decorative" val="1"/>
+              </a:ext>
+            </a:extLst>
+          </p:cNvPr>
+          <p:cNvSpPr>
+            <a:spLocks noGrp="1" noRot="1" noChangeAspect="1" noMove="1" noResize="1" noEditPoints="1" noAdjustHandles="1" noChangeArrowheads="1" noChangeShapeType="1" noTextEdit="1"/>
+          </p:cNvSpPr>
+          <p:nvPr>
+            <p:extLst>
+              <p:ext uri="{386F3935-93C4-4BCD-93E2-E3B085C9AB24}">
+                <p16:designElem xmlns:p16="http://schemas.microsoft.com/office/powerpoint/2015/main" val="1"/>
+              </p:ext>
+            </p:extLst>
+          </p:nvPr>
+        </p:nvSpPr>
+        <p:spPr>
+          <a:xfrm rot="10800000" flipH="1">
+            <a:off x="8123333" y="-5"/>
+            <a:ext cx="4092521" cy="6858000"/>
+          </a:xfrm>
+          <a:prstGeom prst="rect">
+            <a:avLst/>
+          </a:prstGeom>
+          <a:gradFill>
+            <a:gsLst>
+              <a:gs pos="8000">
+                <a:srgbClr val="000000">
+                  <a:alpha val="94000"/>
+                </a:srgbClr>
+              </a:gs>
+              <a:gs pos="100000">
+                <a:schemeClr val="accent1"/>
+              </a:gs>
+            </a:gsLst>
+            <a:lin ang="2400000" scaled="0"/>
+          </a:gradFill>
+          <a:ln>
+            <a:noFill/>
+          </a:ln>
+        </p:spPr>
+        <p:style>
+          <a:lnRef idx="2">
+            <a:schemeClr val="accent1">
+              <a:shade val="50000"/>
+            </a:schemeClr>
+          </a:lnRef>
+          <a:fillRef idx="1">
+            <a:schemeClr val="accent1"/>
+          </a:fillRef>
+          <a:effectRef idx="0">
+            <a:schemeClr val="accent1"/>
+          </a:effectRef>
+          <a:fontRef idx="minor">
+            <a:schemeClr val="lt1"/>
+          </a:fontRef>
+        </p:style>
+        <p:txBody>
+          <a:bodyPr rtlCol="0" anchor="ctr"/>
+          <a:lstStyle/>
+          <a:p>
+            <a:pPr marL="0" marR="0" lvl="0" indent="0" algn="ctr" defTabSz="914400" rtl="0" eaLnBrk="1" fontAlgn="auto" latinLnBrk="0" hangingPunct="1">
+              <a:lnSpc>
+                <a:spcPct val="100000"/>
+              </a:lnSpc>
+              <a:spcBef>
+                <a:spcPts val="0"/>
+              </a:spcBef>
+              <a:spcAft>
+                <a:spcPts val="0"/>
+              </a:spcAft>
+              <a:buClrTx/>
+              <a:buSzTx/>
+              <a:buFontTx/>
+              <a:buNone/>
+              <a:tabLst/>
+              <a:defRPr/>
+            </a:pPr>
+            <a:endParaRPr kumimoji="0" lang="en-US" sz="1800" b="0" i="0" u="none" strike="noStrike" kern="1200" cap="none" spc="0" normalizeH="0" baseline="0" noProof="0">
+              <a:ln>
+                <a:noFill/>
+              </a:ln>
+              <a:solidFill>
+                <a:prstClr val="white"/>
+              </a:solidFill>
+              <a:effectLst/>
+              <a:uLnTx/>
+              <a:uFillTx/>
+              <a:latin typeface="Aptos" panose="02110004020202020204"/>
+              <a:ea typeface="+mn-ea"/>
+              <a:cs typeface="+mn-cs"/>
+            </a:endParaRPr>
+          </a:p>
+        </p:txBody>
+      </p:sp>
+      <p:sp>
+        <p:nvSpPr>
+          <p:cNvPr id="16" name="Rectangle 15">
+            <a:extLst>
+              <a:ext uri="{FF2B5EF4-FFF2-40B4-BE49-F238E27FC236}">
+                <a16:creationId xmlns:a16="http://schemas.microsoft.com/office/drawing/2014/main" id="{B8B8D07F-F13E-443E-BA68-2D26672D76B9}"/>
+              </a:ext>
+              <a:ext uri="{C183D7F6-B498-43B3-948B-1728B52AA6E4}">
+                <adec:decorative xmlns:adec="http://schemas.microsoft.com/office/drawing/2017/decorative" val="1"/>
+              </a:ext>
+            </a:extLst>
+          </p:cNvPr>
+          <p:cNvSpPr>
+            <a:spLocks noGrp="1" noRot="1" noChangeAspect="1" noMove="1" noResize="1" noEditPoints="1" noAdjustHandles="1" noChangeArrowheads="1" noChangeShapeType="1" noTextEdit="1"/>
+          </p:cNvSpPr>
+          <p:nvPr>
+            <p:extLst>
+              <p:ext uri="{386F3935-93C4-4BCD-93E2-E3B085C9AB24}">
+                <p16:designElem xmlns:p16="http://schemas.microsoft.com/office/powerpoint/2015/main" val="1"/>
+              </p:ext>
+            </p:extLst>
+          </p:nvPr>
+        </p:nvSpPr>
+        <p:spPr>
+          <a:xfrm rot="10800000" flipH="1">
+            <a:off x="8123333" y="-2"/>
+            <a:ext cx="4092521" cy="6400369"/>
+          </a:xfrm>
+          <a:prstGeom prst="rect">
+            <a:avLst/>
+          </a:prstGeom>
+          <a:gradFill>
+            <a:gsLst>
+              <a:gs pos="31000">
+                <a:schemeClr val="accent1">
+                  <a:lumMod val="50000"/>
+                  <a:alpha val="0"/>
+                </a:schemeClr>
+              </a:gs>
+              <a:gs pos="100000">
+                <a:schemeClr val="accent1">
+                  <a:lumMod val="50000"/>
+                  <a:alpha val="26000"/>
+                </a:schemeClr>
+              </a:gs>
+            </a:gsLst>
+            <a:lin ang="18000000" scaled="0"/>
+          </a:gradFill>
+          <a:ln>
+            <a:noFill/>
+          </a:ln>
+        </p:spPr>
+        <p:style>
+          <a:lnRef idx="2">
+            <a:schemeClr val="accent1">
+              <a:shade val="50000"/>
+            </a:schemeClr>
+          </a:lnRef>
+          <a:fillRef idx="1">
+            <a:schemeClr val="accent1"/>
+          </a:fillRef>
+          <a:effectRef idx="0">
+            <a:schemeClr val="accent1"/>
+          </a:effectRef>
+          <a:fontRef idx="minor">
+            <a:schemeClr val="lt1"/>
+          </a:fontRef>
+        </p:style>
+        <p:txBody>
+          <a:bodyPr rtlCol="0" anchor="ctr"/>
+          <a:lstStyle/>
+          <a:p>
+            <a:pPr marL="0" marR="0" lvl="0" indent="0" algn="ctr" defTabSz="914400" rtl="0" eaLnBrk="1" fontAlgn="auto" latinLnBrk="0" hangingPunct="1">
+              <a:lnSpc>
+                <a:spcPct val="100000"/>
+              </a:lnSpc>
+              <a:spcBef>
+                <a:spcPts val="0"/>
+              </a:spcBef>
+              <a:spcAft>
+                <a:spcPts val="0"/>
+              </a:spcAft>
+              <a:buClrTx/>
+              <a:buSzTx/>
+              <a:buFontTx/>
+              <a:buNone/>
+              <a:tabLst/>
+              <a:defRPr/>
+            </a:pPr>
+            <a:endParaRPr kumimoji="0" lang="en-US" sz="1800" b="0" i="0" u="none" strike="noStrike" kern="1200" cap="none" spc="0" normalizeH="0" baseline="0" noProof="0" dirty="0">
+              <a:ln>
+                <a:noFill/>
+              </a:ln>
+              <a:solidFill>
+                <a:prstClr val="white"/>
+              </a:solidFill>
+              <a:effectLst/>
+              <a:uLnTx/>
+              <a:uFillTx/>
+              <a:latin typeface="Aptos" panose="02110004020202020204"/>
+              <a:ea typeface="+mn-ea"/>
+              <a:cs typeface="+mn-cs"/>
+            </a:endParaRPr>
+          </a:p>
+        </p:txBody>
+      </p:sp>
+      <p:sp>
+        <p:nvSpPr>
+          <p:cNvPr id="18" name="Rectangle 17">
+            <a:extLst>
+              <a:ext uri="{FF2B5EF4-FFF2-40B4-BE49-F238E27FC236}">
+                <a16:creationId xmlns:a16="http://schemas.microsoft.com/office/drawing/2014/main" id="{2813A4FA-24A5-41ED-A534-3807D1B2F344}"/>
+              </a:ext>
+              <a:ext uri="{C183D7F6-B498-43B3-948B-1728B52AA6E4}">
+                <adec:decorative xmlns:adec="http://schemas.microsoft.com/office/drawing/2017/decorative" val="1"/>
+              </a:ext>
+            </a:extLst>
+          </p:cNvPr>
+          <p:cNvSpPr>
+            <a:spLocks noGrp="1" noRot="1" noChangeAspect="1" noMove="1" noResize="1" noEditPoints="1" noAdjustHandles="1" noChangeArrowheads="1" noChangeShapeType="1" noTextEdit="1"/>
+          </p:cNvSpPr>
+          <p:nvPr>
+            <p:extLst>
+              <p:ext uri="{386F3935-93C4-4BCD-93E2-E3B085C9AB24}">
+                <p16:designElem xmlns:p16="http://schemas.microsoft.com/office/powerpoint/2015/main" val="1"/>
+              </p:ext>
+            </p:extLst>
+          </p:nvPr>
+        </p:nvSpPr>
+        <p:spPr>
+          <a:xfrm rot="10800000" flipH="1">
+            <a:off x="8123333" y="-22"/>
+            <a:ext cx="4068667" cy="6400389"/>
+          </a:xfrm>
+          <a:prstGeom prst="rect">
+            <a:avLst/>
+          </a:prstGeom>
+          <a:gradFill>
+            <a:gsLst>
+              <a:gs pos="0">
+                <a:schemeClr val="accent1">
+                  <a:alpha val="0"/>
+                </a:schemeClr>
+              </a:gs>
+              <a:gs pos="72000">
+                <a:srgbClr val="000000">
+                  <a:alpha val="21000"/>
+                </a:srgbClr>
+              </a:gs>
+            </a:gsLst>
+            <a:lin ang="3000000" scaled="0"/>
+          </a:gradFill>
+          <a:ln>
+            <a:noFill/>
+          </a:ln>
+        </p:spPr>
+        <p:style>
+          <a:lnRef idx="2">
+            <a:schemeClr val="accent1">
+              <a:shade val="50000"/>
+            </a:schemeClr>
+          </a:lnRef>
+          <a:fillRef idx="1">
+            <a:schemeClr val="accent1"/>
+          </a:fillRef>
+          <a:effectRef idx="0">
+            <a:schemeClr val="accent1"/>
+          </a:effectRef>
+          <a:fontRef idx="minor">
+            <a:schemeClr val="lt1"/>
+          </a:fontRef>
+        </p:style>
+        <p:txBody>
+          <a:bodyPr rtlCol="0" anchor="ctr"/>
+          <a:lstStyle/>
+          <a:p>
+            <a:pPr marL="0" marR="0" lvl="0" indent="0" algn="ctr" defTabSz="914400" rtl="0" eaLnBrk="1" fontAlgn="auto" latinLnBrk="0" hangingPunct="1">
+              <a:lnSpc>
+                <a:spcPct val="100000"/>
+              </a:lnSpc>
+              <a:spcBef>
+                <a:spcPts val="0"/>
+              </a:spcBef>
+              <a:spcAft>
+                <a:spcPts val="0"/>
+              </a:spcAft>
+              <a:buClrTx/>
+              <a:buSzTx/>
+              <a:buFontTx/>
+              <a:buNone/>
+              <a:tabLst/>
+              <a:defRPr/>
+            </a:pPr>
+            <a:endParaRPr kumimoji="0" lang="en-US" sz="1800" b="0" i="0" u="none" strike="noStrike" kern="1200" cap="none" spc="0" normalizeH="0" baseline="0" noProof="0" dirty="0">
+              <a:ln>
+                <a:noFill/>
+              </a:ln>
+              <a:solidFill>
+                <a:prstClr val="white"/>
+              </a:solidFill>
+              <a:effectLst/>
+              <a:uLnTx/>
+              <a:uFillTx/>
+              <a:latin typeface="Aptos" panose="02110004020202020204"/>
+              <a:ea typeface="+mn-ea"/>
+              <a:cs typeface="+mn-cs"/>
+            </a:endParaRPr>
+          </a:p>
+        </p:txBody>
+      </p:sp>
+      <p:sp>
+        <p:nvSpPr>
+          <p:cNvPr id="20" name="Rectangle 19">
+            <a:extLst>
+              <a:ext uri="{FF2B5EF4-FFF2-40B4-BE49-F238E27FC236}">
+                <a16:creationId xmlns:a16="http://schemas.microsoft.com/office/drawing/2014/main" id="{C3944F27-CA70-4E84-A51A-E6BF89558979}"/>
+              </a:ext>
+              <a:ext uri="{C183D7F6-B498-43B3-948B-1728B52AA6E4}">
+                <adec:decorative xmlns:adec="http://schemas.microsoft.com/office/drawing/2017/decorative" val="1"/>
+              </a:ext>
+            </a:extLst>
+          </p:cNvPr>
+          <p:cNvSpPr>
+            <a:spLocks noGrp="1" noRot="1" noChangeAspect="1" noMove="1" noResize="1" noEditPoints="1" noAdjustHandles="1" noChangeArrowheads="1" noChangeShapeType="1" noTextEdit="1"/>
+          </p:cNvSpPr>
+          <p:nvPr>
+            <p:extLst>
+              <p:ext uri="{386F3935-93C4-4BCD-93E2-E3B085C9AB24}">
+                <p16:designElem xmlns:p16="http://schemas.microsoft.com/office/powerpoint/2015/main" val="1"/>
+              </p:ext>
+            </p:extLst>
+          </p:nvPr>
+        </p:nvSpPr>
+        <p:spPr>
+          <a:xfrm rot="10800000" flipH="1">
+            <a:off x="8123333" y="-10"/>
+            <a:ext cx="3611467" cy="6857997"/>
+          </a:xfrm>
+          <a:prstGeom prst="rect">
+            <a:avLst/>
+          </a:prstGeom>
+          <a:gradFill>
+            <a:gsLst>
+              <a:gs pos="0">
+                <a:schemeClr val="accent1">
+                  <a:alpha val="0"/>
+                </a:schemeClr>
+              </a:gs>
+              <a:gs pos="93000">
+                <a:srgbClr val="000000">
+                  <a:alpha val="29000"/>
+                </a:srgbClr>
+              </a:gs>
+            </a:gsLst>
+            <a:lin ang="5400000" scaled="0"/>
+          </a:gradFill>
+          <a:ln>
+            <a:noFill/>
+          </a:ln>
+        </p:spPr>
+        <p:style>
+          <a:lnRef idx="2">
+            <a:schemeClr val="accent1">
+              <a:shade val="50000"/>
+            </a:schemeClr>
+          </a:lnRef>
+          <a:fillRef idx="1">
+            <a:schemeClr val="accent1"/>
+          </a:fillRef>
+          <a:effectRef idx="0">
+            <a:schemeClr val="accent1"/>
+          </a:effectRef>
+          <a:fontRef idx="minor">
+            <a:schemeClr val="lt1"/>
+          </a:fontRef>
+        </p:style>
+        <p:txBody>
+          <a:bodyPr rtlCol="0" anchor="ctr"/>
+          <a:lstStyle/>
+          <a:p>
+            <a:pPr marL="0" marR="0" lvl="0" indent="0" algn="ctr" defTabSz="914400" rtl="0" eaLnBrk="1" fontAlgn="auto" latinLnBrk="0" hangingPunct="1">
+              <a:lnSpc>
+                <a:spcPct val="100000"/>
+              </a:lnSpc>
+              <a:spcBef>
+                <a:spcPts val="0"/>
+              </a:spcBef>
+              <a:spcAft>
+                <a:spcPts val="0"/>
+              </a:spcAft>
+              <a:buClrTx/>
+              <a:buSzTx/>
+              <a:buFontTx/>
+              <a:buNone/>
+              <a:tabLst/>
+              <a:defRPr/>
+            </a:pPr>
+            <a:endParaRPr kumimoji="0" lang="en-US" sz="1800" b="0" i="0" u="none" strike="noStrike" kern="1200" cap="none" spc="0" normalizeH="0" baseline="0" noProof="0" dirty="0">
+              <a:ln>
+                <a:noFill/>
+              </a:ln>
+              <a:solidFill>
+                <a:prstClr val="white"/>
+              </a:solidFill>
+              <a:effectLst/>
+              <a:uLnTx/>
+              <a:uFillTx/>
+              <a:latin typeface="Aptos" panose="02110004020202020204"/>
+              <a:ea typeface="+mn-ea"/>
+              <a:cs typeface="+mn-cs"/>
+            </a:endParaRPr>
+          </a:p>
+        </p:txBody>
+      </p:sp>
+      <p:sp>
+        <p:nvSpPr>
+          <p:cNvPr id="5" name="Content Placeholder 2">
+            <a:extLst>
+              <a:ext uri="{FF2B5EF4-FFF2-40B4-BE49-F238E27FC236}">
+                <a16:creationId xmlns:a16="http://schemas.microsoft.com/office/drawing/2014/main" id="{19509C26-039A-EC7F-1AFB-262954821CEE}"/>
+              </a:ext>
+            </a:extLst>
+          </p:cNvPr>
+          <p:cNvSpPr txBox="1">
+            <a:spLocks/>
+          </p:cNvSpPr>
+          <p:nvPr/>
+        </p:nvSpPr>
+        <p:spPr>
+          <a:xfrm>
+            <a:off x="1297323" y="2558294"/>
+            <a:ext cx="5429298" cy="3535083"/>
+          </a:xfrm>
+          <a:prstGeom prst="rect">
+            <a:avLst/>
+          </a:prstGeom>
+        </p:spPr>
+        <p:txBody>
+          <a:bodyPr vert="horz" lIns="91440" tIns="45720" rIns="91440" bIns="45720" rtlCol="0" anchor="t">
+            <a:normAutofit/>
+          </a:bodyPr>
+          <a:lstStyle>
+            <a:lvl1pPr marL="228600" indent="-228600" algn="l" defTabSz="914400" rtl="0" eaLnBrk="1" latinLnBrk="0" hangingPunct="1">
+              <a:lnSpc>
+                <a:spcPct val="90000"/>
+              </a:lnSpc>
+              <a:spcBef>
+                <a:spcPts val="1000"/>
+              </a:spcBef>
+              <a:buFont typeface="Arial" panose="020B0604020202020204" pitchFamily="34" charset="0"/>
+              <a:buChar char="•"/>
+              <a:defRPr sz="2800" kern="1200">
+                <a:solidFill>
+                  <a:schemeClr val="tx1"/>
+                </a:solidFill>
+                <a:latin typeface="+mn-lt"/>
+                <a:ea typeface="+mn-ea"/>
+                <a:cs typeface="+mn-cs"/>
+              </a:defRPr>
+            </a:lvl1pPr>
+            <a:lvl2pPr marL="685800" indent="-228600" algn="l" defTabSz="914400" rtl="0" eaLnBrk="1" latinLnBrk="0" hangingPunct="1">
+              <a:lnSpc>
+                <a:spcPct val="90000"/>
+              </a:lnSpc>
+              <a:spcBef>
+                <a:spcPts val="500"/>
+              </a:spcBef>
+              <a:buFont typeface="Arial" panose="020B0604020202020204" pitchFamily="34" charset="0"/>
+              <a:buChar char="•"/>
+              <a:defRPr sz="2400" kern="1200">
+                <a:solidFill>
+                  <a:schemeClr val="tx1"/>
+                </a:solidFill>
+                <a:latin typeface="+mn-lt"/>
+                <a:ea typeface="+mn-ea"/>
+                <a:cs typeface="+mn-cs"/>
+              </a:defRPr>
+            </a:lvl2pPr>
+            <a:lvl3pPr marL="1143000" indent="-228600" algn="l" defTabSz="914400" rtl="0" eaLnBrk="1" latinLnBrk="0" hangingPunct="1">
+              <a:lnSpc>
+                <a:spcPct val="90000"/>
+              </a:lnSpc>
+              <a:spcBef>
+                <a:spcPts val="500"/>
+              </a:spcBef>
+              <a:buFont typeface="Arial" panose="020B0604020202020204" pitchFamily="34" charset="0"/>
+              <a:buChar char="•"/>
+              <a:defRPr sz="2000" kern="1200">
+                <a:solidFill>
+                  <a:schemeClr val="tx1"/>
+                </a:solidFill>
+                <a:latin typeface="+mn-lt"/>
+                <a:ea typeface="+mn-ea"/>
+                <a:cs typeface="+mn-cs"/>
+              </a:defRPr>
+            </a:lvl3pPr>
+            <a:lvl4pPr marL="1600200" indent="-228600" algn="l" defTabSz="914400" rtl="0" eaLnBrk="1" latinLnBrk="0" hangingPunct="1">
+              <a:lnSpc>
+                <a:spcPct val="90000"/>
+              </a:lnSpc>
+              <a:spcBef>
+                <a:spcPts val="500"/>
+              </a:spcBef>
+              <a:buFont typeface="Arial" panose="020B0604020202020204" pitchFamily="34" charset="0"/>
+              <a:buChar char="•"/>
+              <a:defRPr sz="1800" kern="1200">
+                <a:solidFill>
+                  <a:schemeClr val="tx1"/>
+                </a:solidFill>
+                <a:latin typeface="+mn-lt"/>
+                <a:ea typeface="+mn-ea"/>
+                <a:cs typeface="+mn-cs"/>
+              </a:defRPr>
+            </a:lvl4pPr>
+            <a:lvl5pPr marL="2057400" indent="-228600" algn="l" defTabSz="914400" rtl="0" eaLnBrk="1" latinLnBrk="0" hangingPunct="1">
+              <a:lnSpc>
+                <a:spcPct val="90000"/>
+              </a:lnSpc>
+              <a:spcBef>
+                <a:spcPts val="500"/>
+              </a:spcBef>
+              <a:buFont typeface="Arial" panose="020B0604020202020204" pitchFamily="34" charset="0"/>
+              <a:buChar char="•"/>
+              <a:defRPr sz="1800" kern="1200">
+                <a:solidFill>
+                  <a:schemeClr val="tx1"/>
+                </a:solidFill>
+                <a:latin typeface="+mn-lt"/>
+                <a:ea typeface="+mn-ea"/>
+                <a:cs typeface="+mn-cs"/>
+              </a:defRPr>
+            </a:lvl5pPr>
+            <a:lvl6pPr marL="2514600" indent="-228600" algn="l" defTabSz="914400" rtl="0" eaLnBrk="1" latinLnBrk="0" hangingPunct="1">
+              <a:lnSpc>
+                <a:spcPct val="90000"/>
+              </a:lnSpc>
+              <a:spcBef>
+                <a:spcPts val="500"/>
+              </a:spcBef>
+              <a:buFont typeface="Arial" panose="020B0604020202020204" pitchFamily="34" charset="0"/>
+              <a:buChar char="•"/>
+              <a:defRPr sz="1800" kern="1200">
+                <a:solidFill>
+                  <a:schemeClr val="tx1"/>
+                </a:solidFill>
+                <a:latin typeface="+mn-lt"/>
+                <a:ea typeface="+mn-ea"/>
+                <a:cs typeface="+mn-cs"/>
+              </a:defRPr>
+            </a:lvl6pPr>
+            <a:lvl7pPr marL="2971800" indent="-228600" algn="l" defTabSz="914400" rtl="0" eaLnBrk="1" latinLnBrk="0" hangingPunct="1">
+              <a:lnSpc>
+                <a:spcPct val="90000"/>
+              </a:lnSpc>
+              <a:spcBef>
+                <a:spcPts val="500"/>
+              </a:spcBef>
+              <a:buFont typeface="Arial" panose="020B0604020202020204" pitchFamily="34" charset="0"/>
+              <a:buChar char="•"/>
+              <a:defRPr sz="1800" kern="1200">
+                <a:solidFill>
+                  <a:schemeClr val="tx1"/>
+                </a:solidFill>
+                <a:latin typeface="+mn-lt"/>
+                <a:ea typeface="+mn-ea"/>
+                <a:cs typeface="+mn-cs"/>
+              </a:defRPr>
+            </a:lvl7pPr>
+            <a:lvl8pPr marL="3429000" indent="-228600" algn="l" defTabSz="914400" rtl="0" eaLnBrk="1" latinLnBrk="0" hangingPunct="1">
+              <a:lnSpc>
+                <a:spcPct val="90000"/>
+              </a:lnSpc>
+              <a:spcBef>
+                <a:spcPts val="500"/>
+              </a:spcBef>
+              <a:buFont typeface="Arial" panose="020B0604020202020204" pitchFamily="34" charset="0"/>
+              <a:buChar char="•"/>
+              <a:defRPr sz="1800" kern="1200">
+                <a:solidFill>
+                  <a:schemeClr val="tx1"/>
+                </a:solidFill>
+                <a:latin typeface="+mn-lt"/>
+                <a:ea typeface="+mn-ea"/>
+                <a:cs typeface="+mn-cs"/>
+              </a:defRPr>
+            </a:lvl8pPr>
+            <a:lvl9pPr marL="3886200" indent="-228600" algn="l" defTabSz="914400" rtl="0" eaLnBrk="1" latinLnBrk="0" hangingPunct="1">
+              <a:lnSpc>
+                <a:spcPct val="90000"/>
+              </a:lnSpc>
+              <a:spcBef>
+                <a:spcPts val="500"/>
+              </a:spcBef>
+              <a:buFont typeface="Arial" panose="020B0604020202020204" pitchFamily="34" charset="0"/>
+              <a:buChar char="•"/>
+              <a:defRPr sz="1800" kern="1200">
+                <a:solidFill>
+                  <a:schemeClr val="tx1"/>
+                </a:solidFill>
+                <a:latin typeface="+mn-lt"/>
+                <a:ea typeface="+mn-ea"/>
+                <a:cs typeface="+mn-cs"/>
+              </a:defRPr>
+            </a:lvl9pPr>
+          </a:lstStyle>
+          <a:p>
+            <a:pPr marL="0" marR="0" lvl="0" indent="0" algn="l" defTabSz="914400" rtl="0" eaLnBrk="1" fontAlgn="auto" latinLnBrk="0" hangingPunct="1">
+              <a:lnSpc>
+                <a:spcPct val="90000"/>
+              </a:lnSpc>
+              <a:spcBef>
+                <a:spcPts val="1000"/>
+              </a:spcBef>
+              <a:spcAft>
+                <a:spcPts val="0"/>
+              </a:spcAft>
+              <a:buClrTx/>
+              <a:buSzTx/>
+              <a:buFont typeface="Arial" panose="020B0604020202020204" pitchFamily="34" charset="0"/>
+              <a:buNone/>
+              <a:tabLst/>
+              <a:defRPr/>
+            </a:pPr>
+            <a:endParaRPr kumimoji="0" lang="en-PL" sz="2800" b="0" i="0" u="none" strike="noStrike" kern="1200" cap="none" spc="0" normalizeH="0" baseline="0" noProof="0" dirty="0">
+              <a:ln>
+                <a:noFill/>
+              </a:ln>
+              <a:solidFill>
+                <a:srgbClr val="000000"/>
+              </a:solidFill>
+              <a:effectLst/>
+              <a:uLnTx/>
+              <a:uFillTx/>
+              <a:latin typeface="Menlo" panose="020B0609030804020204" pitchFamily="49" charset="0"/>
+              <a:ea typeface="+mn-ea"/>
+              <a:cs typeface="+mn-cs"/>
+            </a:endParaRPr>
+          </a:p>
+        </p:txBody>
+      </p:sp>
+    </p:spTree>
+    <p:extLst>
+      <p:ext uri="{BB962C8B-B14F-4D97-AF65-F5344CB8AC3E}">
+        <p14:creationId xmlns:p14="http://schemas.microsoft.com/office/powerpoint/2010/main" val="2456523026"/>
+      </p:ext>
+    </p:extLst>
+  </p:cSld>
+  <p:clrMapOvr>
+    <a:masterClrMapping/>
+  </p:clrMapOvr>
+</p:sld>
+</file>
+
+<file path=ppt/slides/slide7.xml><?xml version="1.0" encoding="utf-8"?>
+<p:sld xmlns:a="http://schemas.openxmlformats.org/drawingml/2006/main" xmlns:r="http://schemas.openxmlformats.org/officeDocument/2006/relationships" xmlns:p="http://schemas.openxmlformats.org/presentationml/2006/main">
+  <p:cSld>
+    <p:spTree>
+      <p:nvGrpSpPr>
+        <p:cNvPr id="1" name=""/>
+        <p:cNvGrpSpPr/>
+        <p:nvPr/>
+      </p:nvGrpSpPr>
+      <p:grpSpPr>
+        <a:xfrm>
+          <a:off x="0" y="0"/>
+          <a:ext cx="0" cy="0"/>
+          <a:chOff x="0" y="0"/>
+          <a:chExt cx="0" cy="0"/>
+        </a:xfrm>
+      </p:grpSpPr>
+      <p:sp>
+        <p:nvSpPr>
+          <p:cNvPr id="2" name="Title 1">
+            <a:extLst>
+              <a:ext uri="{FF2B5EF4-FFF2-40B4-BE49-F238E27FC236}">
+                <a16:creationId xmlns:a16="http://schemas.microsoft.com/office/drawing/2014/main" id="{4BE9F503-18C1-2EA9-8D81-E7C786B57E58}"/>
+              </a:ext>
+            </a:extLst>
+          </p:cNvPr>
+          <p:cNvSpPr>
+            <a:spLocks noGrp="1"/>
+          </p:cNvSpPr>
+          <p:nvPr>
+            <p:ph type="title"/>
+          </p:nvPr>
+        </p:nvSpPr>
+        <p:spPr/>
+        <p:txBody>
+          <a:bodyPr/>
+          <a:lstStyle/>
+          <a:p>
+            <a:r>
+              <a:rPr lang="en-PL" dirty="0"/>
+              <a:t>Thank you</a:t>
+            </a:r>
+          </a:p>
+        </p:txBody>
+      </p:sp>
+      <p:sp>
+        <p:nvSpPr>
+          <p:cNvPr id="3" name="Content Placeholder 2">
+            <a:extLst>
+              <a:ext uri="{FF2B5EF4-FFF2-40B4-BE49-F238E27FC236}">
+                <a16:creationId xmlns:a16="http://schemas.microsoft.com/office/drawing/2014/main" id="{3F75212E-623E-024F-4755-7A9083715E25}"/>
+              </a:ext>
+            </a:extLst>
+          </p:cNvPr>
+          <p:cNvSpPr>
+            <a:spLocks noGrp="1"/>
+          </p:cNvSpPr>
+          <p:nvPr>
+            <p:ph idx="1"/>
+          </p:nvPr>
+        </p:nvSpPr>
+        <p:spPr/>
+        <p:txBody>
+          <a:bodyPr/>
+          <a:lstStyle/>
+          <a:p>
+            <a:endParaRPr lang="en-PL"/>
+          </a:p>
+        </p:txBody>
+      </p:sp>
+    </p:spTree>
+    <p:extLst>
+      <p:ext uri="{BB962C8B-B14F-4D97-AF65-F5344CB8AC3E}">
+        <p14:creationId xmlns:p14="http://schemas.microsoft.com/office/powerpoint/2010/main" val="2821872827"/>
       </p:ext>
     </p:extLst>
   </p:cSld>

</xml_diff>